<commit_message>
Minor changes Hands-on basic + removing old files
</commit_message>
<xml_diff>
--- a/Hands-on-basic/Slides_pptx/Day4.pptx
+++ b/Hands-on-basic/Slides_pptx/Day4.pptx
@@ -12078,7 +12078,7 @@
                 <a:ea typeface="Lato" panose="020F0502020204030203" pitchFamily="34" charset="0"/>
                 <a:cs typeface="Lato" panose="020F0502020204030203" pitchFamily="34" charset="0"/>
               </a:rPr>
-              <a:t>cd ~/ASESMA-2025/Day4/example2.phonon.Gamma.Si/</a:t>
+              <a:t>cd ~/ASESMA2025/Day4/example2.phonon.Gamma.Si/</a:t>
             </a:r>
           </a:p>
           <a:p>
@@ -19518,7 +19518,7 @@
                 <a:ea typeface="Lato" panose="020F0502020204030203" pitchFamily="34" charset="0"/>
                 <a:cs typeface="Lato" panose="020F0502020204030203" pitchFamily="34" charset="0"/>
               </a:rPr>
-              <a:t>cd ~/ASESMA-2025/Day4/example3.phonon.dispersion.Si/</a:t>
+              <a:t>cd ~/ASESMA2025/Day4/example3.phonon.dispersion.Si/</a:t>
             </a:r>
           </a:p>
           <a:p>
@@ -28049,6 +28049,21 @@
               <a:buNone/>
             </a:pPr>
             <a:endParaRPr lang="en-GB" dirty="0"/>
+          </a:p>
+          <a:p>
+            <a:pPr marL="101600" indent="0">
+              <a:buNone/>
+            </a:pPr>
+            <a:endParaRPr lang="en-GB" dirty="0"/>
+          </a:p>
+          <a:p>
+            <a:pPr marL="101600" indent="0">
+              <a:buNone/>
+            </a:pPr>
+            <a:r>
+              <a:rPr lang="en-GB" dirty="0"/>
+              <a:t>Let’s click on the link and look at your phonons.</a:t>
+            </a:r>
           </a:p>
         </p:txBody>
       </p:sp>
@@ -29921,7 +29936,7 @@
                 <a:ea typeface="Lato" panose="020F0502020204030203" pitchFamily="34" charset="0"/>
                 <a:cs typeface="Lato" panose="020F0502020204030203" pitchFamily="34" charset="0"/>
               </a:rPr>
-              <a:t>cd ~/ASESMA-2025/Day4/example4.phonon.Gamma.AlAs/</a:t>
+              <a:t>cd ~/ASESMA2025/Day4/example4.phonon.Gamma.AlAs/</a:t>
             </a:r>
           </a:p>
           <a:p>
@@ -33673,7 +33688,7 @@
               <a:buNone/>
             </a:pPr>
             <a:r>
-              <a:rPr lang="en-US">
+              <a:rPr lang="en-US" dirty="0">
                 <a:latin typeface="Lato" panose="020F0502020204030203" pitchFamily="34" charset="0"/>
                 <a:ea typeface="Lato" panose="020F0502020204030203" pitchFamily="34" charset="0"/>
                 <a:cs typeface="Lato" panose="020F0502020204030203" pitchFamily="34" charset="0"/>
@@ -33681,7 +33696,7 @@
               <a:t>This relaxes </a:t>
             </a:r>
             <a:r>
-              <a:rPr lang="en-US" b="1">
+              <a:rPr lang="en-US" b="1" dirty="0">
                 <a:latin typeface="Lato" panose="020F0502020204030203" pitchFamily="34" charset="0"/>
                 <a:ea typeface="Lato" panose="020F0502020204030203" pitchFamily="34" charset="0"/>
                 <a:cs typeface="Lato" panose="020F0502020204030203" pitchFamily="34" charset="0"/>
@@ -33689,7 +33704,7 @@
               <a:t>only</a:t>
             </a:r>
             <a:r>
-              <a:rPr lang="en-US">
+              <a:rPr lang="en-US" dirty="0">
                 <a:latin typeface="Lato" panose="020F0502020204030203" pitchFamily="34" charset="0"/>
                 <a:ea typeface="Lato" panose="020F0502020204030203" pitchFamily="34" charset="0"/>
                 <a:cs typeface="Lato" panose="020F0502020204030203" pitchFamily="34" charset="0"/>
@@ -33697,14 +33712,14 @@
               <a:t> the </a:t>
             </a:r>
             <a:r>
-              <a:rPr lang="en-US" b="1">
+              <a:rPr lang="en-US" b="1" dirty="0">
                 <a:latin typeface="Lato" panose="020F0502020204030203" pitchFamily="34" charset="0"/>
                 <a:ea typeface="Lato" panose="020F0502020204030203" pitchFamily="34" charset="0"/>
                 <a:cs typeface="Lato" panose="020F0502020204030203" pitchFamily="34" charset="0"/>
               </a:rPr>
               <a:t>atomic positions</a:t>
             </a:r>
-            <a:endParaRPr sz="1400" b="1" strike="noStrike">
+            <a:endParaRPr sz="1400" b="1" strike="noStrike" dirty="0">
               <a:latin typeface="Lato" panose="020F0502020204030203" pitchFamily="34" charset="0"/>
               <a:ea typeface="Lato" panose="020F0502020204030203" pitchFamily="34" charset="0"/>
               <a:cs typeface="Lato" panose="020F0502020204030203" pitchFamily="34" charset="0"/>
@@ -35693,61 +35708,6 @@
           </a:p>
         </p:txBody>
       </p:sp>
-      <p:sp>
-        <p:nvSpPr>
-          <p:cNvPr id="7" name="TextBox 6">
-            <a:extLst>
-              <a:ext uri="{FF2B5EF4-FFF2-40B4-BE49-F238E27FC236}">
-                <a16:creationId xmlns:a16="http://schemas.microsoft.com/office/drawing/2014/main" id="{C5920ADF-FFF1-47C4-D068-3C51952B8AB1}"/>
-              </a:ext>
-            </a:extLst>
-          </p:cNvPr>
-          <p:cNvSpPr txBox="1"/>
-          <p:nvPr/>
-        </p:nvSpPr>
-        <p:spPr>
-          <a:xfrm>
-            <a:off x="2431473" y="3088075"/>
-            <a:ext cx="4862944" cy="307777"/>
-          </a:xfrm>
-          <a:prstGeom prst="rect">
-            <a:avLst/>
-          </a:prstGeom>
-          <a:noFill/>
-        </p:spPr>
-        <p:txBody>
-          <a:bodyPr wrap="square">
-            <a:spAutoFit/>
-          </a:bodyPr>
-          <a:lstStyle/>
-          <a:p>
-            <a:r>
-              <a:rPr lang="en-GB" dirty="0">
-                <a:solidFill>
-                  <a:schemeClr val="bg2"/>
-                </a:solidFill>
-                <a:latin typeface="Lato" panose="020F0502020204030203" pitchFamily="34" charset="0"/>
-                <a:ea typeface="Lato" panose="020F0502020204030203" pitchFamily="34" charset="0"/>
-                <a:cs typeface="Lato" panose="020F0502020204030203" pitchFamily="34" charset="0"/>
-              </a:rPr>
-              <a:t>from effective </a:t>
-            </a:r>
-            <a:r>
-              <a:rPr lang="en-GB" dirty="0">
-                <a:solidFill>
-                  <a:schemeClr val="bg2"/>
-                </a:solidFill>
-                <a:effectLst/>
-                <a:latin typeface="Lato" panose="020F0502020204030203" pitchFamily="34" charset="0"/>
-                <a:ea typeface="Lato" panose="020F0502020204030203" pitchFamily="34" charset="0"/>
-                <a:cs typeface="Lato" panose="020F0502020204030203" pitchFamily="34" charset="0"/>
-              </a:rPr>
-              <a:t>charges </a:t>
-            </a:r>
-            <a:endParaRPr lang="en-GB" dirty="0"/>
-          </a:p>
-        </p:txBody>
-      </p:sp>
     </p:spTree>
     <p:extLst>
       <p:ext uri="{BB962C8B-B14F-4D97-AF65-F5344CB8AC3E}">
@@ -35826,7 +35786,7 @@
             </a:pPr>
             <a:r>
               <a:rPr lang="en-US" dirty="0"/>
-              <a:t>Exercise 5:</a:t>
+              <a:t>Exercise 5 (Optional):</a:t>
             </a:r>
             <a:br>
               <a:rPr lang="en-US" dirty="0"/>
@@ -35926,21 +35886,8 @@
                 <a:ea typeface="Lato" panose="020F0502020204030203" pitchFamily="34" charset="0"/>
                 <a:cs typeface="Lato" panose="020F0502020204030203" pitchFamily="34" charset="0"/>
               </a:rPr>
-              <a:t>cd ~/ASESMA-2025/</a:t>
-            </a:r>
-            <a:r>
-              <a:rPr lang="en-GB" sz="1800">
-                <a:latin typeface="Lato" panose="020F0502020204030203" pitchFamily="34" charset="0"/>
-                <a:ea typeface="Lato" panose="020F0502020204030203" pitchFamily="34" charset="0"/>
-                <a:cs typeface="Lato" panose="020F0502020204030203" pitchFamily="34" charset="0"/>
-              </a:rPr>
-              <a:t>Day4/example5.phonon.dispersion.AlAs/</a:t>
-            </a:r>
-            <a:endParaRPr lang="en-GB" sz="1800" dirty="0">
-              <a:latin typeface="Lato" panose="020F0502020204030203" pitchFamily="34" charset="0"/>
-              <a:ea typeface="Lato" panose="020F0502020204030203" pitchFamily="34" charset="0"/>
-              <a:cs typeface="Lato" panose="020F0502020204030203" pitchFamily="34" charset="0"/>
-            </a:endParaRPr>
+              <a:t>cd ~/ASESMA2025/Day4/example5.phonon.dispersion.AlAs/</a:t>
+            </a:r>
           </a:p>
           <a:p>
             <a:endParaRPr lang="en-GB" sz="1800" dirty="0">
@@ -38259,6 +38206,54 @@
           </a:p>
         </p:txBody>
       </p:sp>
+      <p:sp>
+        <p:nvSpPr>
+          <p:cNvPr id="14" name="TextBox 13">
+            <a:extLst>
+              <a:ext uri="{FF2B5EF4-FFF2-40B4-BE49-F238E27FC236}">
+                <a16:creationId xmlns:a16="http://schemas.microsoft.com/office/drawing/2014/main" id="{A7607181-CC6E-18AB-50A7-84DF8E3278B0}"/>
+              </a:ext>
+            </a:extLst>
+          </p:cNvPr>
+          <p:cNvSpPr txBox="1"/>
+          <p:nvPr/>
+        </p:nvSpPr>
+        <p:spPr>
+          <a:xfrm>
+            <a:off x="467621" y="6025595"/>
+            <a:ext cx="7117984" cy="338554"/>
+          </a:xfrm>
+          <a:prstGeom prst="rect">
+            <a:avLst/>
+          </a:prstGeom>
+          <a:noFill/>
+        </p:spPr>
+        <p:txBody>
+          <a:bodyPr wrap="square">
+            <a:spAutoFit/>
+          </a:bodyPr>
+          <a:lstStyle/>
+          <a:p>
+            <a:r>
+              <a:rPr lang="en-GB" sz="1600" dirty="0">
+                <a:latin typeface="Lato" panose="020F0502020204030203" pitchFamily="34" charset="0"/>
+                <a:ea typeface="Lato" panose="020F0502020204030203" pitchFamily="34" charset="0"/>
+                <a:cs typeface="Lato" panose="020F0502020204030203" pitchFamily="34" charset="0"/>
+              </a:rPr>
+              <a:t>(Note: some parts of the input files are left empty for you to fill </a:t>
+            </a:r>
+            <a:r>
+              <a:rPr lang="en-GB" sz="1400" dirty="0">
+                <a:latin typeface="Lato" panose="020F0502020204030203" pitchFamily="34" charset="0"/>
+                <a:ea typeface="Lato" panose="020F0502020204030203" pitchFamily="34" charset="0"/>
+                <a:cs typeface="Lato" panose="020F0502020204030203" pitchFamily="34" charset="0"/>
+              </a:rPr>
+              <a:t>!</a:t>
+            </a:r>
+            <a:endParaRPr lang="en-GB" dirty="0"/>
+          </a:p>
+        </p:txBody>
+      </p:sp>
     </p:spTree>
     <p:extLst>
       <p:ext uri="{BB962C8B-B14F-4D97-AF65-F5344CB8AC3E}">
@@ -40975,7 +40970,7 @@
               <a:buNone/>
             </a:pPr>
             <a:r>
-              <a:rPr lang="en-US" sz="2050">
+              <a:rPr lang="en-US" sz="2050" dirty="0">
                 <a:solidFill>
                   <a:srgbClr val="C9211E"/>
                 </a:solidFill>
@@ -40985,7 +40980,7 @@
               </a:rPr>
               <a:t>Input file for cell relaxation</a:t>
             </a:r>
-            <a:endParaRPr sz="2050" b="0" strike="noStrike">
+            <a:endParaRPr sz="2050" b="0" strike="noStrike" dirty="0">
               <a:latin typeface="Lato" panose="020F0502020204030203" pitchFamily="34" charset="0"/>
               <a:ea typeface="Lato" panose="020F0502020204030203" pitchFamily="34" charset="0"/>
               <a:cs typeface="Lato" panose="020F0502020204030203" pitchFamily="34" charset="0"/>

</xml_diff>

<commit_message>
Add ex6 Phonon basic hands-on
</commit_message>
<xml_diff>
--- a/Hands-on-basic/Slides_pptx/Day4.pptx
+++ b/Hands-on-basic/Slides_pptx/Day4.pptx
@@ -5,7 +5,7 @@
     <p:sldMasterId id="2147483662" r:id="rId1"/>
   </p:sldMasterIdLst>
   <p:notesMasterIdLst>
-    <p:notesMasterId r:id="rId47"/>
+    <p:notesMasterId r:id="rId52"/>
   </p:notesMasterIdLst>
   <p:sldIdLst>
     <p:sldId id="256" r:id="rId2"/>
@@ -52,33 +52,38 @@
     <p:sldId id="344" r:id="rId43"/>
     <p:sldId id="336" r:id="rId44"/>
     <p:sldId id="337" r:id="rId45"/>
-    <p:sldId id="260" r:id="rId46"/>
+    <p:sldId id="352" r:id="rId46"/>
+    <p:sldId id="353" r:id="rId47"/>
+    <p:sldId id="354" r:id="rId48"/>
+    <p:sldId id="355" r:id="rId49"/>
+    <p:sldId id="356" r:id="rId50"/>
+    <p:sldId id="260" r:id="rId51"/>
   </p:sldIdLst>
   <p:sldSz cx="9720263" cy="6480175"/>
   <p:notesSz cx="7559675" cy="10691813"/>
   <p:embeddedFontLst>
     <p:embeddedFont>
       <p:font typeface="Cambria Math" panose="02040503050406030204" pitchFamily="18" charset="0"/>
-      <p:regular r:id="rId48"/>
+      <p:regular r:id="rId53"/>
     </p:embeddedFont>
     <p:embeddedFont>
       <p:font typeface="Grandview Display" panose="020B0502040204020203" pitchFamily="34" charset="0"/>
-      <p:regular r:id="rId49"/>
-      <p:italic r:id="rId50"/>
+      <p:regular r:id="rId54"/>
+      <p:italic r:id="rId55"/>
     </p:embeddedFont>
     <p:embeddedFont>
       <p:font typeface="Lato" panose="020F0502020204030203" pitchFamily="34" charset="0"/>
-      <p:regular r:id="rId51"/>
-      <p:bold r:id="rId52"/>
-      <p:italic r:id="rId53"/>
-      <p:boldItalic r:id="rId54"/>
+      <p:regular r:id="rId56"/>
+      <p:bold r:id="rId57"/>
+      <p:italic r:id="rId58"/>
+      <p:boldItalic r:id="rId59"/>
     </p:embeddedFont>
     <p:embeddedFont>
       <p:font typeface="Raleway" pitchFamily="2" charset="77"/>
-      <p:regular r:id="rId55"/>
-      <p:bold r:id="rId56"/>
-      <p:italic r:id="rId57"/>
-      <p:boldItalic r:id="rId58"/>
+      <p:regular r:id="rId60"/>
+      <p:bold r:id="rId61"/>
+      <p:italic r:id="rId62"/>
+      <p:boldItalic r:id="rId63"/>
     </p:embeddedFont>
   </p:embeddedFontLst>
   <p:defaultTextStyle>
@@ -1689,6 +1694,133 @@
 </file>
 
 <file path=ppt/notesSlides/notesSlide18.xml><?xml version="1.0" encoding="utf-8"?>
+<p:notes xmlns:a="http://schemas.openxmlformats.org/drawingml/2006/main" xmlns:r="http://schemas.openxmlformats.org/officeDocument/2006/relationships" xmlns:p="http://schemas.openxmlformats.org/presentationml/2006/main" showMasterSp="0" showMasterPhAnim="0">
+  <p:cSld>
+    <p:spTree>
+      <p:nvGrpSpPr>
+        <p:cNvPr id="1" name="Shape 87">
+          <a:extLst>
+            <a:ext uri="{FF2B5EF4-FFF2-40B4-BE49-F238E27FC236}">
+              <a16:creationId xmlns:a16="http://schemas.microsoft.com/office/drawing/2014/main" id="{30CB44C8-085A-A848-1C89-EBECAC09A35F}"/>
+            </a:ext>
+          </a:extLst>
+        </p:cNvPr>
+        <p:cNvGrpSpPr/>
+        <p:nvPr/>
+      </p:nvGrpSpPr>
+      <p:grpSpPr>
+        <a:xfrm>
+          <a:off x="0" y="0"/>
+          <a:ext cx="0" cy="0"/>
+          <a:chOff x="0" y="0"/>
+          <a:chExt cx="0" cy="0"/>
+        </a:xfrm>
+      </p:grpSpPr>
+      <p:sp>
+        <p:nvSpPr>
+          <p:cNvPr id="88" name="Google Shape;88;p3:notes">
+            <a:extLst>
+              <a:ext uri="{FF2B5EF4-FFF2-40B4-BE49-F238E27FC236}">
+                <a16:creationId xmlns:a16="http://schemas.microsoft.com/office/drawing/2014/main" id="{0CAE8EE6-149D-38AB-FA29-54E6AE1E0347}"/>
+              </a:ext>
+            </a:extLst>
+          </p:cNvPr>
+          <p:cNvSpPr txBox="1">
+            <a:spLocks noGrp="1"/>
+          </p:cNvSpPr>
+          <p:nvPr>
+            <p:ph type="body" idx="1"/>
+          </p:nvPr>
+        </p:nvSpPr>
+        <p:spPr>
+          <a:xfrm>
+            <a:off x="755950" y="5078600"/>
+            <a:ext cx="6047725" cy="4811300"/>
+          </a:xfrm>
+          <a:prstGeom prst="rect">
+            <a:avLst/>
+          </a:prstGeom>
+        </p:spPr>
+        <p:txBody>
+          <a:bodyPr spcFirstLastPara="1" wrap="square" lIns="91425" tIns="91425" rIns="91425" bIns="91425" anchor="t" anchorCtr="0">
+            <a:noAutofit/>
+          </a:bodyPr>
+          <a:lstStyle/>
+          <a:p>
+            <a:pPr marL="0" lvl="0" indent="0" algn="l" rtl="0">
+              <a:spcBef>
+                <a:spcPts val="0"/>
+              </a:spcBef>
+              <a:spcAft>
+                <a:spcPts val="0"/>
+              </a:spcAft>
+              <a:buNone/>
+            </a:pPr>
+            <a:endParaRPr/>
+          </a:p>
+        </p:txBody>
+      </p:sp>
+      <p:sp>
+        <p:nvSpPr>
+          <p:cNvPr id="89" name="Google Shape;89;p3:notes">
+            <a:extLst>
+              <a:ext uri="{FF2B5EF4-FFF2-40B4-BE49-F238E27FC236}">
+                <a16:creationId xmlns:a16="http://schemas.microsoft.com/office/drawing/2014/main" id="{F4389703-6720-E46C-8BDC-1872D3125DDB}"/>
+              </a:ext>
+            </a:extLst>
+          </p:cNvPr>
+          <p:cNvSpPr>
+            <a:spLocks noGrp="1" noRot="1" noChangeAspect="1"/>
+          </p:cNvSpPr>
+          <p:nvPr>
+            <p:ph type="sldImg" idx="2"/>
+          </p:nvPr>
+        </p:nvSpPr>
+        <p:spPr>
+          <a:xfrm>
+            <a:off x="773113" y="801688"/>
+            <a:ext cx="6015037" cy="4010025"/>
+          </a:xfrm>
+          <a:custGeom>
+            <a:avLst/>
+            <a:gdLst/>
+            <a:ahLst/>
+            <a:cxnLst/>
+            <a:rect l="l" t="t" r="r" b="b"/>
+            <a:pathLst>
+              <a:path w="120000" h="120000" extrusionOk="0">
+                <a:moveTo>
+                  <a:pt x="0" y="0"/>
+                </a:moveTo>
+                <a:lnTo>
+                  <a:pt x="120000" y="0"/>
+                </a:lnTo>
+                <a:lnTo>
+                  <a:pt x="120000" y="120000"/>
+                </a:lnTo>
+                <a:lnTo>
+                  <a:pt x="0" y="120000"/>
+                </a:lnTo>
+                <a:close/>
+              </a:path>
+            </a:pathLst>
+          </a:custGeom>
+        </p:spPr>
+      </p:sp>
+    </p:spTree>
+    <p:extLst>
+      <p:ext uri="{BB962C8B-B14F-4D97-AF65-F5344CB8AC3E}">
+        <p14:creationId xmlns:p14="http://schemas.microsoft.com/office/powerpoint/2010/main" val="3579654525"/>
+      </p:ext>
+    </p:extLst>
+  </p:cSld>
+  <p:clrMapOvr>
+    <a:masterClrMapping/>
+  </p:clrMapOvr>
+</p:notes>
+</file>
+
+<file path=ppt/notesSlides/notesSlide19.xml><?xml version="1.0" encoding="utf-8"?>
 <p:notes xmlns:a="http://schemas.openxmlformats.org/drawingml/2006/main" xmlns:r="http://schemas.openxmlformats.org/officeDocument/2006/relationships" xmlns:p="http://schemas.openxmlformats.org/presentationml/2006/main" showMasterSp="0" showMasterPhAnim="0">
   <p:cSld>
     <p:spTree>
@@ -38272,7 +38404,13 @@
   <p:cSld>
     <p:spTree>
       <p:nvGrpSpPr>
-        <p:cNvPr id="1" name="Shape 117"/>
+        <p:cNvPr id="1" name="Shape 90">
+          <a:extLst>
+            <a:ext uri="{FF2B5EF4-FFF2-40B4-BE49-F238E27FC236}">
+              <a16:creationId xmlns:a16="http://schemas.microsoft.com/office/drawing/2014/main" id="{F77536DD-F1F9-856B-4B56-67C4E78397AD}"/>
+            </a:ext>
+          </a:extLst>
+        </p:cNvPr>
         <p:cNvGrpSpPr/>
         <p:nvPr/>
       </p:nvGrpSpPr>
@@ -38286,7 +38424,13 @@
       </p:grpSpPr>
       <p:sp>
         <p:nvSpPr>
-          <p:cNvPr id="118" name="Google Shape;118;p20"/>
+          <p:cNvPr id="92" name="Google Shape;92;p17">
+            <a:extLst>
+              <a:ext uri="{FF2B5EF4-FFF2-40B4-BE49-F238E27FC236}">
+                <a16:creationId xmlns:a16="http://schemas.microsoft.com/office/drawing/2014/main" id="{CE5BEF8B-AF7A-9D87-0C1A-404C87747B4D}"/>
+              </a:ext>
+            </a:extLst>
+          </p:cNvPr>
           <p:cNvSpPr txBox="1">
             <a:spLocks noGrp="1"/>
           </p:cNvSpPr>
@@ -38296,50 +38440,8 @@
         </p:nvSpPr>
         <p:spPr>
           <a:xfrm>
-            <a:off x="282232" y="1760488"/>
-            <a:ext cx="4300200" cy="1660800"/>
-          </a:xfrm>
-          <a:prstGeom prst="rect">
-            <a:avLst/>
-          </a:prstGeom>
-        </p:spPr>
-        <p:txBody>
-          <a:bodyPr spcFirstLastPara="1" wrap="square" lIns="103175" tIns="103175" rIns="103175" bIns="103175" anchor="b" anchorCtr="0">
-            <a:normAutofit/>
-          </a:bodyPr>
-          <a:lstStyle/>
-          <a:p>
-            <a:pPr marL="0" lvl="0" indent="0" algn="ctr" rtl="0">
-              <a:spcBef>
-                <a:spcPts val="0"/>
-              </a:spcBef>
-              <a:spcAft>
-                <a:spcPts val="0"/>
-              </a:spcAft>
-              <a:buNone/>
-            </a:pPr>
-            <a:r>
-              <a:rPr lang="en-US" dirty="0"/>
-              <a:t>Thank you!</a:t>
-            </a:r>
-            <a:endParaRPr dirty="0"/>
-          </a:p>
-        </p:txBody>
-      </p:sp>
-      <p:sp>
-        <p:nvSpPr>
-          <p:cNvPr id="119" name="Google Shape;119;p20"/>
-          <p:cNvSpPr txBox="1">
-            <a:spLocks noGrp="1"/>
-          </p:cNvSpPr>
-          <p:nvPr>
-            <p:ph type="body" idx="2"/>
-          </p:nvPr>
-        </p:nvSpPr>
-        <p:spPr>
-          <a:xfrm>
-            <a:off x="5250785" y="683803"/>
-            <a:ext cx="4078800" cy="4655400"/>
+            <a:off x="432038" y="1971576"/>
+            <a:ext cx="8819700" cy="1942800"/>
           </a:xfrm>
           <a:prstGeom prst="rect">
             <a:avLst/>
@@ -38347,66 +38449,4388 @@
         </p:spPr>
         <p:txBody>
           <a:bodyPr spcFirstLastPara="1" wrap="square" lIns="103175" tIns="103175" rIns="103175" bIns="103175" anchor="ctr" anchorCtr="0">
-            <a:normAutofit/>
+            <a:normAutofit fontScale="90000"/>
           </a:bodyPr>
           <a:lstStyle/>
           <a:p>
-            <a:pPr marL="0" lvl="0" indent="0" algn="l" rtl="0">
-              <a:spcBef>
-                <a:spcPts val="0"/>
-              </a:spcBef>
-              <a:spcAft>
-                <a:spcPts val="1400"/>
+            <a:pPr marL="0" lvl="0" indent="0" algn="ctr" rtl="0">
+              <a:spcBef>
+                <a:spcPts val="0"/>
+              </a:spcBef>
+              <a:spcAft>
+                <a:spcPts val="0"/>
               </a:spcAft>
               <a:buNone/>
             </a:pPr>
             <a:r>
-              <a:rPr lang="en-US" sz="4800" b="1"/>
-              <a:t>Questions?</a:t>
-            </a:r>
-            <a:endParaRPr sz="4800" b="1"/>
+              <a:rPr lang="en-US" dirty="0"/>
+              <a:t>Exercise 6 (Optional):</a:t>
+            </a:r>
+            <a:br>
+              <a:rPr lang="en-US" dirty="0"/>
+            </a:br>
+            <a:r>
+              <a:rPr lang="en-US" sz="4400" dirty="0"/>
+              <a:t>Phonons dispersion of unstable materials</a:t>
+            </a:r>
+            <a:endParaRPr sz="4400" dirty="0"/>
           </a:p>
         </p:txBody>
       </p:sp>
+    </p:spTree>
+    <p:extLst>
+      <p:ext uri="{BB962C8B-B14F-4D97-AF65-F5344CB8AC3E}">
+        <p14:creationId xmlns:p14="http://schemas.microsoft.com/office/powerpoint/2010/main" val="2338170882"/>
+      </p:ext>
+    </p:extLst>
+  </p:cSld>
+  <p:clrMapOvr>
+    <a:masterClrMapping/>
+  </p:clrMapOvr>
+</p:sld>
+</file>
+
+<file path=ppt/slides/slide46.xml><?xml version="1.0" encoding="utf-8"?>
+<p:sld xmlns:a="http://schemas.openxmlformats.org/drawingml/2006/main" xmlns:r="http://schemas.openxmlformats.org/officeDocument/2006/relationships" xmlns:p="http://schemas.openxmlformats.org/presentationml/2006/main">
+  <p:cSld>
+    <p:spTree>
+      <p:nvGrpSpPr>
+        <p:cNvPr id="1" name=""/>
+        <p:cNvGrpSpPr/>
+        <p:nvPr/>
+      </p:nvGrpSpPr>
+      <p:grpSpPr>
+        <a:xfrm>
+          <a:off x="0" y="0"/>
+          <a:ext cx="0" cy="0"/>
+          <a:chOff x="0" y="0"/>
+          <a:chExt cx="0" cy="0"/>
+        </a:xfrm>
+      </p:grpSpPr>
       <p:sp>
         <p:nvSpPr>
-          <p:cNvPr id="120" name="Google Shape;120;p20"/>
-          <p:cNvSpPr txBox="1">
+          <p:cNvPr id="2" name="Title 1">
+            <a:extLst>
+              <a:ext uri="{FF2B5EF4-FFF2-40B4-BE49-F238E27FC236}">
+                <a16:creationId xmlns:a16="http://schemas.microsoft.com/office/drawing/2014/main" id="{DCC7A757-15B8-6337-4945-334D35E1F758}"/>
+              </a:ext>
+            </a:extLst>
+          </p:cNvPr>
+          <p:cNvSpPr>
             <a:spLocks noGrp="1"/>
           </p:cNvSpPr>
           <p:nvPr>
-            <p:ph type="subTitle" idx="1"/>
+            <p:ph type="title"/>
           </p:nvPr>
         </p:nvSpPr>
+        <p:spPr/>
+        <p:txBody>
+          <a:bodyPr/>
+          <a:lstStyle/>
+          <a:p>
+            <a:r>
+              <a:rPr lang="en-GB" dirty="0"/>
+              <a:t>Negative phonon frequencies</a:t>
+            </a:r>
+          </a:p>
+        </p:txBody>
+      </p:sp>
+      <p:pic>
+        <p:nvPicPr>
+          <p:cNvPr id="9" name="Picture 8" descr="A graph with a green line&#10;&#10;Description automatically generated">
+            <a:extLst>
+              <a:ext uri="{FF2B5EF4-FFF2-40B4-BE49-F238E27FC236}">
+                <a16:creationId xmlns:a16="http://schemas.microsoft.com/office/drawing/2014/main" id="{F31A8054-F746-AA0F-B527-D4C2AD75BF9F}"/>
+              </a:ext>
+            </a:extLst>
+          </p:cNvPr>
+          <p:cNvPicPr>
+            <a:picLocks noChangeAspect="1"/>
+          </p:cNvPicPr>
+          <p:nvPr/>
+        </p:nvPicPr>
+        <p:blipFill>
+          <a:blip r:embed="rId2"/>
+          <a:stretch>
+            <a:fillRect/>
+          </a:stretch>
+        </p:blipFill>
         <p:spPr>
           <a:xfrm>
-            <a:off x="282232" y="3446229"/>
-            <a:ext cx="4300200" cy="1695300"/>
+            <a:off x="169757" y="1840125"/>
+            <a:ext cx="4372367" cy="3497893"/>
           </a:xfrm>
           <a:prstGeom prst="rect">
             <a:avLst/>
           </a:prstGeom>
         </p:spPr>
+      </p:pic>
+      <mc:AlternateContent xmlns:mc="http://schemas.openxmlformats.org/markup-compatibility/2006">
+        <mc:Choice xmlns:a14="http://schemas.microsoft.com/office/drawing/2010/main" Requires="a14">
+          <p:sp>
+            <p:nvSpPr>
+              <p:cNvPr id="10" name="TextBox 9">
+                <a:extLst>
+                  <a:ext uri="{FF2B5EF4-FFF2-40B4-BE49-F238E27FC236}">
+                    <a16:creationId xmlns:a16="http://schemas.microsoft.com/office/drawing/2014/main" id="{186726DA-291B-5A30-A8B8-C6B8FCA0017A}"/>
+                  </a:ext>
+                </a:extLst>
+              </p:cNvPr>
+              <p:cNvSpPr txBox="1"/>
+              <p:nvPr/>
+            </p:nvSpPr>
+            <p:spPr>
+              <a:xfrm>
+                <a:off x="0" y="5662623"/>
+                <a:ext cx="3211823" cy="314702"/>
+              </a:xfrm>
+              <a:prstGeom prst="rect">
+                <a:avLst/>
+              </a:prstGeom>
+              <a:noFill/>
+            </p:spPr>
+            <p:txBody>
+              <a:bodyPr wrap="square">
+                <a:spAutoFit/>
+              </a:bodyPr>
+              <a:lstStyle/>
+              <a:p>
+                <a:pPr/>
+                <a14:m>
+                  <m:oMathPara xmlns:m="http://schemas.openxmlformats.org/officeDocument/2006/math">
+                    <m:oMathParaPr>
+                      <m:jc m:val="centerGroup"/>
+                    </m:oMathParaPr>
+                    <m:oMath xmlns:m="http://schemas.openxmlformats.org/officeDocument/2006/math">
+                      <m:r>
+                        <a:rPr lang="en-US" sz="1400" b="0" i="1" smtClean="0">
+                          <a:latin typeface="Cambria Math" panose="02040503050406030204" pitchFamily="18" charset="0"/>
+                          <a:sym typeface="Wingdings" panose="05000000000000000000" pitchFamily="2" charset="2"/>
+                        </a:rPr>
+                        <m:t>(</m:t>
+                      </m:r>
+                      <m:r>
+                        <m:rPr>
+                          <m:sty m:val="p"/>
+                        </m:rPr>
+                        <a:rPr lang="en-US" sz="1400" b="0" i="0" smtClean="0">
+                          <a:latin typeface="Cambria Math" panose="02040503050406030204" pitchFamily="18" charset="0"/>
+                          <a:sym typeface="Wingdings" panose="05000000000000000000" pitchFamily="2" charset="2"/>
+                        </a:rPr>
+                        <m:t>where</m:t>
+                      </m:r>
+                      <m:r>
+                        <a:rPr lang="en-US" sz="1400" b="0" i="0" smtClean="0">
+                          <a:latin typeface="Cambria Math" panose="02040503050406030204" pitchFamily="18" charset="0"/>
+                          <a:sym typeface="Wingdings" panose="05000000000000000000" pitchFamily="2" charset="2"/>
+                        </a:rPr>
+                        <m:t> </m:t>
+                      </m:r>
+                      <m:r>
+                        <a:rPr lang="en-US" sz="1400" b="0" i="1" smtClean="0">
+                          <a:latin typeface="Cambria Math" panose="02040503050406030204" pitchFamily="18" charset="0"/>
+                          <a:sym typeface="Wingdings" panose="05000000000000000000" pitchFamily="2" charset="2"/>
+                        </a:rPr>
+                        <m:t>𝜂</m:t>
+                      </m:r>
+                      <m:r>
+                        <a:rPr lang="en-US" sz="1400" b="0" i="1" smtClean="0">
+                          <a:latin typeface="Cambria Math" panose="02040503050406030204" pitchFamily="18" charset="0"/>
+                          <a:sym typeface="Wingdings" panose="05000000000000000000" pitchFamily="2" charset="2"/>
+                        </a:rPr>
+                        <m:t> </m:t>
+                      </m:r>
+                      <m:r>
+                        <a:rPr lang="en-US" sz="1400" b="0" i="1" smtClean="0">
+                          <a:latin typeface="Cambria Math" panose="02040503050406030204" pitchFamily="18" charset="0"/>
+                          <a:sym typeface="Wingdings" panose="05000000000000000000" pitchFamily="2" charset="2"/>
+                        </a:rPr>
+                        <m:t>𝑖𝑠</m:t>
+                      </m:r>
+                      <m:r>
+                        <a:rPr lang="en-US" sz="1400" b="0" i="1" smtClean="0">
+                          <a:latin typeface="Cambria Math" panose="02040503050406030204" pitchFamily="18" charset="0"/>
+                          <a:sym typeface="Wingdings" panose="05000000000000000000" pitchFamily="2" charset="2"/>
+                        </a:rPr>
+                        <m:t> :</m:t>
+                      </m:r>
+                      <m:r>
+                        <a:rPr lang="it-IT" sz="1400">
+                          <a:latin typeface="Cambria Math" panose="02040503050406030204" pitchFamily="18" charset="0"/>
+                          <a:sym typeface="Wingdings" panose="05000000000000000000" pitchFamily="2" charset="2"/>
+                        </a:rPr>
+                        <m:t>𝜂</m:t>
+                      </m:r>
+                      <m:sSub>
+                        <m:sSubPr>
+                          <m:ctrlPr>
+                            <a:rPr lang="it-IT" sz="1400" i="1">
+                              <a:latin typeface="Cambria Math" panose="02040503050406030204" pitchFamily="18" charset="0"/>
+                              <a:sym typeface="Wingdings" panose="05000000000000000000" pitchFamily="2" charset="2"/>
+                            </a:rPr>
+                          </m:ctrlPr>
+                        </m:sSubPr>
+                        <m:e>
+                          <m:r>
+                            <a:rPr lang="it-IT" sz="1400">
+                              <a:latin typeface="Cambria Math" panose="02040503050406030204" pitchFamily="18" charset="0"/>
+                              <a:sym typeface="Wingdings" panose="05000000000000000000" pitchFamily="2" charset="2"/>
+                            </a:rPr>
+                            <m:t>𝒖</m:t>
+                          </m:r>
+                        </m:e>
+                        <m:sub>
+                          <m:r>
+                            <a:rPr lang="it-IT" sz="1400">
+                              <a:latin typeface="Cambria Math" panose="02040503050406030204" pitchFamily="18" charset="0"/>
+                              <a:sym typeface="Wingdings" panose="05000000000000000000" pitchFamily="2" charset="2"/>
+                            </a:rPr>
+                            <m:t>𝑘</m:t>
+                          </m:r>
+                        </m:sub>
+                      </m:sSub>
+                      <m:r>
+                        <a:rPr lang="it-IT" sz="1400">
+                          <a:latin typeface="Cambria Math" panose="02040503050406030204" pitchFamily="18" charset="0"/>
+                          <a:sym typeface="Wingdings" panose="05000000000000000000" pitchFamily="2" charset="2"/>
+                        </a:rPr>
+                        <m:t>=</m:t>
+                      </m:r>
+                      <m:r>
+                        <a:rPr lang="it-IT" sz="1400">
+                          <a:latin typeface="Cambria Math" panose="02040503050406030204" pitchFamily="18" charset="0"/>
+                          <a:sym typeface="Wingdings" panose="05000000000000000000" pitchFamily="2" charset="2"/>
+                        </a:rPr>
+                        <m:t>𝜂</m:t>
+                      </m:r>
+                      <m:sSub>
+                        <m:sSubPr>
+                          <m:ctrlPr>
+                            <a:rPr lang="it-IT" sz="1400" i="1">
+                              <a:latin typeface="Cambria Math" panose="02040503050406030204" pitchFamily="18" charset="0"/>
+                              <a:sym typeface="Wingdings" panose="05000000000000000000" pitchFamily="2" charset="2"/>
+                            </a:rPr>
+                          </m:ctrlPr>
+                        </m:sSubPr>
+                        <m:e>
+                          <m:r>
+                            <a:rPr lang="it-IT" sz="1400">
+                              <a:latin typeface="Cambria Math" panose="02040503050406030204" pitchFamily="18" charset="0"/>
+                              <a:sym typeface="Wingdings" panose="05000000000000000000" pitchFamily="2" charset="2"/>
+                            </a:rPr>
+                            <m:t>𝝐</m:t>
+                          </m:r>
+                        </m:e>
+                        <m:sub>
+                          <m:r>
+                            <a:rPr lang="it-IT" sz="1400">
+                              <a:latin typeface="Cambria Math" panose="02040503050406030204" pitchFamily="18" charset="0"/>
+                              <a:sym typeface="Wingdings" panose="05000000000000000000" pitchFamily="2" charset="2"/>
+                            </a:rPr>
+                            <m:t>𝑘</m:t>
+                          </m:r>
+                        </m:sub>
+                      </m:sSub>
+                      <m:sSup>
+                        <m:sSupPr>
+                          <m:ctrlPr>
+                            <a:rPr lang="en-US" sz="1400" b="0" i="1" smtClean="0">
+                              <a:latin typeface="Cambria Math" panose="02040503050406030204" pitchFamily="18" charset="0"/>
+                              <a:sym typeface="Wingdings" panose="05000000000000000000" pitchFamily="2" charset="2"/>
+                            </a:rPr>
+                          </m:ctrlPr>
+                        </m:sSupPr>
+                        <m:e>
+                          <m:r>
+                            <a:rPr lang="en-US" sz="1400" b="0" i="1" smtClean="0">
+                              <a:latin typeface="Cambria Math" panose="02040503050406030204" pitchFamily="18" charset="0"/>
+                              <a:sym typeface="Wingdings" panose="05000000000000000000" pitchFamily="2" charset="2"/>
+                            </a:rPr>
+                            <m:t>𝑒</m:t>
+                          </m:r>
+                        </m:e>
+                        <m:sup>
+                          <m:r>
+                            <a:rPr lang="en-US" sz="1400" b="0" i="1" smtClean="0">
+                              <a:latin typeface="Cambria Math" panose="02040503050406030204" pitchFamily="18" charset="0"/>
+                              <a:sym typeface="Wingdings" panose="05000000000000000000" pitchFamily="2" charset="2"/>
+                            </a:rPr>
+                            <m:t>𝑖</m:t>
+                          </m:r>
+                          <m:r>
+                            <a:rPr lang="en-US" sz="1400" b="1" i="1" smtClean="0">
+                              <a:latin typeface="Cambria Math" panose="02040503050406030204" pitchFamily="18" charset="0"/>
+                              <a:sym typeface="Wingdings" panose="05000000000000000000" pitchFamily="2" charset="2"/>
+                            </a:rPr>
+                            <m:t>𝒒</m:t>
+                          </m:r>
+                          <m:sSub>
+                            <m:sSubPr>
+                              <m:ctrlPr>
+                                <a:rPr lang="en-US" sz="1400" b="0" i="1" smtClean="0">
+                                  <a:latin typeface="Cambria Math" panose="02040503050406030204" pitchFamily="18" charset="0"/>
+                                  <a:sym typeface="Wingdings" panose="05000000000000000000" pitchFamily="2" charset="2"/>
+                                </a:rPr>
+                              </m:ctrlPr>
+                            </m:sSubPr>
+                            <m:e>
+                              <m:r>
+                                <a:rPr lang="en-US" sz="1400" b="1" i="1" smtClean="0">
+                                  <a:latin typeface="Cambria Math" panose="02040503050406030204" pitchFamily="18" charset="0"/>
+                                  <a:sym typeface="Wingdings" panose="05000000000000000000" pitchFamily="2" charset="2"/>
+                                </a:rPr>
+                                <m:t>𝑹</m:t>
+                              </m:r>
+                            </m:e>
+                            <m:sub>
+                              <m:r>
+                                <a:rPr lang="en-US" sz="1400" b="0" i="1" smtClean="0">
+                                  <a:latin typeface="Cambria Math" panose="02040503050406030204" pitchFamily="18" charset="0"/>
+                                  <a:sym typeface="Wingdings" panose="05000000000000000000" pitchFamily="2" charset="2"/>
+                                </a:rPr>
+                                <m:t>𝑙</m:t>
+                              </m:r>
+                            </m:sub>
+                          </m:sSub>
+                        </m:sup>
+                      </m:sSup>
+                      <m:r>
+                        <a:rPr lang="en-US" sz="1400" b="0" i="1" smtClean="0">
+                          <a:latin typeface="Cambria Math" panose="02040503050406030204" pitchFamily="18" charset="0"/>
+                          <a:sym typeface="Wingdings" panose="05000000000000000000" pitchFamily="2" charset="2"/>
+                        </a:rPr>
+                        <m:t>)</m:t>
+                      </m:r>
+                    </m:oMath>
+                  </m:oMathPara>
+                </a14:m>
+                <a:endParaRPr lang="en-GB" sz="1400" dirty="0">
+                  <a:latin typeface="Palatino" pitchFamily="2" charset="77"/>
+                  <a:ea typeface="Palatino" pitchFamily="2" charset="77"/>
+                </a:endParaRPr>
+              </a:p>
+            </p:txBody>
+          </p:sp>
+        </mc:Choice>
+        <mc:Fallback>
+          <p:sp>
+            <p:nvSpPr>
+              <p:cNvPr id="10" name="TextBox 9">
+                <a:extLst>
+                  <a:ext uri="{FF2B5EF4-FFF2-40B4-BE49-F238E27FC236}">
+                    <a16:creationId xmlns:a16="http://schemas.microsoft.com/office/drawing/2014/main" id="{186726DA-291B-5A30-A8B8-C6B8FCA0017A}"/>
+                  </a:ext>
+                </a:extLst>
+              </p:cNvPr>
+              <p:cNvSpPr txBox="1">
+                <a:spLocks noRot="1" noChangeAspect="1" noMove="1" noResize="1" noEditPoints="1" noAdjustHandles="1" noChangeArrowheads="1" noChangeShapeType="1" noTextEdit="1"/>
+              </p:cNvSpPr>
+              <p:nvPr/>
+            </p:nvSpPr>
+            <p:spPr>
+              <a:xfrm>
+                <a:off x="0" y="5662623"/>
+                <a:ext cx="3211823" cy="314702"/>
+              </a:xfrm>
+              <a:prstGeom prst="rect">
+                <a:avLst/>
+              </a:prstGeom>
+              <a:blipFill>
+                <a:blip r:embed="rId3"/>
+                <a:stretch>
+                  <a:fillRect b="-7692"/>
+                </a:stretch>
+              </a:blipFill>
+            </p:spPr>
+            <p:txBody>
+              <a:bodyPr/>
+              <a:lstStyle/>
+              <a:p>
+                <a:r>
+                  <a:rPr lang="en-GB">
+                    <a:noFill/>
+                  </a:rPr>
+                  <a:t> </a:t>
+                </a:r>
+              </a:p>
+            </p:txBody>
+          </p:sp>
+        </mc:Fallback>
+      </mc:AlternateContent>
+      <mc:AlternateContent xmlns:mc="http://schemas.openxmlformats.org/markup-compatibility/2006">
+        <mc:Choice xmlns:a14="http://schemas.microsoft.com/office/drawing/2010/main" Requires="a14">
+          <p:sp>
+            <p:nvSpPr>
+              <p:cNvPr id="11" name="TextBox 10">
+                <a:extLst>
+                  <a:ext uri="{FF2B5EF4-FFF2-40B4-BE49-F238E27FC236}">
+                    <a16:creationId xmlns:a16="http://schemas.microsoft.com/office/drawing/2014/main" id="{452CD569-08D0-1478-62ED-6ECD1BF0652A}"/>
+                  </a:ext>
+                </a:extLst>
+              </p:cNvPr>
+              <p:cNvSpPr txBox="1"/>
+              <p:nvPr/>
+            </p:nvSpPr>
+            <p:spPr>
+              <a:xfrm>
+                <a:off x="4925875" y="4346729"/>
+                <a:ext cx="4624631" cy="1350947"/>
+              </a:xfrm>
+              <a:prstGeom prst="rect">
+                <a:avLst/>
+              </a:prstGeom>
+              <a:noFill/>
+            </p:spPr>
+            <p:txBody>
+              <a:bodyPr wrap="square" rtlCol="0">
+                <a:spAutoFit/>
+              </a:bodyPr>
+              <a:lstStyle/>
+              <a:p>
+                <a:r>
+                  <a:rPr lang="en-US" sz="2000" dirty="0">
+                    <a:latin typeface="Lato" panose="020F0502020204030203" pitchFamily="34" charset="0"/>
+                    <a:ea typeface="Lato" panose="020F0502020204030203" pitchFamily="34" charset="0"/>
+                    <a:cs typeface="Lato" panose="020F0502020204030203" pitchFamily="34" charset="0"/>
+                  </a:rPr>
+                  <a:t>If you are not in the minimum of the PES, you will get </a:t>
+                </a:r>
+                <a:r>
+                  <a:rPr lang="en-US" sz="2000" b="1" dirty="0">
+                    <a:solidFill>
+                      <a:srgbClr val="3956EB"/>
+                    </a:solidFill>
+                    <a:latin typeface="Lato" panose="020F0502020204030203" pitchFamily="34" charset="0"/>
+                    <a:ea typeface="Lato" panose="020F0502020204030203" pitchFamily="34" charset="0"/>
+                    <a:cs typeface="Lato" panose="020F0502020204030203" pitchFamily="34" charset="0"/>
+                  </a:rPr>
+                  <a:t>negative phonons frequencies</a:t>
+                </a:r>
+                <a:r>
+                  <a:rPr lang="en-US" sz="2000" dirty="0">
+                    <a:latin typeface="Lato" panose="020F0502020204030203" pitchFamily="34" charset="0"/>
+                    <a:ea typeface="Lato" panose="020F0502020204030203" pitchFamily="34" charset="0"/>
+                    <a:cs typeface="Lato" panose="020F0502020204030203" pitchFamily="34" charset="0"/>
+                  </a:rPr>
+                  <a:t> </a:t>
+                </a:r>
+              </a:p>
+              <a:p>
+                <a:r>
+                  <a:rPr lang="en-US" sz="2000" dirty="0">
+                    <a:latin typeface="Lato" panose="020F0502020204030203" pitchFamily="34" charset="0"/>
+                    <a:ea typeface="Lato" panose="020F0502020204030203" pitchFamily="34" charset="0"/>
+                    <a:cs typeface="Lato" panose="020F0502020204030203" pitchFamily="34" charset="0"/>
+                  </a:rPr>
+                  <a:t>(imaginary values of </a:t>
+                </a:r>
+                <a14:m>
+                  <m:oMath xmlns:m="http://schemas.openxmlformats.org/officeDocument/2006/math">
+                    <m:sSub>
+                      <m:sSubPr>
+                        <m:ctrlPr>
+                          <a:rPr lang="en-US" sz="2000" b="0" i="1" smtClean="0">
+                            <a:latin typeface="Cambria Math" panose="02040503050406030204" pitchFamily="18" charset="0"/>
+                            <a:ea typeface="Cambria Math" panose="02040503050406030204" pitchFamily="18" charset="0"/>
+                          </a:rPr>
+                        </m:ctrlPr>
+                      </m:sSubPr>
+                      <m:e>
+                        <m:r>
+                          <m:rPr>
+                            <m:sty m:val="p"/>
+                          </m:rPr>
+                          <a:rPr lang="el-GR" sz="2000" i="1" smtClean="0">
+                            <a:latin typeface="Cambria Math" panose="02040503050406030204" pitchFamily="18" charset="0"/>
+                            <a:ea typeface="Cambria Math" panose="02040503050406030204" pitchFamily="18" charset="0"/>
+                          </a:rPr>
+                          <m:t>ω</m:t>
+                        </m:r>
+                      </m:e>
+                      <m:sub>
+                        <m:r>
+                          <a:rPr lang="en-US" sz="2000" b="1" i="0" smtClean="0">
+                            <a:latin typeface="Cambria Math" panose="02040503050406030204" pitchFamily="18" charset="0"/>
+                            <a:ea typeface="Cambria Math" panose="02040503050406030204" pitchFamily="18" charset="0"/>
+                          </a:rPr>
+                          <m:t>𝐪</m:t>
+                        </m:r>
+                      </m:sub>
+                    </m:sSub>
+                  </m:oMath>
+                </a14:m>
+                <a:r>
+                  <a:rPr lang="en-GB" sz="2000" dirty="0">
+                    <a:latin typeface="Lato" panose="020F0502020204030203" pitchFamily="34" charset="0"/>
+                    <a:ea typeface="Lato" panose="020F0502020204030203" pitchFamily="34" charset="0"/>
+                    <a:cs typeface="Lato" panose="020F0502020204030203" pitchFamily="34" charset="0"/>
+                  </a:rPr>
+                  <a:t>)</a:t>
+                </a:r>
+              </a:p>
+            </p:txBody>
+          </p:sp>
+        </mc:Choice>
+        <mc:Fallback>
+          <p:sp>
+            <p:nvSpPr>
+              <p:cNvPr id="11" name="TextBox 10">
+                <a:extLst>
+                  <a:ext uri="{FF2B5EF4-FFF2-40B4-BE49-F238E27FC236}">
+                    <a16:creationId xmlns:a16="http://schemas.microsoft.com/office/drawing/2014/main" id="{452CD569-08D0-1478-62ED-6ECD1BF0652A}"/>
+                  </a:ext>
+                </a:extLst>
+              </p:cNvPr>
+              <p:cNvSpPr txBox="1">
+                <a:spLocks noRot="1" noChangeAspect="1" noMove="1" noResize="1" noEditPoints="1" noAdjustHandles="1" noChangeArrowheads="1" noChangeShapeType="1" noTextEdit="1"/>
+              </p:cNvSpPr>
+              <p:nvPr/>
+            </p:nvSpPr>
+            <p:spPr>
+              <a:xfrm>
+                <a:off x="4925875" y="4346729"/>
+                <a:ext cx="4624631" cy="1350947"/>
+              </a:xfrm>
+              <a:prstGeom prst="rect">
+                <a:avLst/>
+              </a:prstGeom>
+              <a:blipFill>
+                <a:blip r:embed="rId4"/>
+                <a:stretch>
+                  <a:fillRect l="-1093" t="-2804" b="-4673"/>
+                </a:stretch>
+              </a:blipFill>
+            </p:spPr>
+            <p:txBody>
+              <a:bodyPr/>
+              <a:lstStyle/>
+              <a:p>
+                <a:r>
+                  <a:rPr lang="en-GB">
+                    <a:noFill/>
+                  </a:rPr>
+                  <a:t> </a:t>
+                </a:r>
+              </a:p>
+            </p:txBody>
+          </p:sp>
+        </mc:Fallback>
+      </mc:AlternateContent>
+      <mc:AlternateContent xmlns:mc="http://schemas.openxmlformats.org/markup-compatibility/2006">
+        <mc:Choice xmlns:a14="http://schemas.microsoft.com/office/drawing/2010/main" Requires="a14">
+          <p:sp>
+            <p:nvSpPr>
+              <p:cNvPr id="13" name="TextBox 12">
+                <a:extLst>
+                  <a:ext uri="{FF2B5EF4-FFF2-40B4-BE49-F238E27FC236}">
+                    <a16:creationId xmlns:a16="http://schemas.microsoft.com/office/drawing/2014/main" id="{B332E5E4-7C02-EB84-9E06-30BA2A68582C}"/>
+                  </a:ext>
+                </a:extLst>
+              </p:cNvPr>
+              <p:cNvSpPr txBox="1"/>
+              <p:nvPr/>
+            </p:nvSpPr>
+            <p:spPr>
+              <a:xfrm>
+                <a:off x="5399305" y="2267624"/>
+                <a:ext cx="1311000" cy="490840"/>
+              </a:xfrm>
+              <a:prstGeom prst="rect">
+                <a:avLst/>
+              </a:prstGeom>
+              <a:noFill/>
+            </p:spPr>
+            <p:txBody>
+              <a:bodyPr wrap="none" lIns="0" tIns="0" rIns="0" bIns="0" rtlCol="0">
+                <a:spAutoFit/>
+              </a:bodyPr>
+              <a:lstStyle/>
+              <a:p>
+                <a:pPr>
+                  <a:lnSpc>
+                    <a:spcPct val="150000"/>
+                  </a:lnSpc>
+                </a:pPr>
+                <a14:m>
+                  <m:oMathPara xmlns:m="http://schemas.openxmlformats.org/officeDocument/2006/math">
+                    <m:oMathParaPr>
+                      <m:jc m:val="centerGroup"/>
+                    </m:oMathParaPr>
+                    <m:oMath xmlns:m="http://schemas.openxmlformats.org/officeDocument/2006/math">
+                      <m:sSub>
+                        <m:sSubPr>
+                          <m:ctrlPr>
+                            <a:rPr lang="en-US" sz="1800" i="1" smtClean="0">
+                              <a:latin typeface="Cambria Math" panose="02040503050406030204" pitchFamily="18" charset="0"/>
+                            </a:rPr>
+                          </m:ctrlPr>
+                        </m:sSubPr>
+                        <m:e>
+                          <m:acc>
+                            <m:accPr>
+                              <m:chr m:val="̃"/>
+                              <m:ctrlPr>
+                                <a:rPr lang="en-GB" sz="1800" i="1">
+                                  <a:latin typeface="Cambria Math" panose="02040503050406030204" pitchFamily="18" charset="0"/>
+                                </a:rPr>
+                              </m:ctrlPr>
+                            </m:accPr>
+                            <m:e>
+                              <m:r>
+                                <a:rPr lang="en-US" sz="1800" i="1">
+                                  <a:latin typeface="Cambria Math" panose="02040503050406030204" pitchFamily="18" charset="0"/>
+                                </a:rPr>
+                                <m:t>𝐷</m:t>
+                              </m:r>
+                            </m:e>
+                          </m:acc>
+                        </m:e>
+                        <m:sub>
+                          <m:r>
+                            <a:rPr lang="en-US" sz="1800" i="1">
+                              <a:latin typeface="Cambria Math" panose="02040503050406030204" pitchFamily="18" charset="0"/>
+                            </a:rPr>
+                            <m:t>𝑠</m:t>
+                          </m:r>
+                          <m:r>
+                            <m:rPr>
+                              <m:brk m:alnAt="7"/>
+                            </m:rPr>
+                            <a:rPr lang="en-US" sz="1800" i="1">
+                              <a:latin typeface="Cambria Math" panose="02040503050406030204" pitchFamily="18" charset="0"/>
+                            </a:rPr>
+                            <m:t>𝛼</m:t>
+                          </m:r>
+                          <m:r>
+                            <a:rPr lang="en-US" sz="1800" i="1">
+                              <a:latin typeface="Cambria Math" panose="02040503050406030204" pitchFamily="18" charset="0"/>
+                            </a:rPr>
+                            <m:t>,</m:t>
+                          </m:r>
+                          <m:sSup>
+                            <m:sSupPr>
+                              <m:ctrlPr>
+                                <a:rPr lang="en-US" sz="1800" i="1">
+                                  <a:latin typeface="Cambria Math" panose="02040503050406030204" pitchFamily="18" charset="0"/>
+                                </a:rPr>
+                              </m:ctrlPr>
+                            </m:sSupPr>
+                            <m:e>
+                              <m:r>
+                                <m:rPr>
+                                  <m:brk m:alnAt="7"/>
+                                </m:rPr>
+                                <a:rPr lang="en-US" sz="1800" i="1">
+                                  <a:latin typeface="Cambria Math" panose="02040503050406030204" pitchFamily="18" charset="0"/>
+                                </a:rPr>
+                                <m:t>𝑠</m:t>
+                              </m:r>
+                            </m:e>
+                            <m:sup>
+                              <m:r>
+                                <a:rPr lang="en-US" sz="1800" i="1">
+                                  <a:latin typeface="Cambria Math" panose="02040503050406030204" pitchFamily="18" charset="0"/>
+                                </a:rPr>
+                                <m:t>′</m:t>
+                              </m:r>
+                            </m:sup>
+                          </m:sSup>
+                          <m:r>
+                            <m:rPr>
+                              <m:brk m:alnAt="7"/>
+                            </m:rPr>
+                            <a:rPr lang="en-US" sz="1800" i="1">
+                              <a:latin typeface="Cambria Math" panose="02040503050406030204" pitchFamily="18" charset="0"/>
+                            </a:rPr>
+                            <m:t>𝛽</m:t>
+                          </m:r>
+                        </m:sub>
+                      </m:sSub>
+                      <m:d>
+                        <m:dPr>
+                          <m:ctrlPr>
+                            <a:rPr lang="en-US" sz="1800" i="1">
+                              <a:latin typeface="Cambria Math" panose="02040503050406030204" pitchFamily="18" charset="0"/>
+                            </a:rPr>
+                          </m:ctrlPr>
+                        </m:dPr>
+                        <m:e>
+                          <m:r>
+                            <a:rPr lang="en-US" sz="1800" b="1" i="1">
+                              <a:latin typeface="Cambria Math" panose="02040503050406030204" pitchFamily="18" charset="0"/>
+                            </a:rPr>
+                            <m:t>𝒒</m:t>
+                          </m:r>
+                        </m:e>
+                      </m:d>
+                      <m:r>
+                        <a:rPr lang="en-US" sz="1800" i="1">
+                          <a:latin typeface="Cambria Math" panose="02040503050406030204" pitchFamily="18" charset="0"/>
+                        </a:rPr>
+                        <m:t>=</m:t>
+                      </m:r>
+                    </m:oMath>
+                  </m:oMathPara>
+                </a14:m>
+                <a:endParaRPr lang="en-GB" sz="1800" dirty="0"/>
+              </a:p>
+            </p:txBody>
+          </p:sp>
+        </mc:Choice>
+        <mc:Fallback>
+          <p:sp>
+            <p:nvSpPr>
+              <p:cNvPr id="13" name="TextBox 12">
+                <a:extLst>
+                  <a:ext uri="{FF2B5EF4-FFF2-40B4-BE49-F238E27FC236}">
+                    <a16:creationId xmlns:a16="http://schemas.microsoft.com/office/drawing/2014/main" id="{B332E5E4-7C02-EB84-9E06-30BA2A68582C}"/>
+                  </a:ext>
+                </a:extLst>
+              </p:cNvPr>
+              <p:cNvSpPr txBox="1">
+                <a:spLocks noRot="1" noChangeAspect="1" noMove="1" noResize="1" noEditPoints="1" noAdjustHandles="1" noChangeArrowheads="1" noChangeShapeType="1" noTextEdit="1"/>
+              </p:cNvSpPr>
+              <p:nvPr/>
+            </p:nvSpPr>
+            <p:spPr>
+              <a:xfrm>
+                <a:off x="5399305" y="2267624"/>
+                <a:ext cx="1311000" cy="490840"/>
+              </a:xfrm>
+              <a:prstGeom prst="rect">
+                <a:avLst/>
+              </a:prstGeom>
+              <a:blipFill>
+                <a:blip r:embed="rId5"/>
+                <a:stretch>
+                  <a:fillRect l="-3846" r="-962" b="-7500"/>
+                </a:stretch>
+              </a:blipFill>
+            </p:spPr>
+            <p:txBody>
+              <a:bodyPr/>
+              <a:lstStyle/>
+              <a:p>
+                <a:r>
+                  <a:rPr lang="en-GB">
+                    <a:noFill/>
+                  </a:rPr>
+                  <a:t> </a:t>
+                </a:r>
+              </a:p>
+            </p:txBody>
+          </p:sp>
+        </mc:Fallback>
+      </mc:AlternateContent>
+      <p:sp>
+        <p:nvSpPr>
+          <p:cNvPr id="14" name="Rectangle 13">
+            <a:extLst>
+              <a:ext uri="{FF2B5EF4-FFF2-40B4-BE49-F238E27FC236}">
+                <a16:creationId xmlns:a16="http://schemas.microsoft.com/office/drawing/2014/main" id="{A19DCBA6-374F-DA52-6C0C-444A0FD5717F}"/>
+              </a:ext>
+            </a:extLst>
+          </p:cNvPr>
+          <p:cNvSpPr/>
+          <p:nvPr/>
+        </p:nvSpPr>
+        <p:spPr>
+          <a:xfrm>
+            <a:off x="6524622" y="3047810"/>
+            <a:ext cx="1840135" cy="806439"/>
+          </a:xfrm>
+          <a:prstGeom prst="rect">
+            <a:avLst/>
+          </a:prstGeom>
+          <a:noFill/>
+          <a:ln w="12700">
+            <a:solidFill>
+              <a:srgbClr val="F56524"/>
+            </a:solidFill>
+          </a:ln>
+        </p:spPr>
+        <p:style>
+          <a:lnRef idx="2">
+            <a:schemeClr val="accent1">
+              <a:shade val="15000"/>
+            </a:schemeClr>
+          </a:lnRef>
+          <a:fillRef idx="1">
+            <a:schemeClr val="accent1"/>
+          </a:fillRef>
+          <a:effectRef idx="0">
+            <a:schemeClr val="accent1"/>
+          </a:effectRef>
+          <a:fontRef idx="minor">
+            <a:schemeClr val="lt1"/>
+          </a:fontRef>
+        </p:style>
+        <p:txBody>
+          <a:bodyPr rtlCol="0" anchor="ctr"/>
+          <a:lstStyle/>
+          <a:p>
+            <a:pPr algn="ctr"/>
+            <a:endParaRPr lang="en-GB"/>
+          </a:p>
+        </p:txBody>
+      </p:sp>
+      <mc:AlternateContent xmlns:mc="http://schemas.openxmlformats.org/markup-compatibility/2006">
+        <mc:Choice xmlns:a14="http://schemas.microsoft.com/office/drawing/2010/main" Requires="a14">
+          <p:sp>
+            <p:nvSpPr>
+              <p:cNvPr id="15" name="TextBox 14">
+                <a:extLst>
+                  <a:ext uri="{FF2B5EF4-FFF2-40B4-BE49-F238E27FC236}">
+                    <a16:creationId xmlns:a16="http://schemas.microsoft.com/office/drawing/2014/main" id="{A649AEFE-701C-6956-760C-7DABF064ACA3}"/>
+                  </a:ext>
+                </a:extLst>
+              </p:cNvPr>
+              <p:cNvSpPr txBox="1"/>
+              <p:nvPr/>
+            </p:nvSpPr>
+            <p:spPr>
+              <a:xfrm>
+                <a:off x="4974743" y="1085690"/>
+                <a:ext cx="4444276" cy="635687"/>
+              </a:xfrm>
+              <a:prstGeom prst="rect">
+                <a:avLst/>
+              </a:prstGeom>
+              <a:noFill/>
+            </p:spPr>
+            <p:txBody>
+              <a:bodyPr wrap="square" lIns="0" tIns="0" rIns="0" bIns="0" rtlCol="0">
+                <a:spAutoFit/>
+              </a:bodyPr>
+              <a:lstStyle/>
+              <a:p>
+                <a:pPr/>
+                <a14:m>
+                  <m:oMathPara xmlns:m="http://schemas.openxmlformats.org/officeDocument/2006/math">
+                    <m:oMathParaPr>
+                      <m:jc m:val="centerGroup"/>
+                    </m:oMathParaPr>
+                    <m:oMath xmlns:m="http://schemas.openxmlformats.org/officeDocument/2006/math">
+                      <m:nary>
+                        <m:naryPr>
+                          <m:chr m:val="∑"/>
+                          <m:supHide m:val="on"/>
+                          <m:ctrlPr>
+                            <a:rPr lang="en-GB" sz="1600" i="1" smtClean="0">
+                              <a:latin typeface="Cambria Math" panose="02040503050406030204" pitchFamily="18" charset="0"/>
+                            </a:rPr>
+                          </m:ctrlPr>
+                        </m:naryPr>
+                        <m:sub>
+                          <m:sSup>
+                            <m:sSupPr>
+                              <m:ctrlPr>
+                                <a:rPr lang="en-US" sz="1600" b="0" i="1" smtClean="0">
+                                  <a:latin typeface="Cambria Math" panose="02040503050406030204" pitchFamily="18" charset="0"/>
+                                </a:rPr>
+                              </m:ctrlPr>
+                            </m:sSupPr>
+                            <m:e>
+                              <m:r>
+                                <a:rPr lang="en-US" sz="1600" b="0" i="1" smtClean="0">
+                                  <a:latin typeface="Cambria Math" panose="02040503050406030204" pitchFamily="18" charset="0"/>
+                                </a:rPr>
+                                <m:t>𝑠</m:t>
+                              </m:r>
+                            </m:e>
+                            <m:sup>
+                              <m:r>
+                                <a:rPr lang="en-US" sz="1600" b="0" i="1" smtClean="0">
+                                  <a:latin typeface="Cambria Math" panose="02040503050406030204" pitchFamily="18" charset="0"/>
+                                </a:rPr>
+                                <m:t>′</m:t>
+                              </m:r>
+                            </m:sup>
+                          </m:sSup>
+                          <m:r>
+                            <m:rPr>
+                              <m:brk m:alnAt="7"/>
+                            </m:rPr>
+                            <a:rPr lang="en-US" sz="1600" b="0" i="1" smtClean="0">
+                              <a:latin typeface="Cambria Math" panose="02040503050406030204" pitchFamily="18" charset="0"/>
+                            </a:rPr>
+                            <m:t>,</m:t>
+                          </m:r>
+                          <m:r>
+                            <a:rPr lang="en-US" sz="1600" b="0" i="1" smtClean="0">
+                              <a:latin typeface="Cambria Math" panose="02040503050406030204" pitchFamily="18" charset="0"/>
+                            </a:rPr>
+                            <m:t> </m:t>
+                          </m:r>
+                          <m:r>
+                            <a:rPr lang="en-US" sz="1600" b="0" i="1" smtClean="0">
+                              <a:latin typeface="Cambria Math" panose="02040503050406030204" pitchFamily="18" charset="0"/>
+                            </a:rPr>
+                            <m:t>𝛽</m:t>
+                          </m:r>
+                        </m:sub>
+                        <m:sup/>
+                        <m:e>
+                          <m:sSub>
+                            <m:sSubPr>
+                              <m:ctrlPr>
+                                <a:rPr lang="en-US" sz="1600" b="0" i="1" smtClean="0">
+                                  <a:latin typeface="Cambria Math" panose="02040503050406030204" pitchFamily="18" charset="0"/>
+                                </a:rPr>
+                              </m:ctrlPr>
+                            </m:sSubPr>
+                            <m:e>
+                              <m:acc>
+                                <m:accPr>
+                                  <m:chr m:val="̃"/>
+                                  <m:ctrlPr>
+                                    <a:rPr lang="en-GB" sz="1600" i="1" smtClean="0">
+                                      <a:latin typeface="Cambria Math" panose="02040503050406030204" pitchFamily="18" charset="0"/>
+                                    </a:rPr>
+                                  </m:ctrlPr>
+                                </m:accPr>
+                                <m:e>
+                                  <m:r>
+                                    <a:rPr lang="en-US" sz="1600" b="0" i="1" smtClean="0">
+                                      <a:latin typeface="Cambria Math" panose="02040503050406030204" pitchFamily="18" charset="0"/>
+                                    </a:rPr>
+                                    <m:t>𝐷</m:t>
+                                  </m:r>
+                                </m:e>
+                              </m:acc>
+                            </m:e>
+                            <m:sub>
+                              <m:r>
+                                <a:rPr lang="en-US" sz="1600" i="1">
+                                  <a:latin typeface="Cambria Math" panose="02040503050406030204" pitchFamily="18" charset="0"/>
+                                </a:rPr>
+                                <m:t>𝑠</m:t>
+                              </m:r>
+                              <m:r>
+                                <m:rPr>
+                                  <m:brk m:alnAt="7"/>
+                                </m:rPr>
+                                <a:rPr lang="en-US" sz="1600" i="1">
+                                  <a:latin typeface="Cambria Math" panose="02040503050406030204" pitchFamily="18" charset="0"/>
+                                </a:rPr>
+                                <m:t>𝛼</m:t>
+                              </m:r>
+                              <m:r>
+                                <a:rPr lang="en-US" sz="1600" b="0" i="1" smtClean="0">
+                                  <a:latin typeface="Cambria Math" panose="02040503050406030204" pitchFamily="18" charset="0"/>
+                                </a:rPr>
+                                <m:t>,</m:t>
+                              </m:r>
+                              <m:sSup>
+                                <m:sSupPr>
+                                  <m:ctrlPr>
+                                    <a:rPr lang="en-US" sz="1600" i="1">
+                                      <a:latin typeface="Cambria Math" panose="02040503050406030204" pitchFamily="18" charset="0"/>
+                                    </a:rPr>
+                                  </m:ctrlPr>
+                                </m:sSupPr>
+                                <m:e>
+                                  <m:r>
+                                    <m:rPr>
+                                      <m:brk m:alnAt="7"/>
+                                    </m:rPr>
+                                    <a:rPr lang="en-US" sz="1600" i="1">
+                                      <a:latin typeface="Cambria Math" panose="02040503050406030204" pitchFamily="18" charset="0"/>
+                                    </a:rPr>
+                                    <m:t>𝑠</m:t>
+                                  </m:r>
+                                </m:e>
+                                <m:sup>
+                                  <m:r>
+                                    <a:rPr lang="en-US" sz="1600" i="1">
+                                      <a:latin typeface="Cambria Math" panose="02040503050406030204" pitchFamily="18" charset="0"/>
+                                    </a:rPr>
+                                    <m:t>′</m:t>
+                                  </m:r>
+                                </m:sup>
+                              </m:sSup>
+                              <m:r>
+                                <m:rPr>
+                                  <m:brk m:alnAt="7"/>
+                                </m:rPr>
+                                <a:rPr lang="en-US" sz="1600" i="1">
+                                  <a:latin typeface="Cambria Math" panose="02040503050406030204" pitchFamily="18" charset="0"/>
+                                </a:rPr>
+                                <m:t>𝛽</m:t>
+                              </m:r>
+                            </m:sub>
+                          </m:sSub>
+                          <m:r>
+                            <m:rPr>
+                              <m:brk m:alnAt="7"/>
+                            </m:rPr>
+                            <a:rPr lang="en-US" sz="1600" i="1" smtClean="0">
+                              <a:latin typeface="Cambria Math" panose="02040503050406030204" pitchFamily="18" charset="0"/>
+                            </a:rPr>
+                            <m:t> </m:t>
+                          </m:r>
+                          <m:d>
+                            <m:dPr>
+                              <m:ctrlPr>
+                                <a:rPr lang="en-US" sz="1600" b="0" i="1" smtClean="0">
+                                  <a:latin typeface="Cambria Math" panose="02040503050406030204" pitchFamily="18" charset="0"/>
+                                </a:rPr>
+                              </m:ctrlPr>
+                            </m:dPr>
+                            <m:e>
+                              <m:r>
+                                <m:rPr>
+                                  <m:brk m:alnAt="7"/>
+                                </m:rPr>
+                                <a:rPr lang="en-US" sz="1600" b="1" i="1" smtClean="0">
+                                  <a:latin typeface="Cambria Math" panose="02040503050406030204" pitchFamily="18" charset="0"/>
+                                </a:rPr>
+                                <m:t>𝒒</m:t>
+                              </m:r>
+                            </m:e>
+                          </m:d>
+                          <m:sSub>
+                            <m:sSubPr>
+                              <m:ctrlPr>
+                                <a:rPr lang="en-US" sz="1600" b="0" i="1" smtClean="0">
+                                  <a:latin typeface="Cambria Math" panose="02040503050406030204" pitchFamily="18" charset="0"/>
+                                </a:rPr>
+                              </m:ctrlPr>
+                            </m:sSubPr>
+                            <m:e>
+                              <m:acc>
+                                <m:accPr>
+                                  <m:chr m:val="̃"/>
+                                  <m:ctrlPr>
+                                    <a:rPr lang="en-US" sz="1600" b="0" i="1" smtClean="0">
+                                      <a:latin typeface="Cambria Math" panose="02040503050406030204" pitchFamily="18" charset="0"/>
+                                    </a:rPr>
+                                  </m:ctrlPr>
+                                </m:accPr>
+                                <m:e>
+                                  <m:r>
+                                    <a:rPr lang="en-US" sz="1600" b="1" i="1" smtClean="0">
+                                      <a:latin typeface="Cambria Math" panose="02040503050406030204" pitchFamily="18" charset="0"/>
+                                    </a:rPr>
+                                    <m:t>𝒖</m:t>
+                                  </m:r>
+                                </m:e>
+                              </m:acc>
+                            </m:e>
+                            <m:sub>
+                              <m:r>
+                                <m:rPr>
+                                  <m:brk m:alnAt="7"/>
+                                </m:rPr>
+                                <a:rPr lang="en-US" sz="1600" b="0" i="1" smtClean="0">
+                                  <a:latin typeface="Cambria Math" panose="02040503050406030204" pitchFamily="18" charset="0"/>
+                                </a:rPr>
+                                <m:t>𝑠</m:t>
+                              </m:r>
+                              <m:r>
+                                <a:rPr lang="en-US" sz="1600" b="0" i="1" smtClean="0">
+                                  <a:latin typeface="Cambria Math" panose="02040503050406030204" pitchFamily="18" charset="0"/>
+                                </a:rPr>
+                                <m:t>′</m:t>
+                              </m:r>
+                              <m:r>
+                                <a:rPr lang="en-US" sz="1600" b="0" i="1" smtClean="0">
+                                  <a:latin typeface="Cambria Math" panose="02040503050406030204" pitchFamily="18" charset="0"/>
+                                </a:rPr>
+                                <m:t>𝛽</m:t>
+                              </m:r>
+                            </m:sub>
+                          </m:sSub>
+                          <m:d>
+                            <m:dPr>
+                              <m:ctrlPr>
+                                <a:rPr lang="en-US" sz="1600" b="0" i="1" smtClean="0">
+                                  <a:latin typeface="Cambria Math" panose="02040503050406030204" pitchFamily="18" charset="0"/>
+                                </a:rPr>
+                              </m:ctrlPr>
+                            </m:dPr>
+                            <m:e>
+                              <m:r>
+                                <m:rPr>
+                                  <m:brk m:alnAt="7"/>
+                                </m:rPr>
+                                <a:rPr lang="en-US" sz="1600" b="1" i="1" smtClean="0">
+                                  <a:latin typeface="Cambria Math" panose="02040503050406030204" pitchFamily="18" charset="0"/>
+                                </a:rPr>
+                                <m:t>𝒒</m:t>
+                              </m:r>
+                            </m:e>
+                          </m:d>
+                          <m:r>
+                            <m:rPr>
+                              <m:brk m:alnAt="7"/>
+                            </m:rPr>
+                            <a:rPr lang="en-US" sz="1600" b="0" i="1" smtClean="0">
+                              <a:latin typeface="Cambria Math" panose="02040503050406030204" pitchFamily="18" charset="0"/>
+                            </a:rPr>
+                            <m:t>=</m:t>
+                          </m:r>
+                          <m:sSubSup>
+                            <m:sSubSupPr>
+                              <m:ctrlPr>
+                                <a:rPr lang="en-US" sz="1600" b="0" i="1" smtClean="0">
+                                  <a:latin typeface="Cambria Math" panose="02040503050406030204" pitchFamily="18" charset="0"/>
+                                  <a:ea typeface="Cambria Math" panose="02040503050406030204" pitchFamily="18" charset="0"/>
+                                </a:rPr>
+                              </m:ctrlPr>
+                            </m:sSubSupPr>
+                            <m:e>
+                              <m:r>
+                                <m:rPr>
+                                  <m:brk m:alnAt="7"/>
+                                </m:rPr>
+                                <a:rPr lang="en-US" sz="1600" b="0" i="1" smtClean="0">
+                                  <a:latin typeface="Cambria Math" panose="02040503050406030204" pitchFamily="18" charset="0"/>
+                                  <a:ea typeface="Cambria Math" panose="02040503050406030204" pitchFamily="18" charset="0"/>
+                                </a:rPr>
+                                <m:t>𝜔</m:t>
+                              </m:r>
+                            </m:e>
+                            <m:sub>
+                              <m:r>
+                                <m:rPr>
+                                  <m:brk m:alnAt="7"/>
+                                </m:rPr>
+                                <a:rPr lang="en-US" sz="1600" b="1" i="1" smtClean="0">
+                                  <a:latin typeface="Cambria Math" panose="02040503050406030204" pitchFamily="18" charset="0"/>
+                                  <a:ea typeface="Cambria Math" panose="02040503050406030204" pitchFamily="18" charset="0"/>
+                                </a:rPr>
+                                <m:t>𝒒</m:t>
+                              </m:r>
+                            </m:sub>
+                            <m:sup>
+                              <m:r>
+                                <m:rPr>
+                                  <m:brk m:alnAt="7"/>
+                                </m:rPr>
+                                <a:rPr lang="en-US" sz="1600" b="0" i="1" smtClean="0">
+                                  <a:latin typeface="Cambria Math" panose="02040503050406030204" pitchFamily="18" charset="0"/>
+                                  <a:ea typeface="Cambria Math" panose="02040503050406030204" pitchFamily="18" charset="0"/>
+                                </a:rPr>
+                                <m:t>2</m:t>
+                              </m:r>
+                            </m:sup>
+                          </m:sSubSup>
+                          <m:sSub>
+                            <m:sSubPr>
+                              <m:ctrlPr>
+                                <a:rPr lang="en-US" sz="1600" i="1">
+                                  <a:latin typeface="Cambria Math" panose="02040503050406030204" pitchFamily="18" charset="0"/>
+                                </a:rPr>
+                              </m:ctrlPr>
+                            </m:sSubPr>
+                            <m:e>
+                              <m:acc>
+                                <m:accPr>
+                                  <m:chr m:val="̃"/>
+                                  <m:ctrlPr>
+                                    <a:rPr lang="en-US" sz="1600" i="1">
+                                      <a:latin typeface="Cambria Math" panose="02040503050406030204" pitchFamily="18" charset="0"/>
+                                    </a:rPr>
+                                  </m:ctrlPr>
+                                </m:accPr>
+                                <m:e>
+                                  <m:r>
+                                    <a:rPr lang="en-US" sz="1600" b="1" i="1">
+                                      <a:latin typeface="Cambria Math" panose="02040503050406030204" pitchFamily="18" charset="0"/>
+                                    </a:rPr>
+                                    <m:t>𝒖</m:t>
+                                  </m:r>
+                                </m:e>
+                              </m:acc>
+                            </m:e>
+                            <m:sub>
+                              <m:r>
+                                <m:rPr>
+                                  <m:brk m:alnAt="7"/>
+                                </m:rPr>
+                                <a:rPr lang="en-US" sz="1600" i="1">
+                                  <a:latin typeface="Cambria Math" panose="02040503050406030204" pitchFamily="18" charset="0"/>
+                                </a:rPr>
+                                <m:t>𝑠</m:t>
+                              </m:r>
+                              <m:r>
+                                <a:rPr lang="en-US" sz="1600" b="0" i="1" smtClean="0">
+                                  <a:latin typeface="Cambria Math" panose="02040503050406030204" pitchFamily="18" charset="0"/>
+                                </a:rPr>
+                                <m:t>𝛼</m:t>
+                              </m:r>
+                            </m:sub>
+                          </m:sSub>
+                          <m:d>
+                            <m:dPr>
+                              <m:ctrlPr>
+                                <a:rPr lang="en-US" sz="1600" i="1">
+                                  <a:latin typeface="Cambria Math" panose="02040503050406030204" pitchFamily="18" charset="0"/>
+                                </a:rPr>
+                              </m:ctrlPr>
+                            </m:dPr>
+                            <m:e>
+                              <m:r>
+                                <m:rPr>
+                                  <m:brk m:alnAt="7"/>
+                                </m:rPr>
+                                <a:rPr lang="en-US" sz="1600" b="1" i="1">
+                                  <a:latin typeface="Cambria Math" panose="02040503050406030204" pitchFamily="18" charset="0"/>
+                                </a:rPr>
+                                <m:t>𝒒</m:t>
+                              </m:r>
+                            </m:e>
+                          </m:d>
+                        </m:e>
+                      </m:nary>
+                    </m:oMath>
+                  </m:oMathPara>
+                </a14:m>
+                <a:endParaRPr lang="en-GB" sz="1600" dirty="0"/>
+              </a:p>
+            </p:txBody>
+          </p:sp>
+        </mc:Choice>
+        <mc:Fallback>
+          <p:sp>
+            <p:nvSpPr>
+              <p:cNvPr id="15" name="TextBox 14">
+                <a:extLst>
+                  <a:ext uri="{FF2B5EF4-FFF2-40B4-BE49-F238E27FC236}">
+                    <a16:creationId xmlns:a16="http://schemas.microsoft.com/office/drawing/2014/main" id="{A649AEFE-701C-6956-760C-7DABF064ACA3}"/>
+                  </a:ext>
+                </a:extLst>
+              </p:cNvPr>
+              <p:cNvSpPr txBox="1">
+                <a:spLocks noRot="1" noChangeAspect="1" noMove="1" noResize="1" noEditPoints="1" noAdjustHandles="1" noChangeArrowheads="1" noChangeShapeType="1" noTextEdit="1"/>
+              </p:cNvSpPr>
+              <p:nvPr/>
+            </p:nvSpPr>
+            <p:spPr>
+              <a:xfrm>
+                <a:off x="4974743" y="1085690"/>
+                <a:ext cx="4444276" cy="635687"/>
+              </a:xfrm>
+              <a:prstGeom prst="rect">
+                <a:avLst/>
+              </a:prstGeom>
+              <a:blipFill>
+                <a:blip r:embed="rId6"/>
+                <a:stretch>
+                  <a:fillRect l="-1709" t="-139216" b="-188235"/>
+                </a:stretch>
+              </a:blipFill>
+            </p:spPr>
+            <p:txBody>
+              <a:bodyPr/>
+              <a:lstStyle/>
+              <a:p>
+                <a:r>
+                  <a:rPr lang="en-GB">
+                    <a:noFill/>
+                  </a:rPr>
+                  <a:t> </a:t>
+                </a:r>
+              </a:p>
+            </p:txBody>
+          </p:sp>
+        </mc:Fallback>
+      </mc:AlternateContent>
+      <p:sp>
+        <p:nvSpPr>
+          <p:cNvPr id="16" name="TextBox 15">
+            <a:extLst>
+              <a:ext uri="{FF2B5EF4-FFF2-40B4-BE49-F238E27FC236}">
+                <a16:creationId xmlns:a16="http://schemas.microsoft.com/office/drawing/2014/main" id="{C6B6912F-F6D4-B646-8C54-288178611CE3}"/>
+              </a:ext>
+            </a:extLst>
+          </p:cNvPr>
+          <p:cNvSpPr txBox="1"/>
+          <p:nvPr/>
+        </p:nvSpPr>
+        <p:spPr>
+          <a:xfrm>
+            <a:off x="301244" y="1146189"/>
+            <a:ext cx="5321634" cy="369332"/>
+          </a:xfrm>
+          <a:prstGeom prst="rect">
+            <a:avLst/>
+          </a:prstGeom>
+          <a:noFill/>
+        </p:spPr>
+        <p:txBody>
+          <a:bodyPr wrap="square" rtlCol="0">
+            <a:spAutoFit/>
+          </a:bodyPr>
+          <a:lstStyle/>
+          <a:p>
+            <a:r>
+              <a:rPr lang="en-US" sz="1800" dirty="0">
+                <a:latin typeface="Lato" panose="020F0502020204030203" pitchFamily="34" charset="0"/>
+                <a:ea typeface="Lato" panose="020F0502020204030203" pitchFamily="34" charset="0"/>
+                <a:cs typeface="Lato" panose="020F0502020204030203" pitchFamily="34" charset="0"/>
+              </a:rPr>
+              <a:t>Phonons are the solution of the secular equation</a:t>
+            </a:r>
+            <a:r>
+              <a:rPr lang="en-US" sz="1800" dirty="0">
+                <a:latin typeface="Palatino" pitchFamily="2" charset="77"/>
+                <a:ea typeface="Palatino" pitchFamily="2" charset="77"/>
+              </a:rPr>
+              <a:t>:</a:t>
+            </a:r>
+            <a:endParaRPr lang="en-GB" sz="1800" dirty="0">
+              <a:latin typeface="Palatino" pitchFamily="2" charset="77"/>
+              <a:ea typeface="Palatino" pitchFamily="2" charset="77"/>
+            </a:endParaRPr>
+          </a:p>
+        </p:txBody>
+      </p:sp>
+      <mc:AlternateContent xmlns:mc="http://schemas.openxmlformats.org/markup-compatibility/2006">
+        <mc:Choice xmlns:a14="http://schemas.microsoft.com/office/drawing/2010/main" Requires="a14">
+          <p:sp>
+            <p:nvSpPr>
+              <p:cNvPr id="18" name="TextBox 17">
+                <a:extLst>
+                  <a:ext uri="{FF2B5EF4-FFF2-40B4-BE49-F238E27FC236}">
+                    <a16:creationId xmlns:a16="http://schemas.microsoft.com/office/drawing/2014/main" id="{4D5C8A86-369F-5E4C-DC82-939F75FCBAC4}"/>
+                  </a:ext>
+                </a:extLst>
+              </p:cNvPr>
+              <p:cNvSpPr txBox="1"/>
+              <p:nvPr/>
+            </p:nvSpPr>
+            <p:spPr>
+              <a:xfrm>
+                <a:off x="4861661" y="3061580"/>
+                <a:ext cx="4858602" cy="818109"/>
+              </a:xfrm>
+              <a:prstGeom prst="rect">
+                <a:avLst/>
+              </a:prstGeom>
+              <a:noFill/>
+            </p:spPr>
+            <p:txBody>
+              <a:bodyPr wrap="square">
+                <a:spAutoFit/>
+              </a:bodyPr>
+              <a:lstStyle/>
+              <a:p>
+                <a:pPr/>
+                <a14:m>
+                  <m:oMathPara xmlns:m="http://schemas.openxmlformats.org/officeDocument/2006/math">
+                    <m:oMathParaPr>
+                      <m:jc m:val="centerGroup"/>
+                    </m:oMathParaPr>
+                    <m:oMath xmlns:m="http://schemas.openxmlformats.org/officeDocument/2006/math">
+                      <m:f>
+                        <m:fPr>
+                          <m:ctrlPr>
+                            <a:rPr lang="en-US" sz="1800" i="1" smtClean="0">
+                              <a:latin typeface="Cambria Math" panose="02040503050406030204" pitchFamily="18" charset="0"/>
+                            </a:rPr>
+                          </m:ctrlPr>
+                        </m:fPr>
+                        <m:num>
+                          <m:r>
+                            <a:rPr lang="en-US" sz="1800" i="1">
+                              <a:latin typeface="Cambria Math" panose="02040503050406030204" pitchFamily="18" charset="0"/>
+                            </a:rPr>
+                            <m:t>1</m:t>
+                          </m:r>
+                        </m:num>
+                        <m:den>
+                          <m:rad>
+                            <m:radPr>
+                              <m:degHide m:val="on"/>
+                              <m:ctrlPr>
+                                <a:rPr lang="en-US" sz="1800" i="1">
+                                  <a:latin typeface="Cambria Math" panose="02040503050406030204" pitchFamily="18" charset="0"/>
+                                </a:rPr>
+                              </m:ctrlPr>
+                            </m:radPr>
+                            <m:deg/>
+                            <m:e>
+                              <m:sSub>
+                                <m:sSubPr>
+                                  <m:ctrlPr>
+                                    <a:rPr lang="en-US" sz="1800" i="1">
+                                      <a:latin typeface="Cambria Math" panose="02040503050406030204" pitchFamily="18" charset="0"/>
+                                    </a:rPr>
+                                  </m:ctrlPr>
+                                </m:sSubPr>
+                                <m:e>
+                                  <m:r>
+                                    <a:rPr lang="en-US" sz="1800" i="1">
+                                      <a:latin typeface="Cambria Math" panose="02040503050406030204" pitchFamily="18" charset="0"/>
+                                    </a:rPr>
+                                    <m:t>𝑀</m:t>
+                                  </m:r>
+                                </m:e>
+                                <m:sub>
+                                  <m:r>
+                                    <a:rPr lang="en-US" sz="1800" i="1">
+                                      <a:latin typeface="Cambria Math" panose="02040503050406030204" pitchFamily="18" charset="0"/>
+                                    </a:rPr>
+                                    <m:t>𝑠</m:t>
+                                  </m:r>
+                                </m:sub>
+                              </m:sSub>
+                              <m:sSub>
+                                <m:sSubPr>
+                                  <m:ctrlPr>
+                                    <a:rPr lang="en-US" sz="1800" i="1">
+                                      <a:latin typeface="Cambria Math" panose="02040503050406030204" pitchFamily="18" charset="0"/>
+                                    </a:rPr>
+                                  </m:ctrlPr>
+                                </m:sSubPr>
+                                <m:e>
+                                  <m:r>
+                                    <a:rPr lang="en-US" sz="1800" i="1">
+                                      <a:latin typeface="Cambria Math" panose="02040503050406030204" pitchFamily="18" charset="0"/>
+                                    </a:rPr>
+                                    <m:t>𝑀</m:t>
+                                  </m:r>
+                                </m:e>
+                                <m:sub>
+                                  <m:sSup>
+                                    <m:sSupPr>
+                                      <m:ctrlPr>
+                                        <a:rPr lang="en-US" sz="1800" i="1">
+                                          <a:latin typeface="Cambria Math" panose="02040503050406030204" pitchFamily="18" charset="0"/>
+                                        </a:rPr>
+                                      </m:ctrlPr>
+                                    </m:sSupPr>
+                                    <m:e>
+                                      <m:r>
+                                        <a:rPr lang="en-US" sz="1800" i="1">
+                                          <a:latin typeface="Cambria Math" panose="02040503050406030204" pitchFamily="18" charset="0"/>
+                                        </a:rPr>
+                                        <m:t>𝑠</m:t>
+                                      </m:r>
+                                    </m:e>
+                                    <m:sup>
+                                      <m:r>
+                                        <a:rPr lang="en-US" sz="1800" i="1">
+                                          <a:latin typeface="Cambria Math" panose="02040503050406030204" pitchFamily="18" charset="0"/>
+                                        </a:rPr>
+                                        <m:t>′</m:t>
+                                      </m:r>
+                                    </m:sup>
+                                  </m:sSup>
+                                </m:sub>
+                              </m:sSub>
+                            </m:e>
+                          </m:rad>
+                        </m:den>
+                      </m:f>
+                      <m:nary>
+                        <m:naryPr>
+                          <m:chr m:val="∑"/>
+                          <m:supHide m:val="on"/>
+                          <m:ctrlPr>
+                            <a:rPr lang="en-US" sz="1800" i="1" smtClean="0">
+                              <a:latin typeface="Cambria Math" panose="02040503050406030204" pitchFamily="18" charset="0"/>
+                            </a:rPr>
+                          </m:ctrlPr>
+                        </m:naryPr>
+                        <m:sub>
+                          <m:r>
+                            <m:rPr>
+                              <m:brk m:alnAt="7"/>
+                            </m:rPr>
+                            <a:rPr lang="en-US" sz="1800" b="1" i="1" smtClean="0">
+                              <a:latin typeface="Cambria Math" panose="02040503050406030204" pitchFamily="18" charset="0"/>
+                            </a:rPr>
+                            <m:t>𝑹</m:t>
+                          </m:r>
+                          <m:r>
+                            <a:rPr lang="en-US" sz="1800" b="1" i="1" smtClean="0">
+                              <a:latin typeface="Cambria Math" panose="02040503050406030204" pitchFamily="18" charset="0"/>
+                            </a:rPr>
+                            <m:t>,</m:t>
+                          </m:r>
+                          <m:sSup>
+                            <m:sSupPr>
+                              <m:ctrlPr>
+                                <a:rPr lang="en-US" sz="1800" b="1" i="1" smtClean="0">
+                                  <a:latin typeface="Cambria Math" panose="02040503050406030204" pitchFamily="18" charset="0"/>
+                                </a:rPr>
+                              </m:ctrlPr>
+                            </m:sSupPr>
+                            <m:e>
+                              <m:r>
+                                <m:rPr>
+                                  <m:brk m:alnAt="7"/>
+                                </m:rPr>
+                                <a:rPr lang="en-US" sz="1800" b="1" i="1" smtClean="0">
+                                  <a:latin typeface="Cambria Math" panose="02040503050406030204" pitchFamily="18" charset="0"/>
+                                </a:rPr>
+                                <m:t>𝑹</m:t>
+                              </m:r>
+                            </m:e>
+                            <m:sup>
+                              <m:r>
+                                <a:rPr lang="en-US" sz="1800" b="1" i="1" smtClean="0">
+                                  <a:latin typeface="Cambria Math" panose="02040503050406030204" pitchFamily="18" charset="0"/>
+                                </a:rPr>
+                                <m:t>′</m:t>
+                              </m:r>
+                            </m:sup>
+                          </m:sSup>
+                        </m:sub>
+                        <m:sup/>
+                        <m:e>
+                          <m:f>
+                            <m:fPr>
+                              <m:ctrlPr>
+                                <a:rPr lang="it-IT" sz="1800" i="1">
+                                  <a:latin typeface="Cambria Math" panose="02040503050406030204" pitchFamily="18" charset="0"/>
+                                </a:rPr>
+                              </m:ctrlPr>
+                            </m:fPr>
+                            <m:num>
+                              <m:sSup>
+                                <m:sSupPr>
+                                  <m:ctrlPr>
+                                    <a:rPr lang="it-IT" sz="1800" i="1">
+                                      <a:latin typeface="Cambria Math" panose="02040503050406030204" pitchFamily="18" charset="0"/>
+                                    </a:rPr>
+                                  </m:ctrlPr>
+                                </m:sSupPr>
+                                <m:e>
+                                  <m:r>
+                                    <a:rPr lang="it-IT" sz="1800">
+                                      <a:latin typeface="Cambria Math" panose="02040503050406030204" pitchFamily="18" charset="0"/>
+                                    </a:rPr>
+                                    <m:t>𝜕</m:t>
+                                  </m:r>
+                                </m:e>
+                                <m:sup>
+                                  <m:r>
+                                    <a:rPr lang="it-IT" sz="1800">
+                                      <a:latin typeface="Cambria Math" panose="02040503050406030204" pitchFamily="18" charset="0"/>
+                                    </a:rPr>
+                                    <m:t>2</m:t>
+                                  </m:r>
+                                </m:sup>
+                              </m:sSup>
+                              <m:sSub>
+                                <m:sSubPr>
+                                  <m:ctrlPr>
+                                    <a:rPr lang="en-US" sz="1800" i="1">
+                                      <a:latin typeface="Cambria Math" panose="02040503050406030204" pitchFamily="18" charset="0"/>
+                                    </a:rPr>
+                                  </m:ctrlPr>
+                                </m:sSubPr>
+                                <m:e>
+                                  <m:r>
+                                    <m:rPr>
+                                      <m:sty m:val="p"/>
+                                    </m:rPr>
+                                    <a:rPr lang="en-US" sz="1800">
+                                      <a:latin typeface="Cambria Math" panose="02040503050406030204" pitchFamily="18" charset="0"/>
+                                    </a:rPr>
+                                    <m:t>E</m:t>
+                                  </m:r>
+                                </m:e>
+                                <m:sub>
+                                  <m:r>
+                                    <m:rPr>
+                                      <m:sty m:val="p"/>
+                                    </m:rPr>
+                                    <a:rPr lang="en-US" sz="1800">
+                                      <a:latin typeface="Cambria Math" panose="02040503050406030204" pitchFamily="18" charset="0"/>
+                                    </a:rPr>
+                                    <m:t>tot</m:t>
+                                  </m:r>
+                                </m:sub>
+                              </m:sSub>
+                            </m:num>
+                            <m:den>
+                              <m:r>
+                                <a:rPr lang="it-IT" sz="1800">
+                                  <a:latin typeface="Cambria Math" panose="02040503050406030204" pitchFamily="18" charset="0"/>
+                                </a:rPr>
+                                <m:t>𝜕</m:t>
+                              </m:r>
+                              <m:sSub>
+                                <m:sSubPr>
+                                  <m:ctrlPr>
+                                    <a:rPr lang="en-US" sz="1800" b="0" i="1" smtClean="0">
+                                      <a:latin typeface="Cambria Math" panose="02040503050406030204" pitchFamily="18" charset="0"/>
+                                    </a:rPr>
+                                  </m:ctrlPr>
+                                </m:sSubPr>
+                                <m:e>
+                                  <m:r>
+                                    <a:rPr lang="en-US" sz="1800" i="1">
+                                      <a:latin typeface="Cambria Math" panose="02040503050406030204" pitchFamily="18" charset="0"/>
+                                    </a:rPr>
+                                    <m:t>𝑢</m:t>
+                                  </m:r>
+                                </m:e>
+                                <m:sub>
+                                  <m:r>
+                                    <a:rPr lang="en-US" sz="1800" b="0" i="1" smtClean="0">
+                                      <a:latin typeface="Cambria Math" panose="02040503050406030204" pitchFamily="18" charset="0"/>
+                                    </a:rPr>
+                                    <m:t>𝑠</m:t>
+                                  </m:r>
+                                  <m:r>
+                                    <a:rPr lang="en-US" sz="1800" b="0" i="1" smtClean="0">
+                                      <a:latin typeface="Cambria Math" panose="02040503050406030204" pitchFamily="18" charset="0"/>
+                                    </a:rPr>
+                                    <m:t>𝛼</m:t>
+                                  </m:r>
+                                </m:sub>
+                              </m:sSub>
+                              <m:d>
+                                <m:dPr>
+                                  <m:ctrlPr>
+                                    <a:rPr lang="it-IT" sz="1800" i="1">
+                                      <a:latin typeface="Cambria Math" panose="02040503050406030204" pitchFamily="18" charset="0"/>
+                                    </a:rPr>
+                                  </m:ctrlPr>
+                                </m:dPr>
+                                <m:e>
+                                  <m:r>
+                                    <a:rPr lang="en-US" sz="1800" b="1" i="1" smtClean="0">
+                                      <a:latin typeface="Cambria Math" panose="02040503050406030204" pitchFamily="18" charset="0"/>
+                                    </a:rPr>
+                                    <m:t>𝑹</m:t>
+                                  </m:r>
+                                </m:e>
+                              </m:d>
+                              <m:r>
+                                <a:rPr lang="it-IT" sz="1800">
+                                  <a:latin typeface="Cambria Math" panose="02040503050406030204" pitchFamily="18" charset="0"/>
+                                </a:rPr>
+                                <m:t>𝜕</m:t>
+                              </m:r>
+                              <m:sSub>
+                                <m:sSubPr>
+                                  <m:ctrlPr>
+                                    <a:rPr lang="en-US" sz="1800" b="0" i="1" smtClean="0">
+                                      <a:latin typeface="Cambria Math" panose="02040503050406030204" pitchFamily="18" charset="0"/>
+                                    </a:rPr>
+                                  </m:ctrlPr>
+                                </m:sSubPr>
+                                <m:e>
+                                  <m:r>
+                                    <a:rPr lang="en-US" sz="1800" b="0" i="1" smtClean="0">
+                                      <a:latin typeface="Cambria Math" panose="02040503050406030204" pitchFamily="18" charset="0"/>
+                                    </a:rPr>
+                                    <m:t>𝑢</m:t>
+                                  </m:r>
+                                </m:e>
+                                <m:sub>
+                                  <m:sSup>
+                                    <m:sSupPr>
+                                      <m:ctrlPr>
+                                        <a:rPr lang="en-US" sz="1800" b="0" i="1" smtClean="0">
+                                          <a:latin typeface="Cambria Math" panose="02040503050406030204" pitchFamily="18" charset="0"/>
+                                        </a:rPr>
+                                      </m:ctrlPr>
+                                    </m:sSupPr>
+                                    <m:e>
+                                      <m:r>
+                                        <a:rPr lang="en-US" sz="1800" b="0" i="1" smtClean="0">
+                                          <a:latin typeface="Cambria Math" panose="02040503050406030204" pitchFamily="18" charset="0"/>
+                                        </a:rPr>
+                                        <m:t>𝑠</m:t>
+                                      </m:r>
+                                    </m:e>
+                                    <m:sup>
+                                      <m:r>
+                                        <a:rPr lang="en-US" sz="1800" b="0" i="1" smtClean="0">
+                                          <a:latin typeface="Cambria Math" panose="02040503050406030204" pitchFamily="18" charset="0"/>
+                                        </a:rPr>
+                                        <m:t>′</m:t>
+                                      </m:r>
+                                    </m:sup>
+                                  </m:sSup>
+                                  <m:r>
+                                    <a:rPr lang="en-US" sz="1800" b="0" i="1" smtClean="0">
+                                      <a:latin typeface="Cambria Math" panose="02040503050406030204" pitchFamily="18" charset="0"/>
+                                    </a:rPr>
+                                    <m:t>𝛽</m:t>
+                                  </m:r>
+                                </m:sub>
+                              </m:sSub>
+                              <m:d>
+                                <m:dPr>
+                                  <m:ctrlPr>
+                                    <a:rPr lang="it-IT" sz="1800" i="1">
+                                      <a:latin typeface="Cambria Math" panose="02040503050406030204" pitchFamily="18" charset="0"/>
+                                    </a:rPr>
+                                  </m:ctrlPr>
+                                </m:dPr>
+                                <m:e>
+                                  <m:r>
+                                    <a:rPr lang="en-US" sz="1800" b="1" i="1" smtClean="0">
+                                      <a:latin typeface="Cambria Math" panose="02040503050406030204" pitchFamily="18" charset="0"/>
+                                    </a:rPr>
+                                    <m:t>𝑹</m:t>
+                                  </m:r>
+                                  <m:r>
+                                    <a:rPr lang="en-US" sz="1800" b="1" i="1" smtClean="0">
+                                      <a:latin typeface="Cambria Math" panose="02040503050406030204" pitchFamily="18" charset="0"/>
+                                    </a:rPr>
+                                    <m:t>′</m:t>
+                                  </m:r>
+                                </m:e>
+                              </m:d>
+                            </m:den>
+                          </m:f>
+                          <m:sSup>
+                            <m:sSupPr>
+                              <m:ctrlPr>
+                                <a:rPr lang="it-IT" sz="1800" i="1" smtClean="0">
+                                  <a:latin typeface="Cambria Math" panose="02040503050406030204" pitchFamily="18" charset="0"/>
+                                </a:rPr>
+                              </m:ctrlPr>
+                            </m:sSupPr>
+                            <m:e>
+                              <m:r>
+                                <a:rPr lang="en-US" sz="1800" b="0" i="1" smtClean="0">
+                                  <a:latin typeface="Cambria Math" panose="02040503050406030204" pitchFamily="18" charset="0"/>
+                                </a:rPr>
+                                <m:t>𝑒</m:t>
+                              </m:r>
+                            </m:e>
+                            <m:sup>
+                              <m:r>
+                                <a:rPr lang="en-US" sz="1800" b="0" i="1" smtClean="0">
+                                  <a:latin typeface="Cambria Math" panose="02040503050406030204" pitchFamily="18" charset="0"/>
+                                </a:rPr>
+                                <m:t>𝑖</m:t>
+                              </m:r>
+                              <m:r>
+                                <a:rPr lang="en-US" sz="1800" b="1" i="1" smtClean="0">
+                                  <a:latin typeface="Cambria Math" panose="02040503050406030204" pitchFamily="18" charset="0"/>
+                                </a:rPr>
+                                <m:t>𝒒</m:t>
+                              </m:r>
+                              <m:r>
+                                <a:rPr lang="en-US" sz="1800" b="0" i="1" smtClean="0">
+                                  <a:latin typeface="Cambria Math" panose="02040503050406030204" pitchFamily="18" charset="0"/>
+                                </a:rPr>
+                                <m:t>(</m:t>
+                              </m:r>
+                              <m:r>
+                                <a:rPr lang="en-US" sz="1800" b="1" i="1" smtClean="0">
+                                  <a:latin typeface="Cambria Math" panose="02040503050406030204" pitchFamily="18" charset="0"/>
+                                </a:rPr>
+                                <m:t>𝑹</m:t>
+                              </m:r>
+                              <m:r>
+                                <a:rPr lang="en-US" sz="1800" b="0" i="1" smtClean="0">
+                                  <a:latin typeface="Cambria Math" panose="02040503050406030204" pitchFamily="18" charset="0"/>
+                                </a:rPr>
+                                <m:t>−</m:t>
+                              </m:r>
+                              <m:sSup>
+                                <m:sSupPr>
+                                  <m:ctrlPr>
+                                    <a:rPr lang="en-US" sz="1800" b="0" i="1" smtClean="0">
+                                      <a:latin typeface="Cambria Math" panose="02040503050406030204" pitchFamily="18" charset="0"/>
+                                    </a:rPr>
+                                  </m:ctrlPr>
+                                </m:sSupPr>
+                                <m:e>
+                                  <m:r>
+                                    <a:rPr lang="en-US" sz="1800" b="1" i="1" smtClean="0">
+                                      <a:latin typeface="Cambria Math" panose="02040503050406030204" pitchFamily="18" charset="0"/>
+                                    </a:rPr>
+                                    <m:t>𝑹</m:t>
+                                  </m:r>
+                                </m:e>
+                                <m:sup>
+                                  <m:r>
+                                    <a:rPr lang="en-US" sz="1800" b="0" i="1" smtClean="0">
+                                      <a:latin typeface="Cambria Math" panose="02040503050406030204" pitchFamily="18" charset="0"/>
+                                    </a:rPr>
+                                    <m:t>′</m:t>
+                                  </m:r>
+                                </m:sup>
+                              </m:sSup>
+                              <m:r>
+                                <a:rPr lang="en-US" sz="1800" b="0" i="1" smtClean="0">
+                                  <a:latin typeface="Cambria Math" panose="02040503050406030204" pitchFamily="18" charset="0"/>
+                                </a:rPr>
+                                <m:t>)</m:t>
+                              </m:r>
+                            </m:sup>
+                          </m:sSup>
+                        </m:e>
+                      </m:nary>
+                    </m:oMath>
+                  </m:oMathPara>
+                </a14:m>
+                <a:endParaRPr lang="en-GB" sz="1800" dirty="0"/>
+              </a:p>
+            </p:txBody>
+          </p:sp>
+        </mc:Choice>
+        <mc:Fallback>
+          <p:sp>
+            <p:nvSpPr>
+              <p:cNvPr id="18" name="TextBox 17">
+                <a:extLst>
+                  <a:ext uri="{FF2B5EF4-FFF2-40B4-BE49-F238E27FC236}">
+                    <a16:creationId xmlns:a16="http://schemas.microsoft.com/office/drawing/2014/main" id="{4D5C8A86-369F-5E4C-DC82-939F75FCBAC4}"/>
+                  </a:ext>
+                </a:extLst>
+              </p:cNvPr>
+              <p:cNvSpPr txBox="1">
+                <a:spLocks noRot="1" noChangeAspect="1" noMove="1" noResize="1" noEditPoints="1" noAdjustHandles="1" noChangeArrowheads="1" noChangeShapeType="1" noTextEdit="1"/>
+              </p:cNvSpPr>
+              <p:nvPr/>
+            </p:nvSpPr>
+            <p:spPr>
+              <a:xfrm>
+                <a:off x="4861661" y="3061580"/>
+                <a:ext cx="4858602" cy="818109"/>
+              </a:xfrm>
+              <a:prstGeom prst="rect">
+                <a:avLst/>
+              </a:prstGeom>
+              <a:blipFill>
+                <a:blip r:embed="rId7"/>
+                <a:stretch>
+                  <a:fillRect t="-109091" b="-154545"/>
+                </a:stretch>
+              </a:blipFill>
+            </p:spPr>
+            <p:txBody>
+              <a:bodyPr/>
+              <a:lstStyle/>
+              <a:p>
+                <a:r>
+                  <a:rPr lang="en-GB">
+                    <a:noFill/>
+                  </a:rPr>
+                  <a:t> </a:t>
+                </a:r>
+              </a:p>
+            </p:txBody>
+          </p:sp>
+        </mc:Fallback>
+      </mc:AlternateContent>
+    </p:spTree>
+    <p:extLst>
+      <p:ext uri="{BB962C8B-B14F-4D97-AF65-F5344CB8AC3E}">
+        <p14:creationId xmlns:p14="http://schemas.microsoft.com/office/powerpoint/2010/main" val="644676883"/>
+      </p:ext>
+    </p:extLst>
+  </p:cSld>
+  <p:clrMapOvr>
+    <a:masterClrMapping/>
+  </p:clrMapOvr>
+</p:sld>
+</file>
+
+<file path=ppt/slides/slide47.xml><?xml version="1.0" encoding="utf-8"?>
+<p:sld xmlns:a="http://schemas.openxmlformats.org/drawingml/2006/main" xmlns:r="http://schemas.openxmlformats.org/officeDocument/2006/relationships" xmlns:p="http://schemas.openxmlformats.org/presentationml/2006/main">
+  <p:cSld>
+    <p:spTree>
+      <p:nvGrpSpPr>
+        <p:cNvPr id="1" name="">
+          <a:extLst>
+            <a:ext uri="{FF2B5EF4-FFF2-40B4-BE49-F238E27FC236}">
+              <a16:creationId xmlns:a16="http://schemas.microsoft.com/office/drawing/2014/main" id="{2A05AA5F-B838-4512-D1CE-004E4B18EB70}"/>
+            </a:ext>
+          </a:extLst>
+        </p:cNvPr>
+        <p:cNvGrpSpPr/>
+        <p:nvPr/>
+      </p:nvGrpSpPr>
+      <p:grpSpPr>
+        <a:xfrm>
+          <a:off x="0" y="0"/>
+          <a:ext cx="0" cy="0"/>
+          <a:chOff x="0" y="0"/>
+          <a:chExt cx="0" cy="0"/>
+        </a:xfrm>
+      </p:grpSpPr>
+      <p:sp>
+        <p:nvSpPr>
+          <p:cNvPr id="5" name="TextBox 4">
+            <a:extLst>
+              <a:ext uri="{FF2B5EF4-FFF2-40B4-BE49-F238E27FC236}">
+                <a16:creationId xmlns:a16="http://schemas.microsoft.com/office/drawing/2014/main" id="{96065E23-692A-D00C-E9FE-19C515618F9F}"/>
+              </a:ext>
+            </a:extLst>
+          </p:cNvPr>
+          <p:cNvSpPr txBox="1"/>
+          <p:nvPr/>
+        </p:nvSpPr>
+        <p:spPr>
+          <a:xfrm>
+            <a:off x="450375" y="1103643"/>
+            <a:ext cx="8857397" cy="4939814"/>
+          </a:xfrm>
+          <a:prstGeom prst="rect">
+            <a:avLst/>
+          </a:prstGeom>
+          <a:noFill/>
+        </p:spPr>
+        <p:txBody>
+          <a:bodyPr wrap="square">
+            <a:spAutoFit/>
+          </a:bodyPr>
+          <a:lstStyle/>
+          <a:p>
+            <a:r>
+              <a:rPr lang="en-GB" sz="1800" dirty="0">
+                <a:latin typeface="Lato" panose="020F0502020204030203" pitchFamily="34" charset="0"/>
+                <a:ea typeface="Lato" panose="020F0502020204030203" pitchFamily="34" charset="0"/>
+                <a:cs typeface="Lato" panose="020F0502020204030203" pitchFamily="34" charset="0"/>
+              </a:rPr>
+              <a:t>Go to the directory with the input files:</a:t>
+            </a:r>
+          </a:p>
+          <a:p>
+            <a:endParaRPr lang="en-GB" sz="1800" dirty="0">
+              <a:latin typeface="Lato" panose="020F0502020204030203" pitchFamily="34" charset="0"/>
+              <a:ea typeface="Lato" panose="020F0502020204030203" pitchFamily="34" charset="0"/>
+              <a:cs typeface="Lato" panose="020F0502020204030203" pitchFamily="34" charset="0"/>
+            </a:endParaRPr>
+          </a:p>
+          <a:p>
+            <a:r>
+              <a:rPr lang="en-GB" sz="1800" dirty="0">
+                <a:latin typeface="Lato" panose="020F0502020204030203" pitchFamily="34" charset="0"/>
+                <a:ea typeface="Lato" panose="020F0502020204030203" pitchFamily="34" charset="0"/>
+                <a:cs typeface="Lato" panose="020F0502020204030203" pitchFamily="34" charset="0"/>
+              </a:rPr>
+              <a:t>cd ~/ASESMA2025/Day4/example6.negative.phonon/</a:t>
+            </a:r>
+          </a:p>
+          <a:p>
+            <a:endParaRPr lang="en-GB" sz="1800" dirty="0">
+              <a:latin typeface="Lato" panose="020F0502020204030203" pitchFamily="34" charset="0"/>
+              <a:ea typeface="Lato" panose="020F0502020204030203" pitchFamily="34" charset="0"/>
+              <a:cs typeface="Lato" panose="020F0502020204030203" pitchFamily="34" charset="0"/>
+            </a:endParaRPr>
+          </a:p>
+          <a:p>
+            <a:r>
+              <a:rPr lang="en-GB" sz="1800" dirty="0">
+                <a:latin typeface="Lato" panose="020F0502020204030203" pitchFamily="34" charset="0"/>
+                <a:ea typeface="Lato" panose="020F0502020204030203" pitchFamily="34" charset="0"/>
+                <a:cs typeface="Lato" panose="020F0502020204030203" pitchFamily="34" charset="0"/>
+              </a:rPr>
+              <a:t>In this directory you will find:</a:t>
+            </a:r>
+          </a:p>
+          <a:p>
+            <a:endParaRPr lang="en-GB" sz="1800" dirty="0">
+              <a:latin typeface="Lato" panose="020F0502020204030203" pitchFamily="34" charset="0"/>
+              <a:ea typeface="Lato" panose="020F0502020204030203" pitchFamily="34" charset="0"/>
+              <a:cs typeface="Lato" panose="020F0502020204030203" pitchFamily="34" charset="0"/>
+            </a:endParaRPr>
+          </a:p>
+          <a:p>
+            <a:pPr marL="285750" indent="-285750">
+              <a:lnSpc>
+                <a:spcPct val="150000"/>
+              </a:lnSpc>
+              <a:buFont typeface="Arial" panose="020B0604020202020204" pitchFamily="34" charset="0"/>
+              <a:buChar char="•"/>
+            </a:pPr>
+            <a:r>
+              <a:rPr lang="en-GB" sz="1800" i="1" dirty="0" err="1">
+                <a:latin typeface="Lato" panose="020F0502020204030203" pitchFamily="34" charset="0"/>
+                <a:ea typeface="Lato" panose="020F0502020204030203" pitchFamily="34" charset="0"/>
+                <a:cs typeface="Lato" panose="020F0502020204030203" pitchFamily="34" charset="0"/>
+              </a:rPr>
+              <a:t>README.md</a:t>
+            </a:r>
+            <a:r>
+              <a:rPr lang="en-GB" sz="1800" i="1" dirty="0">
+                <a:latin typeface="Lato" panose="020F0502020204030203" pitchFamily="34" charset="0"/>
+                <a:ea typeface="Lato" panose="020F0502020204030203" pitchFamily="34" charset="0"/>
+                <a:cs typeface="Lato" panose="020F0502020204030203" pitchFamily="34" charset="0"/>
+              </a:rPr>
+              <a:t> </a:t>
+            </a:r>
+            <a:r>
+              <a:rPr lang="en-GB" sz="1800" dirty="0">
+                <a:latin typeface="Lato" panose="020F0502020204030203" pitchFamily="34" charset="0"/>
+                <a:ea typeface="Lato" panose="020F0502020204030203" pitchFamily="34" charset="0"/>
+                <a:cs typeface="Lato" panose="020F0502020204030203" pitchFamily="34" charset="0"/>
+              </a:rPr>
+              <a:t>– File describing how to do the exercise</a:t>
+            </a:r>
+          </a:p>
+          <a:p>
+            <a:pPr marL="285750" indent="-285750">
+              <a:lnSpc>
+                <a:spcPct val="150000"/>
+              </a:lnSpc>
+              <a:buFont typeface="Arial" panose="020B0604020202020204" pitchFamily="34" charset="0"/>
+              <a:buChar char="•"/>
+            </a:pPr>
+            <a:r>
+              <a:rPr lang="en-GB" sz="1800" i="1" dirty="0" err="1">
+                <a:latin typeface="Lato" panose="020F0502020204030203" pitchFamily="34" charset="0"/>
+                <a:ea typeface="Lato" panose="020F0502020204030203" pitchFamily="34" charset="0"/>
+                <a:cs typeface="Lato" panose="020F0502020204030203" pitchFamily="34" charset="0"/>
+              </a:rPr>
+              <a:t>Si.scf.in</a:t>
+            </a:r>
+            <a:r>
+              <a:rPr lang="en-GB" sz="1800" i="1" dirty="0">
+                <a:latin typeface="Lato" panose="020F0502020204030203" pitchFamily="34" charset="0"/>
+                <a:ea typeface="Lato" panose="020F0502020204030203" pitchFamily="34" charset="0"/>
+                <a:cs typeface="Lato" panose="020F0502020204030203" pitchFamily="34" charset="0"/>
+              </a:rPr>
+              <a:t> – </a:t>
+            </a:r>
+            <a:r>
+              <a:rPr lang="en-GB" sz="1800" dirty="0">
+                <a:latin typeface="Lato" panose="020F0502020204030203" pitchFamily="34" charset="0"/>
+                <a:ea typeface="Lato" panose="020F0502020204030203" pitchFamily="34" charset="0"/>
+                <a:cs typeface="Lato" panose="020F0502020204030203" pitchFamily="34" charset="0"/>
+              </a:rPr>
+              <a:t>Input file for the SCF ground-state calculation</a:t>
+            </a:r>
+          </a:p>
+          <a:p>
+            <a:pPr marL="285750" indent="-285750">
+              <a:lnSpc>
+                <a:spcPct val="150000"/>
+              </a:lnSpc>
+              <a:buFont typeface="Arial" panose="020B0604020202020204" pitchFamily="34" charset="0"/>
+              <a:buChar char="•"/>
+            </a:pPr>
+            <a:r>
+              <a:rPr lang="en-GB" sz="1800" i="1" dirty="0" err="1">
+                <a:latin typeface="Lato" panose="020F0502020204030203" pitchFamily="34" charset="0"/>
+                <a:ea typeface="Lato" panose="020F0502020204030203" pitchFamily="34" charset="0"/>
+                <a:cs typeface="Lato" panose="020F0502020204030203" pitchFamily="34" charset="0"/>
+              </a:rPr>
+              <a:t>Si.ph.in</a:t>
+            </a:r>
+            <a:r>
+              <a:rPr lang="en-GB" sz="1800" i="1" dirty="0">
+                <a:latin typeface="Lato" panose="020F0502020204030203" pitchFamily="34" charset="0"/>
+                <a:ea typeface="Lato" panose="020F0502020204030203" pitchFamily="34" charset="0"/>
+                <a:cs typeface="Lato" panose="020F0502020204030203" pitchFamily="34" charset="0"/>
+              </a:rPr>
+              <a:t> </a:t>
+            </a:r>
+            <a:r>
+              <a:rPr lang="en-GB" sz="1800" dirty="0">
+                <a:latin typeface="Lato" panose="020F0502020204030203" pitchFamily="34" charset="0"/>
+                <a:ea typeface="Lato" panose="020F0502020204030203" pitchFamily="34" charset="0"/>
+                <a:cs typeface="Lato" panose="020F0502020204030203" pitchFamily="34" charset="0"/>
+              </a:rPr>
+              <a:t>– Input file for the phonon calculation at </a:t>
+            </a:r>
+            <a:r>
+              <a:rPr lang="el-GR" sz="1800" dirty="0">
+                <a:latin typeface="Lato" panose="020F0502020204030203" pitchFamily="34" charset="0"/>
+                <a:ea typeface="Lato" panose="020F0502020204030203" pitchFamily="34" charset="0"/>
+                <a:cs typeface="Lato" panose="020F0502020204030203" pitchFamily="34" charset="0"/>
+              </a:rPr>
+              <a:t>Γ</a:t>
+            </a:r>
+          </a:p>
+          <a:p>
+            <a:pPr marL="285750" indent="-285750">
+              <a:lnSpc>
+                <a:spcPct val="150000"/>
+              </a:lnSpc>
+              <a:buFont typeface="Arial" panose="020B0604020202020204" pitchFamily="34" charset="0"/>
+              <a:buChar char="•"/>
+            </a:pPr>
+            <a:r>
+              <a:rPr lang="en-GB" sz="1800" i="1" dirty="0">
+                <a:latin typeface="Lato" panose="020F0502020204030203" pitchFamily="34" charset="0"/>
+                <a:ea typeface="Lato" panose="020F0502020204030203" pitchFamily="34" charset="0"/>
+                <a:cs typeface="Lato" panose="020F0502020204030203" pitchFamily="34" charset="0"/>
+              </a:rPr>
+              <a:t>Si.q2r.in </a:t>
+            </a:r>
+            <a:r>
+              <a:rPr lang="en-GB" sz="1800" dirty="0">
+                <a:latin typeface="Lato" panose="020F0502020204030203" pitchFamily="34" charset="0"/>
+                <a:ea typeface="Lato" panose="020F0502020204030203" pitchFamily="34" charset="0"/>
+                <a:cs typeface="Lato" panose="020F0502020204030203" pitchFamily="34" charset="0"/>
+              </a:rPr>
+              <a:t>– Input file for calculation of Interatomic Force Constants</a:t>
+            </a:r>
+          </a:p>
+          <a:p>
+            <a:pPr marL="285750" indent="-285750">
+              <a:lnSpc>
+                <a:spcPct val="150000"/>
+              </a:lnSpc>
+              <a:buFont typeface="Arial" panose="020B0604020202020204" pitchFamily="34" charset="0"/>
+              <a:buChar char="•"/>
+            </a:pPr>
+            <a:r>
+              <a:rPr lang="en-GB" sz="1800" i="1" dirty="0" err="1">
+                <a:latin typeface="Lato" panose="020F0502020204030203" pitchFamily="34" charset="0"/>
+                <a:ea typeface="Lato" panose="020F0502020204030203" pitchFamily="34" charset="0"/>
+                <a:cs typeface="Lato" panose="020F0502020204030203" pitchFamily="34" charset="0"/>
+              </a:rPr>
+              <a:t>Si.matdyn.in</a:t>
+            </a:r>
+            <a:r>
+              <a:rPr lang="en-GB" sz="1800" i="1" dirty="0">
+                <a:latin typeface="Lato" panose="020F0502020204030203" pitchFamily="34" charset="0"/>
+                <a:ea typeface="Lato" panose="020F0502020204030203" pitchFamily="34" charset="0"/>
+                <a:cs typeface="Lato" panose="020F0502020204030203" pitchFamily="34" charset="0"/>
+              </a:rPr>
+              <a:t> </a:t>
+            </a:r>
+            <a:r>
+              <a:rPr lang="en-GB" sz="1800" dirty="0">
+                <a:latin typeface="Lato" panose="020F0502020204030203" pitchFamily="34" charset="0"/>
+                <a:ea typeface="Lato" panose="020F0502020204030203" pitchFamily="34" charset="0"/>
+                <a:cs typeface="Lato" panose="020F0502020204030203" pitchFamily="34" charset="0"/>
+              </a:rPr>
+              <a:t>– Input file for Fourier Interpolation for various q points</a:t>
+            </a:r>
+          </a:p>
+          <a:p>
+            <a:pPr marL="285750" indent="-285750">
+              <a:lnSpc>
+                <a:spcPct val="150000"/>
+              </a:lnSpc>
+              <a:buFont typeface="Arial" panose="020B0604020202020204" pitchFamily="34" charset="0"/>
+              <a:buChar char="•"/>
+            </a:pPr>
+            <a:r>
+              <a:rPr lang="en-GB" sz="1800" i="1" dirty="0" err="1">
+                <a:latin typeface="Lato" panose="020F0502020204030203" pitchFamily="34" charset="0"/>
+                <a:ea typeface="Lato" panose="020F0502020204030203" pitchFamily="34" charset="0"/>
+                <a:cs typeface="Lato" panose="020F0502020204030203" pitchFamily="34" charset="0"/>
+              </a:rPr>
+              <a:t>Si.plotband.in</a:t>
+            </a:r>
+            <a:r>
+              <a:rPr lang="en-GB" sz="1800" i="1" dirty="0">
+                <a:latin typeface="Lato" panose="020F0502020204030203" pitchFamily="34" charset="0"/>
+                <a:ea typeface="Lato" panose="020F0502020204030203" pitchFamily="34" charset="0"/>
+                <a:cs typeface="Lato" panose="020F0502020204030203" pitchFamily="34" charset="0"/>
+              </a:rPr>
+              <a:t> </a:t>
+            </a:r>
+            <a:r>
+              <a:rPr lang="en-GB" sz="1800" dirty="0">
+                <a:latin typeface="Lato" panose="020F0502020204030203" pitchFamily="34" charset="0"/>
+                <a:ea typeface="Lato" panose="020F0502020204030203" pitchFamily="34" charset="0"/>
+                <a:cs typeface="Lato" panose="020F0502020204030203" pitchFamily="34" charset="0"/>
+              </a:rPr>
+              <a:t>– Input file for plotting a phonon dispersion</a:t>
+            </a:r>
+          </a:p>
+          <a:p>
+            <a:pPr marL="285750" indent="-285750">
+              <a:lnSpc>
+                <a:spcPct val="150000"/>
+              </a:lnSpc>
+              <a:buFont typeface="Arial" panose="020B0604020202020204" pitchFamily="34" charset="0"/>
+              <a:buChar char="•"/>
+            </a:pPr>
+            <a:r>
+              <a:rPr lang="en-GB" sz="1800" b="1" i="1" dirty="0">
+                <a:latin typeface="Lato" panose="020F0502020204030203" pitchFamily="34" charset="0"/>
+                <a:ea typeface="Lato" panose="020F0502020204030203" pitchFamily="34" charset="0"/>
+                <a:cs typeface="Lato" panose="020F0502020204030203" pitchFamily="34" charset="0"/>
+              </a:rPr>
+              <a:t>reference</a:t>
+            </a:r>
+            <a:r>
+              <a:rPr lang="en-GB" sz="1800" i="1" dirty="0">
+                <a:latin typeface="Lato" panose="020F0502020204030203" pitchFamily="34" charset="0"/>
+                <a:ea typeface="Lato" panose="020F0502020204030203" pitchFamily="34" charset="0"/>
+                <a:cs typeface="Lato" panose="020F0502020204030203" pitchFamily="34" charset="0"/>
+              </a:rPr>
+              <a:t> – </a:t>
+            </a:r>
+            <a:r>
+              <a:rPr lang="en-GB" sz="1800" dirty="0">
+                <a:latin typeface="Lato" panose="020F0502020204030203" pitchFamily="34" charset="0"/>
+                <a:ea typeface="Lato" panose="020F0502020204030203" pitchFamily="34" charset="0"/>
+                <a:cs typeface="Lato" panose="020F0502020204030203" pitchFamily="34" charset="0"/>
+              </a:rPr>
+              <a:t>Directory with the reference results</a:t>
+            </a:r>
+          </a:p>
+          <a:p>
+            <a:endParaRPr lang="en-GB" sz="1800" dirty="0">
+              <a:latin typeface="Lato" panose="020F0502020204030203" pitchFamily="34" charset="0"/>
+              <a:ea typeface="Lato" panose="020F0502020204030203" pitchFamily="34" charset="0"/>
+              <a:cs typeface="Lato" panose="020F0502020204030203" pitchFamily="34" charset="0"/>
+            </a:endParaRPr>
+          </a:p>
+        </p:txBody>
+      </p:sp>
+      <p:sp>
+        <p:nvSpPr>
+          <p:cNvPr id="2" name="Title 1">
+            <a:extLst>
+              <a:ext uri="{FF2B5EF4-FFF2-40B4-BE49-F238E27FC236}">
+                <a16:creationId xmlns:a16="http://schemas.microsoft.com/office/drawing/2014/main" id="{DA18BE62-7317-79FA-D9CF-0236484D1E70}"/>
+              </a:ext>
+            </a:extLst>
+          </p:cNvPr>
+          <p:cNvSpPr>
+            <a:spLocks noGrp="1"/>
+          </p:cNvSpPr>
+          <p:nvPr>
+            <p:ph type="title"/>
+          </p:nvPr>
+        </p:nvSpPr>
+        <p:spPr>
+          <a:xfrm>
+            <a:off x="216449" y="116026"/>
+            <a:ext cx="9323336" cy="800400"/>
+          </a:xfrm>
+        </p:spPr>
+        <p:txBody>
+          <a:bodyPr>
+            <a:normAutofit fontScale="90000"/>
+          </a:bodyPr>
+          <a:lstStyle/>
+          <a:p>
+            <a:r>
+              <a:rPr lang="en-US" sz="3100" dirty="0"/>
+              <a:t>Exercise 6: </a:t>
+            </a:r>
+            <a:r>
+              <a:rPr lang="en-GB" sz="3100" dirty="0"/>
+              <a:t>Negative phonons</a:t>
+            </a:r>
+            <a:br>
+              <a:rPr lang="en-GB" sz="3600" dirty="0"/>
+            </a:br>
+            <a:endParaRPr lang="en-GB" dirty="0"/>
+          </a:p>
+        </p:txBody>
+      </p:sp>
+    </p:spTree>
+    <p:extLst>
+      <p:ext uri="{BB962C8B-B14F-4D97-AF65-F5344CB8AC3E}">
+        <p14:creationId xmlns:p14="http://schemas.microsoft.com/office/powerpoint/2010/main" val="2165838152"/>
+      </p:ext>
+    </p:extLst>
+  </p:cSld>
+  <p:clrMapOvr>
+    <a:masterClrMapping/>
+  </p:clrMapOvr>
+</p:sld>
+</file>
+
+<file path=ppt/slides/slide48.xml><?xml version="1.0" encoding="utf-8"?>
+<p:sld xmlns:a="http://schemas.openxmlformats.org/drawingml/2006/main" xmlns:r="http://schemas.openxmlformats.org/officeDocument/2006/relationships" xmlns:p="http://schemas.openxmlformats.org/presentationml/2006/main">
+  <p:cSld>
+    <p:spTree>
+      <p:nvGrpSpPr>
+        <p:cNvPr id="1" name="">
+          <a:extLst>
+            <a:ext uri="{FF2B5EF4-FFF2-40B4-BE49-F238E27FC236}">
+              <a16:creationId xmlns:a16="http://schemas.microsoft.com/office/drawing/2014/main" id="{24781A72-0F13-818C-7F2D-FF75B0D06915}"/>
+            </a:ext>
+          </a:extLst>
+        </p:cNvPr>
+        <p:cNvGrpSpPr/>
+        <p:nvPr/>
+      </p:nvGrpSpPr>
+      <p:grpSpPr>
+        <a:xfrm>
+          <a:off x="0" y="0"/>
+          <a:ext cx="0" cy="0"/>
+          <a:chOff x="0" y="0"/>
+          <a:chExt cx="0" cy="0"/>
+        </a:xfrm>
+      </p:grpSpPr>
+      <p:sp>
+        <p:nvSpPr>
+          <p:cNvPr id="20" name="Rounded Rectangle 19">
+            <a:extLst>
+              <a:ext uri="{FF2B5EF4-FFF2-40B4-BE49-F238E27FC236}">
+                <a16:creationId xmlns:a16="http://schemas.microsoft.com/office/drawing/2014/main" id="{56CDD31A-5673-2BAF-FAAE-02056DE3DDCC}"/>
+              </a:ext>
+            </a:extLst>
+          </p:cNvPr>
+          <p:cNvSpPr/>
+          <p:nvPr/>
+        </p:nvSpPr>
+        <p:spPr>
+          <a:xfrm>
+            <a:off x="2896922" y="4366748"/>
+            <a:ext cx="5357962" cy="409694"/>
+          </a:xfrm>
+          <a:prstGeom prst="roundRect">
+            <a:avLst/>
+          </a:prstGeom>
+          <a:solidFill>
+            <a:schemeClr val="bg1"/>
+          </a:solidFill>
+          <a:ln>
+            <a:noFill/>
+          </a:ln>
+          <a:effectLst>
+            <a:outerShdw blurRad="50800" dist="38100" dir="8100000" algn="tr" rotWithShape="0">
+              <a:prstClr val="black">
+                <a:alpha val="40000"/>
+              </a:prstClr>
+            </a:outerShdw>
+          </a:effectLst>
+        </p:spPr>
+        <p:style>
+          <a:lnRef idx="2">
+            <a:schemeClr val="accent1">
+              <a:shade val="15000"/>
+            </a:schemeClr>
+          </a:lnRef>
+          <a:fillRef idx="1">
+            <a:schemeClr val="accent1"/>
+          </a:fillRef>
+          <a:effectRef idx="0">
+            <a:schemeClr val="accent1"/>
+          </a:effectRef>
+          <a:fontRef idx="minor">
+            <a:schemeClr val="lt1"/>
+          </a:fontRef>
+        </p:style>
+        <p:txBody>
+          <a:bodyPr rtlCol="0" anchor="ctr"/>
+          <a:lstStyle/>
+          <a:p>
+            <a:pPr algn="ctr"/>
+            <a:endParaRPr lang="en-GB" sz="1500"/>
+          </a:p>
+        </p:txBody>
+      </p:sp>
+      <p:sp>
+        <p:nvSpPr>
+          <p:cNvPr id="6" name="Text Placeholder 2">
+            <a:extLst>
+              <a:ext uri="{FF2B5EF4-FFF2-40B4-BE49-F238E27FC236}">
+                <a16:creationId xmlns:a16="http://schemas.microsoft.com/office/drawing/2014/main" id="{1CF8E231-E47E-F258-49DF-AA74B04BCC1A}"/>
+              </a:ext>
+            </a:extLst>
+          </p:cNvPr>
+          <p:cNvSpPr>
+            <a:spLocks noGrp="1"/>
+          </p:cNvSpPr>
+          <p:nvPr>
+            <p:ph type="body" idx="1"/>
+          </p:nvPr>
+        </p:nvSpPr>
+        <p:spPr>
+          <a:xfrm>
+            <a:off x="178227" y="879822"/>
+            <a:ext cx="9138004" cy="832150"/>
+          </a:xfrm>
+        </p:spPr>
+        <p:txBody>
+          <a:bodyPr>
+            <a:normAutofit/>
+          </a:bodyPr>
+          <a:lstStyle/>
+          <a:p>
+            <a:pPr marL="101600" indent="0">
+              <a:buNone/>
+            </a:pPr>
+            <a:r>
+              <a:rPr lang="en-GB" sz="1500" b="1" dirty="0"/>
+              <a:t>Step 1:   </a:t>
+            </a:r>
+            <a:r>
+              <a:rPr lang="en-GB" sz="1500" dirty="0"/>
+              <a:t>Perform a Self-Consistent Field ground-state calculation at the equilibrium structure using the </a:t>
+            </a:r>
+            <a:r>
+              <a:rPr lang="en-GB" sz="1500" dirty="0" err="1"/>
+              <a:t>pw.x</a:t>
+            </a:r>
+            <a:r>
+              <a:rPr lang="en-GB" sz="1500" dirty="0"/>
+              <a:t> program.</a:t>
+            </a:r>
+          </a:p>
+          <a:p>
+            <a:pPr marL="101600" indent="0">
+              <a:buNone/>
+            </a:pPr>
+            <a:endParaRPr lang="en-GB" sz="1500" dirty="0"/>
+          </a:p>
+        </p:txBody>
+      </p:sp>
+      <p:sp>
+        <p:nvSpPr>
+          <p:cNvPr id="7" name="Rounded Rectangle 6">
+            <a:extLst>
+              <a:ext uri="{FF2B5EF4-FFF2-40B4-BE49-F238E27FC236}">
+                <a16:creationId xmlns:a16="http://schemas.microsoft.com/office/drawing/2014/main" id="{D8C753BA-393F-E3F1-EC60-6913E3CE05C2}"/>
+              </a:ext>
+            </a:extLst>
+          </p:cNvPr>
+          <p:cNvSpPr/>
+          <p:nvPr/>
+        </p:nvSpPr>
+        <p:spPr>
+          <a:xfrm>
+            <a:off x="3404511" y="1430638"/>
+            <a:ext cx="4087303" cy="466110"/>
+          </a:xfrm>
+          <a:prstGeom prst="roundRect">
+            <a:avLst/>
+          </a:prstGeom>
+          <a:solidFill>
+            <a:schemeClr val="bg1"/>
+          </a:solidFill>
+          <a:ln>
+            <a:noFill/>
+          </a:ln>
+          <a:effectLst>
+            <a:outerShdw blurRad="50800" dist="38100" dir="8100000" algn="tr" rotWithShape="0">
+              <a:prstClr val="black">
+                <a:alpha val="40000"/>
+              </a:prstClr>
+            </a:outerShdw>
+          </a:effectLst>
+        </p:spPr>
+        <p:style>
+          <a:lnRef idx="2">
+            <a:schemeClr val="accent1">
+              <a:shade val="15000"/>
+            </a:schemeClr>
+          </a:lnRef>
+          <a:fillRef idx="1">
+            <a:schemeClr val="accent1"/>
+          </a:fillRef>
+          <a:effectRef idx="0">
+            <a:schemeClr val="accent1"/>
+          </a:effectRef>
+          <a:fontRef idx="minor">
+            <a:schemeClr val="lt1"/>
+          </a:fontRef>
+        </p:style>
+        <p:txBody>
+          <a:bodyPr rtlCol="0" anchor="ctr"/>
+          <a:lstStyle/>
+          <a:p>
+            <a:pPr algn="ctr"/>
+            <a:endParaRPr lang="en-GB" sz="1500"/>
+          </a:p>
+        </p:txBody>
+      </p:sp>
+      <p:sp>
+        <p:nvSpPr>
+          <p:cNvPr id="8" name="TextBox 7">
+            <a:extLst>
+              <a:ext uri="{FF2B5EF4-FFF2-40B4-BE49-F238E27FC236}">
+                <a16:creationId xmlns:a16="http://schemas.microsoft.com/office/drawing/2014/main" id="{4878D6F5-3FA3-3454-6960-9CC32BC66B85}"/>
+              </a:ext>
+            </a:extLst>
+          </p:cNvPr>
+          <p:cNvSpPr txBox="1"/>
+          <p:nvPr/>
+        </p:nvSpPr>
+        <p:spPr>
+          <a:xfrm>
+            <a:off x="3404511" y="1497933"/>
+            <a:ext cx="4852687" cy="323165"/>
+          </a:xfrm>
+          <a:prstGeom prst="rect">
+            <a:avLst/>
+          </a:prstGeom>
+          <a:noFill/>
+          <a:ln>
+            <a:noFill/>
+          </a:ln>
+        </p:spPr>
+        <p:txBody>
+          <a:bodyPr wrap="square" rtlCol="0">
+            <a:spAutoFit/>
+          </a:bodyPr>
+          <a:lstStyle/>
+          <a:p>
+            <a:r>
+              <a:rPr lang="en-GB" sz="1500" dirty="0" err="1">
+                <a:latin typeface="Grandview Display" panose="020B0502040204020203" pitchFamily="34" charset="0"/>
+              </a:rPr>
+              <a:t>mpirun</a:t>
+            </a:r>
+            <a:r>
+              <a:rPr lang="en-GB" sz="1500" dirty="0">
+                <a:latin typeface="Grandview Display" panose="020B0502040204020203" pitchFamily="34" charset="0"/>
+              </a:rPr>
+              <a:t> –np 4 </a:t>
+            </a:r>
+            <a:r>
+              <a:rPr lang="en-GB" sz="1500" dirty="0" err="1">
+                <a:latin typeface="Grandview Display" panose="020B0502040204020203" pitchFamily="34" charset="0"/>
+              </a:rPr>
+              <a:t>pw.x</a:t>
+            </a:r>
+            <a:r>
+              <a:rPr lang="en-GB" sz="1500" dirty="0">
+                <a:latin typeface="Grandview Display" panose="020B0502040204020203" pitchFamily="34" charset="0"/>
+              </a:rPr>
+              <a:t> –in </a:t>
+            </a:r>
+            <a:r>
+              <a:rPr lang="en-GB" sz="1500" dirty="0" err="1">
+                <a:latin typeface="Grandview Display" panose="020B0502040204020203" pitchFamily="34" charset="0"/>
+              </a:rPr>
+              <a:t>Si.scf.in</a:t>
+            </a:r>
+            <a:r>
+              <a:rPr lang="en-GB" sz="1500" dirty="0">
+                <a:latin typeface="Grandview Display" panose="020B0502040204020203" pitchFamily="34" charset="0"/>
+              </a:rPr>
+              <a:t> &gt; </a:t>
+            </a:r>
+            <a:r>
+              <a:rPr lang="en-GB" sz="1500" dirty="0" err="1">
+                <a:latin typeface="Grandview Display" panose="020B0502040204020203" pitchFamily="34" charset="0"/>
+              </a:rPr>
+              <a:t>Si.scf.out</a:t>
+            </a:r>
+            <a:endParaRPr lang="en-GB" sz="1500" dirty="0">
+              <a:latin typeface="Grandview Display" panose="020B0502040204020203" pitchFamily="34" charset="0"/>
+            </a:endParaRPr>
+          </a:p>
+        </p:txBody>
+      </p:sp>
+      <p:sp>
+        <p:nvSpPr>
+          <p:cNvPr id="10" name="Title 1">
+            <a:extLst>
+              <a:ext uri="{FF2B5EF4-FFF2-40B4-BE49-F238E27FC236}">
+                <a16:creationId xmlns:a16="http://schemas.microsoft.com/office/drawing/2014/main" id="{F588C646-1E01-AB9C-7F4E-24B5B3AE364D}"/>
+              </a:ext>
+            </a:extLst>
+          </p:cNvPr>
+          <p:cNvSpPr>
+            <a:spLocks noGrp="1"/>
+          </p:cNvSpPr>
+          <p:nvPr>
+            <p:ph type="title"/>
+          </p:nvPr>
+        </p:nvSpPr>
+        <p:spPr>
+          <a:xfrm>
+            <a:off x="216449" y="116026"/>
+            <a:ext cx="9398606" cy="800400"/>
+          </a:xfrm>
+        </p:spPr>
+        <p:txBody>
+          <a:bodyPr>
+            <a:normAutofit fontScale="90000"/>
+          </a:bodyPr>
+          <a:lstStyle/>
+          <a:p>
+            <a:r>
+              <a:rPr lang="en-US" sz="3100" dirty="0"/>
+              <a:t>Exercise 6: </a:t>
+            </a:r>
+            <a:r>
+              <a:rPr lang="en-GB" sz="3100" dirty="0"/>
+              <a:t>Negative phonons</a:t>
+            </a:r>
+            <a:br>
+              <a:rPr lang="en-GB" sz="3600" dirty="0"/>
+            </a:br>
+            <a:endParaRPr lang="en-GB" dirty="0"/>
+          </a:p>
+        </p:txBody>
+      </p:sp>
+      <p:sp>
+        <p:nvSpPr>
+          <p:cNvPr id="11" name="Text Placeholder 2">
+            <a:extLst>
+              <a:ext uri="{FF2B5EF4-FFF2-40B4-BE49-F238E27FC236}">
+                <a16:creationId xmlns:a16="http://schemas.microsoft.com/office/drawing/2014/main" id="{7A4C680D-D0D9-C274-AE43-884F921914CA}"/>
+              </a:ext>
+            </a:extLst>
+          </p:cNvPr>
+          <p:cNvSpPr txBox="1">
+            <a:spLocks/>
+          </p:cNvSpPr>
+          <p:nvPr/>
+        </p:nvSpPr>
+        <p:spPr>
+          <a:xfrm>
+            <a:off x="216449" y="1886095"/>
+            <a:ext cx="9325586" cy="981845"/>
+          </a:xfrm>
+          <a:prstGeom prst="rect">
+            <a:avLst/>
+          </a:prstGeom>
+          <a:noFill/>
+          <a:ln>
+            <a:noFill/>
+          </a:ln>
+        </p:spPr>
         <p:txBody>
           <a:bodyPr spcFirstLastPara="1" wrap="square" lIns="103175" tIns="103175" rIns="103175" bIns="103175" anchor="t" anchorCtr="0">
             <a:normAutofit/>
           </a:bodyPr>
+          <a:lstStyle>
+            <a:defPPr marR="0" lvl="0" algn="l" rtl="0">
+              <a:lnSpc>
+                <a:spcPct val="100000"/>
+              </a:lnSpc>
+              <a:spcBef>
+                <a:spcPts val="0"/>
+              </a:spcBef>
+              <a:spcAft>
+                <a:spcPts val="0"/>
+              </a:spcAft>
+            </a:defPPr>
+            <a:lvl1pPr marL="457200" marR="0" lvl="0" indent="-355600" algn="l" rtl="0">
+              <a:lnSpc>
+                <a:spcPct val="115000"/>
+              </a:lnSpc>
+              <a:spcBef>
+                <a:spcPts val="0"/>
+              </a:spcBef>
+              <a:spcAft>
+                <a:spcPts val="0"/>
+              </a:spcAft>
+              <a:buClr>
+                <a:schemeClr val="dk2"/>
+              </a:buClr>
+              <a:buSzPts val="2000"/>
+              <a:buFont typeface="Lato"/>
+              <a:buChar char="●"/>
+              <a:defRPr sz="2000" b="0" i="0" u="none" strike="noStrike" cap="none">
+                <a:solidFill>
+                  <a:schemeClr val="dk2"/>
+                </a:solidFill>
+                <a:latin typeface="Lato"/>
+                <a:ea typeface="Lato"/>
+                <a:cs typeface="Lato"/>
+                <a:sym typeface="Lato"/>
+              </a:defRPr>
+            </a:lvl1pPr>
+            <a:lvl2pPr marL="914400" marR="0" lvl="1" indent="-330200" algn="l" rtl="0">
+              <a:lnSpc>
+                <a:spcPct val="115000"/>
+              </a:lnSpc>
+              <a:spcBef>
+                <a:spcPts val="0"/>
+              </a:spcBef>
+              <a:spcAft>
+                <a:spcPts val="0"/>
+              </a:spcAft>
+              <a:buClr>
+                <a:schemeClr val="dk2"/>
+              </a:buClr>
+              <a:buSzPts val="1600"/>
+              <a:buFont typeface="Lato"/>
+              <a:buChar char="○"/>
+              <a:defRPr sz="1600" b="0" i="0" u="none" strike="noStrike" cap="none">
+                <a:solidFill>
+                  <a:schemeClr val="dk2"/>
+                </a:solidFill>
+                <a:latin typeface="Lato"/>
+                <a:ea typeface="Lato"/>
+                <a:cs typeface="Lato"/>
+                <a:sym typeface="Lato"/>
+              </a:defRPr>
+            </a:lvl2pPr>
+            <a:lvl3pPr marL="1371600" marR="0" lvl="2" indent="-330200" algn="l" rtl="0">
+              <a:lnSpc>
+                <a:spcPct val="115000"/>
+              </a:lnSpc>
+              <a:spcBef>
+                <a:spcPts val="0"/>
+              </a:spcBef>
+              <a:spcAft>
+                <a:spcPts val="0"/>
+              </a:spcAft>
+              <a:buClr>
+                <a:schemeClr val="dk2"/>
+              </a:buClr>
+              <a:buSzPts val="1600"/>
+              <a:buFont typeface="Lato"/>
+              <a:buChar char="■"/>
+              <a:defRPr sz="1600" b="0" i="0" u="none" strike="noStrike" cap="none">
+                <a:solidFill>
+                  <a:schemeClr val="dk2"/>
+                </a:solidFill>
+                <a:latin typeface="Lato"/>
+                <a:ea typeface="Lato"/>
+                <a:cs typeface="Lato"/>
+                <a:sym typeface="Lato"/>
+              </a:defRPr>
+            </a:lvl3pPr>
+            <a:lvl4pPr marL="1828800" marR="0" lvl="3" indent="-330200" algn="l" rtl="0">
+              <a:lnSpc>
+                <a:spcPct val="115000"/>
+              </a:lnSpc>
+              <a:spcBef>
+                <a:spcPts val="0"/>
+              </a:spcBef>
+              <a:spcAft>
+                <a:spcPts val="0"/>
+              </a:spcAft>
+              <a:buClr>
+                <a:schemeClr val="dk2"/>
+              </a:buClr>
+              <a:buSzPts val="1600"/>
+              <a:buFont typeface="Lato"/>
+              <a:buChar char="●"/>
+              <a:defRPr sz="1600" b="0" i="0" u="none" strike="noStrike" cap="none">
+                <a:solidFill>
+                  <a:schemeClr val="dk2"/>
+                </a:solidFill>
+                <a:latin typeface="Lato"/>
+                <a:ea typeface="Lato"/>
+                <a:cs typeface="Lato"/>
+                <a:sym typeface="Lato"/>
+              </a:defRPr>
+            </a:lvl4pPr>
+            <a:lvl5pPr marL="2286000" marR="0" lvl="4" indent="-330200" algn="l" rtl="0">
+              <a:lnSpc>
+                <a:spcPct val="115000"/>
+              </a:lnSpc>
+              <a:spcBef>
+                <a:spcPts val="0"/>
+              </a:spcBef>
+              <a:spcAft>
+                <a:spcPts val="0"/>
+              </a:spcAft>
+              <a:buClr>
+                <a:schemeClr val="dk2"/>
+              </a:buClr>
+              <a:buSzPts val="1600"/>
+              <a:buFont typeface="Lato"/>
+              <a:buChar char="○"/>
+              <a:defRPr sz="1600" b="0" i="0" u="none" strike="noStrike" cap="none">
+                <a:solidFill>
+                  <a:schemeClr val="dk2"/>
+                </a:solidFill>
+                <a:latin typeface="Lato"/>
+                <a:ea typeface="Lato"/>
+                <a:cs typeface="Lato"/>
+                <a:sym typeface="Lato"/>
+              </a:defRPr>
+            </a:lvl5pPr>
+            <a:lvl6pPr marL="2743200" marR="0" lvl="5" indent="-330200" algn="l" rtl="0">
+              <a:lnSpc>
+                <a:spcPct val="115000"/>
+              </a:lnSpc>
+              <a:spcBef>
+                <a:spcPts val="0"/>
+              </a:spcBef>
+              <a:spcAft>
+                <a:spcPts val="0"/>
+              </a:spcAft>
+              <a:buClr>
+                <a:schemeClr val="dk2"/>
+              </a:buClr>
+              <a:buSzPts val="1600"/>
+              <a:buFont typeface="Lato"/>
+              <a:buChar char="■"/>
+              <a:defRPr sz="1600" b="0" i="0" u="none" strike="noStrike" cap="none">
+                <a:solidFill>
+                  <a:schemeClr val="dk2"/>
+                </a:solidFill>
+                <a:latin typeface="Lato"/>
+                <a:ea typeface="Lato"/>
+                <a:cs typeface="Lato"/>
+                <a:sym typeface="Lato"/>
+              </a:defRPr>
+            </a:lvl6pPr>
+            <a:lvl7pPr marL="3200400" marR="0" lvl="6" indent="-330200" algn="l" rtl="0">
+              <a:lnSpc>
+                <a:spcPct val="115000"/>
+              </a:lnSpc>
+              <a:spcBef>
+                <a:spcPts val="0"/>
+              </a:spcBef>
+              <a:spcAft>
+                <a:spcPts val="0"/>
+              </a:spcAft>
+              <a:buClr>
+                <a:schemeClr val="dk2"/>
+              </a:buClr>
+              <a:buSzPts val="1600"/>
+              <a:buFont typeface="Lato"/>
+              <a:buChar char="●"/>
+              <a:defRPr sz="1600" b="0" i="0" u="none" strike="noStrike" cap="none">
+                <a:solidFill>
+                  <a:schemeClr val="dk2"/>
+                </a:solidFill>
+                <a:latin typeface="Lato"/>
+                <a:ea typeface="Lato"/>
+                <a:cs typeface="Lato"/>
+                <a:sym typeface="Lato"/>
+              </a:defRPr>
+            </a:lvl7pPr>
+            <a:lvl8pPr marL="3657600" marR="0" lvl="7" indent="-330200" algn="l" rtl="0">
+              <a:lnSpc>
+                <a:spcPct val="115000"/>
+              </a:lnSpc>
+              <a:spcBef>
+                <a:spcPts val="0"/>
+              </a:spcBef>
+              <a:spcAft>
+                <a:spcPts val="0"/>
+              </a:spcAft>
+              <a:buClr>
+                <a:schemeClr val="dk2"/>
+              </a:buClr>
+              <a:buSzPts val="1600"/>
+              <a:buFont typeface="Lato"/>
+              <a:buChar char="○"/>
+              <a:defRPr sz="1600" b="0" i="0" u="none" strike="noStrike" cap="none">
+                <a:solidFill>
+                  <a:schemeClr val="dk2"/>
+                </a:solidFill>
+                <a:latin typeface="Lato"/>
+                <a:ea typeface="Lato"/>
+                <a:cs typeface="Lato"/>
+                <a:sym typeface="Lato"/>
+              </a:defRPr>
+            </a:lvl8pPr>
+            <a:lvl9pPr marL="4114800" marR="0" lvl="8" indent="-330200" algn="l" rtl="0">
+              <a:lnSpc>
+                <a:spcPct val="115000"/>
+              </a:lnSpc>
+              <a:spcBef>
+                <a:spcPts val="0"/>
+              </a:spcBef>
+              <a:spcAft>
+                <a:spcPts val="0"/>
+              </a:spcAft>
+              <a:buClr>
+                <a:schemeClr val="dk2"/>
+              </a:buClr>
+              <a:buSzPts val="1600"/>
+              <a:buFont typeface="Lato"/>
+              <a:buChar char="■"/>
+              <a:defRPr sz="1600" b="0" i="0" u="none" strike="noStrike" cap="none">
+                <a:solidFill>
+                  <a:schemeClr val="dk2"/>
+                </a:solidFill>
+                <a:latin typeface="Lato"/>
+                <a:ea typeface="Lato"/>
+                <a:cs typeface="Lato"/>
+                <a:sym typeface="Lato"/>
+              </a:defRPr>
+            </a:lvl9pPr>
+          </a:lstStyle>
+          <a:p>
+            <a:pPr marL="101600" indent="0">
+              <a:buFont typeface="Lato"/>
+              <a:buNone/>
+            </a:pPr>
+            <a:r>
+              <a:rPr lang="en-GB" sz="1500" b="1" dirty="0"/>
+              <a:t>Step 2:   </a:t>
+            </a:r>
+            <a:r>
+              <a:rPr lang="en-GB" sz="1500" dirty="0"/>
+              <a:t>Perform a phonon calculation on a uniform grid of q points the </a:t>
+            </a:r>
+            <a:r>
+              <a:rPr lang="en-GB" sz="1500" dirty="0" err="1"/>
+              <a:t>ph.x</a:t>
+            </a:r>
+            <a:r>
+              <a:rPr lang="en-GB" sz="1500" dirty="0"/>
+              <a:t> program (here we use 2x2x2).</a:t>
+            </a:r>
+          </a:p>
+          <a:p>
+            <a:pPr marL="101600" indent="0">
+              <a:buFont typeface="Lato"/>
+              <a:buNone/>
+            </a:pPr>
+            <a:endParaRPr lang="en-GB" sz="1500" dirty="0"/>
+          </a:p>
+        </p:txBody>
+      </p:sp>
+      <p:sp>
+        <p:nvSpPr>
+          <p:cNvPr id="12" name="Rounded Rectangle 11">
+            <a:extLst>
+              <a:ext uri="{FF2B5EF4-FFF2-40B4-BE49-F238E27FC236}">
+                <a16:creationId xmlns:a16="http://schemas.microsoft.com/office/drawing/2014/main" id="{04F04087-8E6F-D978-5605-C3CA2852EF09}"/>
+              </a:ext>
+            </a:extLst>
+          </p:cNvPr>
+          <p:cNvSpPr/>
+          <p:nvPr/>
+        </p:nvSpPr>
+        <p:spPr>
+          <a:xfrm>
+            <a:off x="3502262" y="2401830"/>
+            <a:ext cx="4209275" cy="466110"/>
+          </a:xfrm>
+          <a:prstGeom prst="roundRect">
+            <a:avLst/>
+          </a:prstGeom>
+          <a:solidFill>
+            <a:schemeClr val="bg1"/>
+          </a:solidFill>
+          <a:ln>
+            <a:noFill/>
+          </a:ln>
+          <a:effectLst>
+            <a:outerShdw blurRad="50800" dist="38100" dir="8100000" algn="tr" rotWithShape="0">
+              <a:prstClr val="black">
+                <a:alpha val="40000"/>
+              </a:prstClr>
+            </a:outerShdw>
+          </a:effectLst>
+        </p:spPr>
+        <p:style>
+          <a:lnRef idx="2">
+            <a:schemeClr val="accent1">
+              <a:shade val="15000"/>
+            </a:schemeClr>
+          </a:lnRef>
+          <a:fillRef idx="1">
+            <a:schemeClr val="accent1"/>
+          </a:fillRef>
+          <a:effectRef idx="0">
+            <a:schemeClr val="accent1"/>
+          </a:effectRef>
+          <a:fontRef idx="minor">
+            <a:schemeClr val="lt1"/>
+          </a:fontRef>
+        </p:style>
+        <p:txBody>
+          <a:bodyPr rtlCol="0" anchor="ctr"/>
           <a:lstStyle/>
           <a:p>
-            <a:pPr marL="0" lvl="0" indent="0" algn="ctr" rtl="0">
-              <a:spcBef>
-                <a:spcPts val="0"/>
-              </a:spcBef>
-              <a:spcAft>
-                <a:spcPts val="0"/>
-              </a:spcAft>
+            <a:pPr algn="ctr"/>
+            <a:endParaRPr lang="en-GB" sz="1500"/>
+          </a:p>
+        </p:txBody>
+      </p:sp>
+      <p:sp>
+        <p:nvSpPr>
+          <p:cNvPr id="13" name="TextBox 12">
+            <a:extLst>
+              <a:ext uri="{FF2B5EF4-FFF2-40B4-BE49-F238E27FC236}">
+                <a16:creationId xmlns:a16="http://schemas.microsoft.com/office/drawing/2014/main" id="{8B182027-C25E-E41C-AD2B-7AF0CF3D8498}"/>
+              </a:ext>
+            </a:extLst>
+          </p:cNvPr>
+          <p:cNvSpPr txBox="1"/>
+          <p:nvPr/>
+        </p:nvSpPr>
+        <p:spPr>
+          <a:xfrm>
+            <a:off x="3498302" y="2475592"/>
+            <a:ext cx="4087303" cy="323165"/>
+          </a:xfrm>
+          <a:prstGeom prst="rect">
+            <a:avLst/>
+          </a:prstGeom>
+          <a:noFill/>
+          <a:ln>
+            <a:noFill/>
+          </a:ln>
+        </p:spPr>
+        <p:txBody>
+          <a:bodyPr wrap="square" rtlCol="0">
+            <a:spAutoFit/>
+          </a:bodyPr>
+          <a:lstStyle/>
+          <a:p>
+            <a:r>
+              <a:rPr lang="en-GB" sz="1500" dirty="0" err="1">
+                <a:latin typeface="Grandview Display" panose="020B0502040204020203" pitchFamily="34" charset="0"/>
+              </a:rPr>
+              <a:t>mpirun</a:t>
+            </a:r>
+            <a:r>
+              <a:rPr lang="en-GB" sz="1500" dirty="0">
+                <a:latin typeface="Grandview Display" panose="020B0502040204020203" pitchFamily="34" charset="0"/>
+              </a:rPr>
+              <a:t> –np 4 </a:t>
+            </a:r>
+            <a:r>
+              <a:rPr lang="en-GB" sz="1500" dirty="0" err="1">
+                <a:latin typeface="Grandview Display" panose="020B0502040204020203" pitchFamily="34" charset="0"/>
+              </a:rPr>
+              <a:t>ph.x</a:t>
+            </a:r>
+            <a:r>
+              <a:rPr lang="en-GB" sz="1500" dirty="0">
+                <a:latin typeface="Grandview Display" panose="020B0502040204020203" pitchFamily="34" charset="0"/>
+              </a:rPr>
+              <a:t> –in </a:t>
+            </a:r>
+            <a:r>
+              <a:rPr lang="en-GB" sz="1500" dirty="0" err="1">
+                <a:latin typeface="Grandview Display" panose="020B0502040204020203" pitchFamily="34" charset="0"/>
+              </a:rPr>
+              <a:t>Si.ph.in</a:t>
+            </a:r>
+            <a:r>
+              <a:rPr lang="en-GB" sz="1500" dirty="0">
+                <a:latin typeface="Grandview Display" panose="020B0502040204020203" pitchFamily="34" charset="0"/>
+              </a:rPr>
+              <a:t> &gt; </a:t>
+            </a:r>
+            <a:r>
+              <a:rPr lang="en-GB" sz="1500" dirty="0" err="1">
+                <a:latin typeface="Grandview Display" panose="020B0502040204020203" pitchFamily="34" charset="0"/>
+              </a:rPr>
+              <a:t>Si.ph.out</a:t>
+            </a:r>
+            <a:endParaRPr lang="en-GB" sz="1500" dirty="0">
+              <a:latin typeface="Grandview Display" panose="020B0502040204020203" pitchFamily="34" charset="0"/>
+            </a:endParaRPr>
+          </a:p>
+        </p:txBody>
+      </p:sp>
+      <p:sp>
+        <p:nvSpPr>
+          <p:cNvPr id="2" name="Text Placeholder 2">
+            <a:extLst>
+              <a:ext uri="{FF2B5EF4-FFF2-40B4-BE49-F238E27FC236}">
+                <a16:creationId xmlns:a16="http://schemas.microsoft.com/office/drawing/2014/main" id="{AF8E3DEE-8424-A5E7-199B-EDE495440173}"/>
+              </a:ext>
+            </a:extLst>
+          </p:cNvPr>
+          <p:cNvSpPr txBox="1">
+            <a:spLocks/>
+          </p:cNvSpPr>
+          <p:nvPr/>
+        </p:nvSpPr>
+        <p:spPr>
+          <a:xfrm>
+            <a:off x="272019" y="2884423"/>
+            <a:ext cx="9138004" cy="465441"/>
+          </a:xfrm>
+          <a:prstGeom prst="rect">
+            <a:avLst/>
+          </a:prstGeom>
+          <a:noFill/>
+          <a:ln>
+            <a:noFill/>
+          </a:ln>
+        </p:spPr>
+        <p:txBody>
+          <a:bodyPr spcFirstLastPara="1" wrap="square" lIns="103175" tIns="103175" rIns="103175" bIns="103175" anchor="t" anchorCtr="0">
+            <a:normAutofit lnSpcReduction="10000"/>
+          </a:bodyPr>
+          <a:lstStyle>
+            <a:defPPr marR="0" lvl="0" algn="l" rtl="0">
+              <a:lnSpc>
+                <a:spcPct val="100000"/>
+              </a:lnSpc>
+              <a:spcBef>
+                <a:spcPts val="0"/>
+              </a:spcBef>
+              <a:spcAft>
+                <a:spcPts val="0"/>
+              </a:spcAft>
+            </a:defPPr>
+            <a:lvl1pPr marL="457200" marR="0" lvl="0" indent="-355600" algn="l" rtl="0">
+              <a:lnSpc>
+                <a:spcPct val="115000"/>
+              </a:lnSpc>
+              <a:spcBef>
+                <a:spcPts val="0"/>
+              </a:spcBef>
+              <a:spcAft>
+                <a:spcPts val="0"/>
+              </a:spcAft>
+              <a:buClr>
+                <a:schemeClr val="dk2"/>
+              </a:buClr>
+              <a:buSzPts val="2000"/>
+              <a:buFont typeface="Lato"/>
+              <a:buChar char="●"/>
+              <a:defRPr sz="2000" b="0" i="0" u="none" strike="noStrike" cap="none">
+                <a:solidFill>
+                  <a:schemeClr val="dk2"/>
+                </a:solidFill>
+                <a:latin typeface="Lato"/>
+                <a:ea typeface="Lato"/>
+                <a:cs typeface="Lato"/>
+                <a:sym typeface="Lato"/>
+              </a:defRPr>
+            </a:lvl1pPr>
+            <a:lvl2pPr marL="914400" marR="0" lvl="1" indent="-330200" algn="l" rtl="0">
+              <a:lnSpc>
+                <a:spcPct val="115000"/>
+              </a:lnSpc>
+              <a:spcBef>
+                <a:spcPts val="0"/>
+              </a:spcBef>
+              <a:spcAft>
+                <a:spcPts val="0"/>
+              </a:spcAft>
+              <a:buClr>
+                <a:schemeClr val="dk2"/>
+              </a:buClr>
+              <a:buSzPts val="1600"/>
+              <a:buFont typeface="Lato"/>
+              <a:buChar char="○"/>
+              <a:defRPr sz="1600" b="0" i="0" u="none" strike="noStrike" cap="none">
+                <a:solidFill>
+                  <a:schemeClr val="dk2"/>
+                </a:solidFill>
+                <a:latin typeface="Lato"/>
+                <a:ea typeface="Lato"/>
+                <a:cs typeface="Lato"/>
+                <a:sym typeface="Lato"/>
+              </a:defRPr>
+            </a:lvl2pPr>
+            <a:lvl3pPr marL="1371600" marR="0" lvl="2" indent="-330200" algn="l" rtl="0">
+              <a:lnSpc>
+                <a:spcPct val="115000"/>
+              </a:lnSpc>
+              <a:spcBef>
+                <a:spcPts val="0"/>
+              </a:spcBef>
+              <a:spcAft>
+                <a:spcPts val="0"/>
+              </a:spcAft>
+              <a:buClr>
+                <a:schemeClr val="dk2"/>
+              </a:buClr>
+              <a:buSzPts val="1600"/>
+              <a:buFont typeface="Lato"/>
+              <a:buChar char="■"/>
+              <a:defRPr sz="1600" b="0" i="0" u="none" strike="noStrike" cap="none">
+                <a:solidFill>
+                  <a:schemeClr val="dk2"/>
+                </a:solidFill>
+                <a:latin typeface="Lato"/>
+                <a:ea typeface="Lato"/>
+                <a:cs typeface="Lato"/>
+                <a:sym typeface="Lato"/>
+              </a:defRPr>
+            </a:lvl3pPr>
+            <a:lvl4pPr marL="1828800" marR="0" lvl="3" indent="-330200" algn="l" rtl="0">
+              <a:lnSpc>
+                <a:spcPct val="115000"/>
+              </a:lnSpc>
+              <a:spcBef>
+                <a:spcPts val="0"/>
+              </a:spcBef>
+              <a:spcAft>
+                <a:spcPts val="0"/>
+              </a:spcAft>
+              <a:buClr>
+                <a:schemeClr val="dk2"/>
+              </a:buClr>
+              <a:buSzPts val="1600"/>
+              <a:buFont typeface="Lato"/>
+              <a:buChar char="●"/>
+              <a:defRPr sz="1600" b="0" i="0" u="none" strike="noStrike" cap="none">
+                <a:solidFill>
+                  <a:schemeClr val="dk2"/>
+                </a:solidFill>
+                <a:latin typeface="Lato"/>
+                <a:ea typeface="Lato"/>
+                <a:cs typeface="Lato"/>
+                <a:sym typeface="Lato"/>
+              </a:defRPr>
+            </a:lvl4pPr>
+            <a:lvl5pPr marL="2286000" marR="0" lvl="4" indent="-330200" algn="l" rtl="0">
+              <a:lnSpc>
+                <a:spcPct val="115000"/>
+              </a:lnSpc>
+              <a:spcBef>
+                <a:spcPts val="0"/>
+              </a:spcBef>
+              <a:spcAft>
+                <a:spcPts val="0"/>
+              </a:spcAft>
+              <a:buClr>
+                <a:schemeClr val="dk2"/>
+              </a:buClr>
+              <a:buSzPts val="1600"/>
+              <a:buFont typeface="Lato"/>
+              <a:buChar char="○"/>
+              <a:defRPr sz="1600" b="0" i="0" u="none" strike="noStrike" cap="none">
+                <a:solidFill>
+                  <a:schemeClr val="dk2"/>
+                </a:solidFill>
+                <a:latin typeface="Lato"/>
+                <a:ea typeface="Lato"/>
+                <a:cs typeface="Lato"/>
+                <a:sym typeface="Lato"/>
+              </a:defRPr>
+            </a:lvl5pPr>
+            <a:lvl6pPr marL="2743200" marR="0" lvl="5" indent="-330200" algn="l" rtl="0">
+              <a:lnSpc>
+                <a:spcPct val="115000"/>
+              </a:lnSpc>
+              <a:spcBef>
+                <a:spcPts val="0"/>
+              </a:spcBef>
+              <a:spcAft>
+                <a:spcPts val="0"/>
+              </a:spcAft>
+              <a:buClr>
+                <a:schemeClr val="dk2"/>
+              </a:buClr>
+              <a:buSzPts val="1600"/>
+              <a:buFont typeface="Lato"/>
+              <a:buChar char="■"/>
+              <a:defRPr sz="1600" b="0" i="0" u="none" strike="noStrike" cap="none">
+                <a:solidFill>
+                  <a:schemeClr val="dk2"/>
+                </a:solidFill>
+                <a:latin typeface="Lato"/>
+                <a:ea typeface="Lato"/>
+                <a:cs typeface="Lato"/>
+                <a:sym typeface="Lato"/>
+              </a:defRPr>
+            </a:lvl6pPr>
+            <a:lvl7pPr marL="3200400" marR="0" lvl="6" indent="-330200" algn="l" rtl="0">
+              <a:lnSpc>
+                <a:spcPct val="115000"/>
+              </a:lnSpc>
+              <a:spcBef>
+                <a:spcPts val="0"/>
+              </a:spcBef>
+              <a:spcAft>
+                <a:spcPts val="0"/>
+              </a:spcAft>
+              <a:buClr>
+                <a:schemeClr val="dk2"/>
+              </a:buClr>
+              <a:buSzPts val="1600"/>
+              <a:buFont typeface="Lato"/>
+              <a:buChar char="●"/>
+              <a:defRPr sz="1600" b="0" i="0" u="none" strike="noStrike" cap="none">
+                <a:solidFill>
+                  <a:schemeClr val="dk2"/>
+                </a:solidFill>
+                <a:latin typeface="Lato"/>
+                <a:ea typeface="Lato"/>
+                <a:cs typeface="Lato"/>
+                <a:sym typeface="Lato"/>
+              </a:defRPr>
+            </a:lvl7pPr>
+            <a:lvl8pPr marL="3657600" marR="0" lvl="7" indent="-330200" algn="l" rtl="0">
+              <a:lnSpc>
+                <a:spcPct val="115000"/>
+              </a:lnSpc>
+              <a:spcBef>
+                <a:spcPts val="0"/>
+              </a:spcBef>
+              <a:spcAft>
+                <a:spcPts val="0"/>
+              </a:spcAft>
+              <a:buClr>
+                <a:schemeClr val="dk2"/>
+              </a:buClr>
+              <a:buSzPts val="1600"/>
+              <a:buFont typeface="Lato"/>
+              <a:buChar char="○"/>
+              <a:defRPr sz="1600" b="0" i="0" u="none" strike="noStrike" cap="none">
+                <a:solidFill>
+                  <a:schemeClr val="dk2"/>
+                </a:solidFill>
+                <a:latin typeface="Lato"/>
+                <a:ea typeface="Lato"/>
+                <a:cs typeface="Lato"/>
+                <a:sym typeface="Lato"/>
+              </a:defRPr>
+            </a:lvl8pPr>
+            <a:lvl9pPr marL="4114800" marR="0" lvl="8" indent="-330200" algn="l" rtl="0">
+              <a:lnSpc>
+                <a:spcPct val="115000"/>
+              </a:lnSpc>
+              <a:spcBef>
+                <a:spcPts val="0"/>
+              </a:spcBef>
+              <a:spcAft>
+                <a:spcPts val="0"/>
+              </a:spcAft>
+              <a:buClr>
+                <a:schemeClr val="dk2"/>
+              </a:buClr>
+              <a:buSzPts val="1600"/>
+              <a:buFont typeface="Lato"/>
+              <a:buChar char="■"/>
+              <a:defRPr sz="1600" b="0" i="0" u="none" strike="noStrike" cap="none">
+                <a:solidFill>
+                  <a:schemeClr val="dk2"/>
+                </a:solidFill>
+                <a:latin typeface="Lato"/>
+                <a:ea typeface="Lato"/>
+                <a:cs typeface="Lato"/>
+                <a:sym typeface="Lato"/>
+              </a:defRPr>
+            </a:lvl9pPr>
+          </a:lstStyle>
+          <a:p>
+            <a:pPr marL="101600" indent="0">
+              <a:buFont typeface="Lato"/>
               <a:buNone/>
             </a:pPr>
-            <a:endParaRPr/>
+            <a:r>
+              <a:rPr lang="en-GB" sz="1500" b="1" dirty="0"/>
+              <a:t>Step 3:   </a:t>
+            </a:r>
+            <a:r>
+              <a:rPr lang="en-GB" sz="1500" dirty="0"/>
+              <a:t>Calculation of the Interatomic Force Constants (IFC) using the q2r.x program</a:t>
+            </a:r>
+          </a:p>
+          <a:p>
+            <a:pPr marL="101600" indent="0">
+              <a:buFont typeface="Lato"/>
+              <a:buNone/>
+            </a:pPr>
+            <a:endParaRPr lang="en-GB" sz="1500" dirty="0"/>
+          </a:p>
+        </p:txBody>
+      </p:sp>
+      <p:sp>
+        <p:nvSpPr>
+          <p:cNvPr id="3" name="Rounded Rectangle 2">
+            <a:extLst>
+              <a:ext uri="{FF2B5EF4-FFF2-40B4-BE49-F238E27FC236}">
+                <a16:creationId xmlns:a16="http://schemas.microsoft.com/office/drawing/2014/main" id="{6E97B61D-FD79-0C5A-4639-CF9C2E594B28}"/>
+              </a:ext>
+            </a:extLst>
+          </p:cNvPr>
+          <p:cNvSpPr/>
+          <p:nvPr/>
+        </p:nvSpPr>
+        <p:spPr>
+          <a:xfrm>
+            <a:off x="3446843" y="3401754"/>
+            <a:ext cx="4138762" cy="465441"/>
+          </a:xfrm>
+          <a:prstGeom prst="roundRect">
+            <a:avLst/>
+          </a:prstGeom>
+          <a:solidFill>
+            <a:schemeClr val="bg1"/>
+          </a:solidFill>
+          <a:ln>
+            <a:noFill/>
+          </a:ln>
+          <a:effectLst>
+            <a:outerShdw blurRad="50800" dist="38100" dir="8100000" algn="tr" rotWithShape="0">
+              <a:prstClr val="black">
+                <a:alpha val="40000"/>
+              </a:prstClr>
+            </a:outerShdw>
+          </a:effectLst>
+        </p:spPr>
+        <p:style>
+          <a:lnRef idx="2">
+            <a:schemeClr val="accent1">
+              <a:shade val="15000"/>
+            </a:schemeClr>
+          </a:lnRef>
+          <a:fillRef idx="1">
+            <a:schemeClr val="accent1"/>
+          </a:fillRef>
+          <a:effectRef idx="0">
+            <a:schemeClr val="accent1"/>
+          </a:effectRef>
+          <a:fontRef idx="minor">
+            <a:schemeClr val="lt1"/>
+          </a:fontRef>
+        </p:style>
+        <p:txBody>
+          <a:bodyPr rtlCol="0" anchor="ctr"/>
+          <a:lstStyle/>
+          <a:p>
+            <a:pPr algn="ctr"/>
+            <a:endParaRPr lang="en-GB" sz="1500"/>
+          </a:p>
+        </p:txBody>
+      </p:sp>
+      <p:sp>
+        <p:nvSpPr>
+          <p:cNvPr id="4" name="TextBox 3">
+            <a:extLst>
+              <a:ext uri="{FF2B5EF4-FFF2-40B4-BE49-F238E27FC236}">
+                <a16:creationId xmlns:a16="http://schemas.microsoft.com/office/drawing/2014/main" id="{FC773EB1-2C04-EC86-DAA3-AB296689E3BC}"/>
+              </a:ext>
+            </a:extLst>
+          </p:cNvPr>
+          <p:cNvSpPr txBox="1"/>
+          <p:nvPr/>
+        </p:nvSpPr>
+        <p:spPr>
+          <a:xfrm>
+            <a:off x="3446842" y="3439250"/>
+            <a:ext cx="4264695" cy="323165"/>
+          </a:xfrm>
+          <a:prstGeom prst="rect">
+            <a:avLst/>
+          </a:prstGeom>
+          <a:noFill/>
+          <a:ln>
+            <a:noFill/>
+          </a:ln>
+        </p:spPr>
+        <p:txBody>
+          <a:bodyPr wrap="square" rtlCol="0">
+            <a:spAutoFit/>
+          </a:bodyPr>
+          <a:lstStyle/>
+          <a:p>
+            <a:r>
+              <a:rPr lang="en-GB" sz="1500" dirty="0" err="1">
+                <a:latin typeface="Grandview Display" panose="020B0502040204020203" pitchFamily="34" charset="0"/>
+              </a:rPr>
+              <a:t>mpirun</a:t>
+            </a:r>
+            <a:r>
+              <a:rPr lang="en-GB" sz="1500" dirty="0">
+                <a:latin typeface="Grandview Display" panose="020B0502040204020203" pitchFamily="34" charset="0"/>
+              </a:rPr>
+              <a:t> –np 4 q2r.x –in Si.q2r.in &gt; Si.q2r.out</a:t>
+            </a:r>
+          </a:p>
+        </p:txBody>
+      </p:sp>
+      <p:sp>
+        <p:nvSpPr>
+          <p:cNvPr id="5" name="Text Placeholder 2">
+            <a:extLst>
+              <a:ext uri="{FF2B5EF4-FFF2-40B4-BE49-F238E27FC236}">
+                <a16:creationId xmlns:a16="http://schemas.microsoft.com/office/drawing/2014/main" id="{01EB9D14-5D80-9D57-9AE6-3C814830CC75}"/>
+              </a:ext>
+            </a:extLst>
+          </p:cNvPr>
+          <p:cNvSpPr txBox="1">
+            <a:spLocks/>
+          </p:cNvSpPr>
+          <p:nvPr/>
+        </p:nvSpPr>
+        <p:spPr>
+          <a:xfrm>
+            <a:off x="216449" y="3810134"/>
+            <a:ext cx="9138004" cy="525776"/>
+          </a:xfrm>
+          <a:prstGeom prst="rect">
+            <a:avLst/>
+          </a:prstGeom>
+          <a:noFill/>
+          <a:ln>
+            <a:noFill/>
+          </a:ln>
+        </p:spPr>
+        <p:txBody>
+          <a:bodyPr spcFirstLastPara="1" wrap="square" lIns="103175" tIns="103175" rIns="103175" bIns="103175" anchor="t" anchorCtr="0">
+            <a:normAutofit/>
+          </a:bodyPr>
+          <a:lstStyle>
+            <a:defPPr marR="0" lvl="0" algn="l" rtl="0">
+              <a:lnSpc>
+                <a:spcPct val="100000"/>
+              </a:lnSpc>
+              <a:spcBef>
+                <a:spcPts val="0"/>
+              </a:spcBef>
+              <a:spcAft>
+                <a:spcPts val="0"/>
+              </a:spcAft>
+            </a:defPPr>
+            <a:lvl1pPr marL="457200" marR="0" lvl="0" indent="-355600" algn="l" rtl="0">
+              <a:lnSpc>
+                <a:spcPct val="115000"/>
+              </a:lnSpc>
+              <a:spcBef>
+                <a:spcPts val="0"/>
+              </a:spcBef>
+              <a:spcAft>
+                <a:spcPts val="0"/>
+              </a:spcAft>
+              <a:buClr>
+                <a:schemeClr val="dk2"/>
+              </a:buClr>
+              <a:buSzPts val="2000"/>
+              <a:buFont typeface="Lato"/>
+              <a:buChar char="●"/>
+              <a:defRPr sz="2000" b="0" i="0" u="none" strike="noStrike" cap="none">
+                <a:solidFill>
+                  <a:schemeClr val="dk2"/>
+                </a:solidFill>
+                <a:latin typeface="Lato"/>
+                <a:ea typeface="Lato"/>
+                <a:cs typeface="Lato"/>
+                <a:sym typeface="Lato"/>
+              </a:defRPr>
+            </a:lvl1pPr>
+            <a:lvl2pPr marL="914400" marR="0" lvl="1" indent="-330200" algn="l" rtl="0">
+              <a:lnSpc>
+                <a:spcPct val="115000"/>
+              </a:lnSpc>
+              <a:spcBef>
+                <a:spcPts val="0"/>
+              </a:spcBef>
+              <a:spcAft>
+                <a:spcPts val="0"/>
+              </a:spcAft>
+              <a:buClr>
+                <a:schemeClr val="dk2"/>
+              </a:buClr>
+              <a:buSzPts val="1600"/>
+              <a:buFont typeface="Lato"/>
+              <a:buChar char="○"/>
+              <a:defRPr sz="1600" b="0" i="0" u="none" strike="noStrike" cap="none">
+                <a:solidFill>
+                  <a:schemeClr val="dk2"/>
+                </a:solidFill>
+                <a:latin typeface="Lato"/>
+                <a:ea typeface="Lato"/>
+                <a:cs typeface="Lato"/>
+                <a:sym typeface="Lato"/>
+              </a:defRPr>
+            </a:lvl2pPr>
+            <a:lvl3pPr marL="1371600" marR="0" lvl="2" indent="-330200" algn="l" rtl="0">
+              <a:lnSpc>
+                <a:spcPct val="115000"/>
+              </a:lnSpc>
+              <a:spcBef>
+                <a:spcPts val="0"/>
+              </a:spcBef>
+              <a:spcAft>
+                <a:spcPts val="0"/>
+              </a:spcAft>
+              <a:buClr>
+                <a:schemeClr val="dk2"/>
+              </a:buClr>
+              <a:buSzPts val="1600"/>
+              <a:buFont typeface="Lato"/>
+              <a:buChar char="■"/>
+              <a:defRPr sz="1600" b="0" i="0" u="none" strike="noStrike" cap="none">
+                <a:solidFill>
+                  <a:schemeClr val="dk2"/>
+                </a:solidFill>
+                <a:latin typeface="Lato"/>
+                <a:ea typeface="Lato"/>
+                <a:cs typeface="Lato"/>
+                <a:sym typeface="Lato"/>
+              </a:defRPr>
+            </a:lvl3pPr>
+            <a:lvl4pPr marL="1828800" marR="0" lvl="3" indent="-330200" algn="l" rtl="0">
+              <a:lnSpc>
+                <a:spcPct val="115000"/>
+              </a:lnSpc>
+              <a:spcBef>
+                <a:spcPts val="0"/>
+              </a:spcBef>
+              <a:spcAft>
+                <a:spcPts val="0"/>
+              </a:spcAft>
+              <a:buClr>
+                <a:schemeClr val="dk2"/>
+              </a:buClr>
+              <a:buSzPts val="1600"/>
+              <a:buFont typeface="Lato"/>
+              <a:buChar char="●"/>
+              <a:defRPr sz="1600" b="0" i="0" u="none" strike="noStrike" cap="none">
+                <a:solidFill>
+                  <a:schemeClr val="dk2"/>
+                </a:solidFill>
+                <a:latin typeface="Lato"/>
+                <a:ea typeface="Lato"/>
+                <a:cs typeface="Lato"/>
+                <a:sym typeface="Lato"/>
+              </a:defRPr>
+            </a:lvl4pPr>
+            <a:lvl5pPr marL="2286000" marR="0" lvl="4" indent="-330200" algn="l" rtl="0">
+              <a:lnSpc>
+                <a:spcPct val="115000"/>
+              </a:lnSpc>
+              <a:spcBef>
+                <a:spcPts val="0"/>
+              </a:spcBef>
+              <a:spcAft>
+                <a:spcPts val="0"/>
+              </a:spcAft>
+              <a:buClr>
+                <a:schemeClr val="dk2"/>
+              </a:buClr>
+              <a:buSzPts val="1600"/>
+              <a:buFont typeface="Lato"/>
+              <a:buChar char="○"/>
+              <a:defRPr sz="1600" b="0" i="0" u="none" strike="noStrike" cap="none">
+                <a:solidFill>
+                  <a:schemeClr val="dk2"/>
+                </a:solidFill>
+                <a:latin typeface="Lato"/>
+                <a:ea typeface="Lato"/>
+                <a:cs typeface="Lato"/>
+                <a:sym typeface="Lato"/>
+              </a:defRPr>
+            </a:lvl5pPr>
+            <a:lvl6pPr marL="2743200" marR="0" lvl="5" indent="-330200" algn="l" rtl="0">
+              <a:lnSpc>
+                <a:spcPct val="115000"/>
+              </a:lnSpc>
+              <a:spcBef>
+                <a:spcPts val="0"/>
+              </a:spcBef>
+              <a:spcAft>
+                <a:spcPts val="0"/>
+              </a:spcAft>
+              <a:buClr>
+                <a:schemeClr val="dk2"/>
+              </a:buClr>
+              <a:buSzPts val="1600"/>
+              <a:buFont typeface="Lato"/>
+              <a:buChar char="■"/>
+              <a:defRPr sz="1600" b="0" i="0" u="none" strike="noStrike" cap="none">
+                <a:solidFill>
+                  <a:schemeClr val="dk2"/>
+                </a:solidFill>
+                <a:latin typeface="Lato"/>
+                <a:ea typeface="Lato"/>
+                <a:cs typeface="Lato"/>
+                <a:sym typeface="Lato"/>
+              </a:defRPr>
+            </a:lvl6pPr>
+            <a:lvl7pPr marL="3200400" marR="0" lvl="6" indent="-330200" algn="l" rtl="0">
+              <a:lnSpc>
+                <a:spcPct val="115000"/>
+              </a:lnSpc>
+              <a:spcBef>
+                <a:spcPts val="0"/>
+              </a:spcBef>
+              <a:spcAft>
+                <a:spcPts val="0"/>
+              </a:spcAft>
+              <a:buClr>
+                <a:schemeClr val="dk2"/>
+              </a:buClr>
+              <a:buSzPts val="1600"/>
+              <a:buFont typeface="Lato"/>
+              <a:buChar char="●"/>
+              <a:defRPr sz="1600" b="0" i="0" u="none" strike="noStrike" cap="none">
+                <a:solidFill>
+                  <a:schemeClr val="dk2"/>
+                </a:solidFill>
+                <a:latin typeface="Lato"/>
+                <a:ea typeface="Lato"/>
+                <a:cs typeface="Lato"/>
+                <a:sym typeface="Lato"/>
+              </a:defRPr>
+            </a:lvl7pPr>
+            <a:lvl8pPr marL="3657600" marR="0" lvl="7" indent="-330200" algn="l" rtl="0">
+              <a:lnSpc>
+                <a:spcPct val="115000"/>
+              </a:lnSpc>
+              <a:spcBef>
+                <a:spcPts val="0"/>
+              </a:spcBef>
+              <a:spcAft>
+                <a:spcPts val="0"/>
+              </a:spcAft>
+              <a:buClr>
+                <a:schemeClr val="dk2"/>
+              </a:buClr>
+              <a:buSzPts val="1600"/>
+              <a:buFont typeface="Lato"/>
+              <a:buChar char="○"/>
+              <a:defRPr sz="1600" b="0" i="0" u="none" strike="noStrike" cap="none">
+                <a:solidFill>
+                  <a:schemeClr val="dk2"/>
+                </a:solidFill>
+                <a:latin typeface="Lato"/>
+                <a:ea typeface="Lato"/>
+                <a:cs typeface="Lato"/>
+                <a:sym typeface="Lato"/>
+              </a:defRPr>
+            </a:lvl8pPr>
+            <a:lvl9pPr marL="4114800" marR="0" lvl="8" indent="-330200" algn="l" rtl="0">
+              <a:lnSpc>
+                <a:spcPct val="115000"/>
+              </a:lnSpc>
+              <a:spcBef>
+                <a:spcPts val="0"/>
+              </a:spcBef>
+              <a:spcAft>
+                <a:spcPts val="0"/>
+              </a:spcAft>
+              <a:buClr>
+                <a:schemeClr val="dk2"/>
+              </a:buClr>
+              <a:buSzPts val="1600"/>
+              <a:buFont typeface="Lato"/>
+              <a:buChar char="■"/>
+              <a:defRPr sz="1600" b="0" i="0" u="none" strike="noStrike" cap="none">
+                <a:solidFill>
+                  <a:schemeClr val="dk2"/>
+                </a:solidFill>
+                <a:latin typeface="Lato"/>
+                <a:ea typeface="Lato"/>
+                <a:cs typeface="Lato"/>
+                <a:sym typeface="Lato"/>
+              </a:defRPr>
+            </a:lvl9pPr>
+          </a:lstStyle>
+          <a:p>
+            <a:pPr marL="101600" indent="0">
+              <a:buFont typeface="Lato"/>
+              <a:buNone/>
+            </a:pPr>
+            <a:r>
+              <a:rPr lang="en-GB" sz="1500" b="1" dirty="0"/>
+              <a:t>Step 4:   </a:t>
+            </a:r>
+            <a:r>
+              <a:rPr lang="en-GB" sz="1500" dirty="0"/>
+              <a:t>Calculate phonons at generic </a:t>
+            </a:r>
+            <a:r>
+              <a:rPr lang="en-GB" sz="1500" b="1" dirty="0"/>
+              <a:t>q</a:t>
+            </a:r>
+            <a:r>
+              <a:rPr lang="en-GB" sz="1500" dirty="0"/>
+              <a:t>' points using IFC using the </a:t>
+            </a:r>
+            <a:r>
+              <a:rPr lang="en-GB" sz="1500" dirty="0" err="1"/>
+              <a:t>matdyn.x</a:t>
+            </a:r>
+            <a:r>
+              <a:rPr lang="en-GB" sz="1500" dirty="0"/>
+              <a:t> code</a:t>
+            </a:r>
+          </a:p>
+        </p:txBody>
+      </p:sp>
+      <p:sp>
+        <p:nvSpPr>
+          <p:cNvPr id="16" name="TextBox 15">
+            <a:extLst>
+              <a:ext uri="{FF2B5EF4-FFF2-40B4-BE49-F238E27FC236}">
+                <a16:creationId xmlns:a16="http://schemas.microsoft.com/office/drawing/2014/main" id="{6A34266D-4CC6-EB5C-6C6C-488F3E24725A}"/>
+              </a:ext>
+            </a:extLst>
+          </p:cNvPr>
+          <p:cNvSpPr txBox="1"/>
+          <p:nvPr/>
+        </p:nvSpPr>
+        <p:spPr>
+          <a:xfrm>
+            <a:off x="2896922" y="4437886"/>
+            <a:ext cx="5454067" cy="323165"/>
+          </a:xfrm>
+          <a:prstGeom prst="rect">
+            <a:avLst/>
+          </a:prstGeom>
+          <a:noFill/>
+          <a:ln>
+            <a:noFill/>
+          </a:ln>
+        </p:spPr>
+        <p:txBody>
+          <a:bodyPr wrap="square" rtlCol="0">
+            <a:spAutoFit/>
+          </a:bodyPr>
+          <a:lstStyle/>
+          <a:p>
+            <a:r>
+              <a:rPr lang="en-GB" sz="1500" dirty="0" err="1">
+                <a:latin typeface="Grandview Display" panose="020B0502040204020203" pitchFamily="34" charset="0"/>
+              </a:rPr>
+              <a:t>mpirun</a:t>
+            </a:r>
+            <a:r>
+              <a:rPr lang="en-GB" sz="1500" dirty="0">
+                <a:latin typeface="Grandview Display" panose="020B0502040204020203" pitchFamily="34" charset="0"/>
+              </a:rPr>
+              <a:t> –np 4 </a:t>
+            </a:r>
+            <a:r>
+              <a:rPr lang="en-GB" sz="1500" dirty="0" err="1">
+                <a:latin typeface="Grandview Display" panose="020B0502040204020203" pitchFamily="34" charset="0"/>
+              </a:rPr>
+              <a:t>matdyn.x</a:t>
+            </a:r>
+            <a:r>
+              <a:rPr lang="en-GB" sz="1500" dirty="0">
+                <a:latin typeface="Grandview Display" panose="020B0502040204020203" pitchFamily="34" charset="0"/>
+              </a:rPr>
+              <a:t> –in </a:t>
+            </a:r>
+            <a:r>
+              <a:rPr lang="en-GB" sz="1500" dirty="0" err="1">
+                <a:latin typeface="Grandview Display" panose="020B0502040204020203" pitchFamily="34" charset="0"/>
+              </a:rPr>
+              <a:t>Si.matdyn.in</a:t>
+            </a:r>
+            <a:r>
+              <a:rPr lang="en-GB" sz="1500" dirty="0">
+                <a:latin typeface="Grandview Display" panose="020B0502040204020203" pitchFamily="34" charset="0"/>
+              </a:rPr>
+              <a:t> &gt; </a:t>
+            </a:r>
+            <a:r>
+              <a:rPr lang="en-GB" sz="1500" dirty="0" err="1">
+                <a:latin typeface="Grandview Display" panose="020B0502040204020203" pitchFamily="34" charset="0"/>
+              </a:rPr>
+              <a:t>Si.matdyn.out</a:t>
+            </a:r>
+            <a:endParaRPr lang="en-GB" sz="1500" dirty="0">
+              <a:latin typeface="Grandview Display" panose="020B0502040204020203" pitchFamily="34" charset="0"/>
+            </a:endParaRPr>
+          </a:p>
+        </p:txBody>
+      </p:sp>
+      <p:sp>
+        <p:nvSpPr>
+          <p:cNvPr id="18" name="Text Placeholder 2">
+            <a:extLst>
+              <a:ext uri="{FF2B5EF4-FFF2-40B4-BE49-F238E27FC236}">
+                <a16:creationId xmlns:a16="http://schemas.microsoft.com/office/drawing/2014/main" id="{4989BC61-699D-379D-2EF8-638062F29BDE}"/>
+              </a:ext>
+            </a:extLst>
+          </p:cNvPr>
+          <p:cNvSpPr txBox="1">
+            <a:spLocks/>
+          </p:cNvSpPr>
+          <p:nvPr/>
+        </p:nvSpPr>
+        <p:spPr>
+          <a:xfrm>
+            <a:off x="272019" y="4897808"/>
+            <a:ext cx="9138004" cy="610803"/>
+          </a:xfrm>
+          <a:prstGeom prst="rect">
+            <a:avLst/>
+          </a:prstGeom>
+          <a:noFill/>
+          <a:ln>
+            <a:noFill/>
+          </a:ln>
+        </p:spPr>
+        <p:txBody>
+          <a:bodyPr spcFirstLastPara="1" wrap="square" lIns="103175" tIns="103175" rIns="103175" bIns="103175" anchor="t" anchorCtr="0">
+            <a:normAutofit/>
+          </a:bodyPr>
+          <a:lstStyle>
+            <a:defPPr marR="0" lvl="0" algn="l" rtl="0">
+              <a:lnSpc>
+                <a:spcPct val="100000"/>
+              </a:lnSpc>
+              <a:spcBef>
+                <a:spcPts val="0"/>
+              </a:spcBef>
+              <a:spcAft>
+                <a:spcPts val="0"/>
+              </a:spcAft>
+            </a:defPPr>
+            <a:lvl1pPr marL="457200" marR="0" lvl="0" indent="-355600" algn="l" rtl="0">
+              <a:lnSpc>
+                <a:spcPct val="115000"/>
+              </a:lnSpc>
+              <a:spcBef>
+                <a:spcPts val="0"/>
+              </a:spcBef>
+              <a:spcAft>
+                <a:spcPts val="0"/>
+              </a:spcAft>
+              <a:buClr>
+                <a:schemeClr val="dk2"/>
+              </a:buClr>
+              <a:buSzPts val="2000"/>
+              <a:buFont typeface="Lato"/>
+              <a:buChar char="●"/>
+              <a:defRPr sz="2000" b="0" i="0" u="none" strike="noStrike" cap="none">
+                <a:solidFill>
+                  <a:schemeClr val="dk2"/>
+                </a:solidFill>
+                <a:latin typeface="Lato"/>
+                <a:ea typeface="Lato"/>
+                <a:cs typeface="Lato"/>
+                <a:sym typeface="Lato"/>
+              </a:defRPr>
+            </a:lvl1pPr>
+            <a:lvl2pPr marL="914400" marR="0" lvl="1" indent="-330200" algn="l" rtl="0">
+              <a:lnSpc>
+                <a:spcPct val="115000"/>
+              </a:lnSpc>
+              <a:spcBef>
+                <a:spcPts val="0"/>
+              </a:spcBef>
+              <a:spcAft>
+                <a:spcPts val="0"/>
+              </a:spcAft>
+              <a:buClr>
+                <a:schemeClr val="dk2"/>
+              </a:buClr>
+              <a:buSzPts val="1600"/>
+              <a:buFont typeface="Lato"/>
+              <a:buChar char="○"/>
+              <a:defRPr sz="1600" b="0" i="0" u="none" strike="noStrike" cap="none">
+                <a:solidFill>
+                  <a:schemeClr val="dk2"/>
+                </a:solidFill>
+                <a:latin typeface="Lato"/>
+                <a:ea typeface="Lato"/>
+                <a:cs typeface="Lato"/>
+                <a:sym typeface="Lato"/>
+              </a:defRPr>
+            </a:lvl2pPr>
+            <a:lvl3pPr marL="1371600" marR="0" lvl="2" indent="-330200" algn="l" rtl="0">
+              <a:lnSpc>
+                <a:spcPct val="115000"/>
+              </a:lnSpc>
+              <a:spcBef>
+                <a:spcPts val="0"/>
+              </a:spcBef>
+              <a:spcAft>
+                <a:spcPts val="0"/>
+              </a:spcAft>
+              <a:buClr>
+                <a:schemeClr val="dk2"/>
+              </a:buClr>
+              <a:buSzPts val="1600"/>
+              <a:buFont typeface="Lato"/>
+              <a:buChar char="■"/>
+              <a:defRPr sz="1600" b="0" i="0" u="none" strike="noStrike" cap="none">
+                <a:solidFill>
+                  <a:schemeClr val="dk2"/>
+                </a:solidFill>
+                <a:latin typeface="Lato"/>
+                <a:ea typeface="Lato"/>
+                <a:cs typeface="Lato"/>
+                <a:sym typeface="Lato"/>
+              </a:defRPr>
+            </a:lvl3pPr>
+            <a:lvl4pPr marL="1828800" marR="0" lvl="3" indent="-330200" algn="l" rtl="0">
+              <a:lnSpc>
+                <a:spcPct val="115000"/>
+              </a:lnSpc>
+              <a:spcBef>
+                <a:spcPts val="0"/>
+              </a:spcBef>
+              <a:spcAft>
+                <a:spcPts val="0"/>
+              </a:spcAft>
+              <a:buClr>
+                <a:schemeClr val="dk2"/>
+              </a:buClr>
+              <a:buSzPts val="1600"/>
+              <a:buFont typeface="Lato"/>
+              <a:buChar char="●"/>
+              <a:defRPr sz="1600" b="0" i="0" u="none" strike="noStrike" cap="none">
+                <a:solidFill>
+                  <a:schemeClr val="dk2"/>
+                </a:solidFill>
+                <a:latin typeface="Lato"/>
+                <a:ea typeface="Lato"/>
+                <a:cs typeface="Lato"/>
+                <a:sym typeface="Lato"/>
+              </a:defRPr>
+            </a:lvl4pPr>
+            <a:lvl5pPr marL="2286000" marR="0" lvl="4" indent="-330200" algn="l" rtl="0">
+              <a:lnSpc>
+                <a:spcPct val="115000"/>
+              </a:lnSpc>
+              <a:spcBef>
+                <a:spcPts val="0"/>
+              </a:spcBef>
+              <a:spcAft>
+                <a:spcPts val="0"/>
+              </a:spcAft>
+              <a:buClr>
+                <a:schemeClr val="dk2"/>
+              </a:buClr>
+              <a:buSzPts val="1600"/>
+              <a:buFont typeface="Lato"/>
+              <a:buChar char="○"/>
+              <a:defRPr sz="1600" b="0" i="0" u="none" strike="noStrike" cap="none">
+                <a:solidFill>
+                  <a:schemeClr val="dk2"/>
+                </a:solidFill>
+                <a:latin typeface="Lato"/>
+                <a:ea typeface="Lato"/>
+                <a:cs typeface="Lato"/>
+                <a:sym typeface="Lato"/>
+              </a:defRPr>
+            </a:lvl5pPr>
+            <a:lvl6pPr marL="2743200" marR="0" lvl="5" indent="-330200" algn="l" rtl="0">
+              <a:lnSpc>
+                <a:spcPct val="115000"/>
+              </a:lnSpc>
+              <a:spcBef>
+                <a:spcPts val="0"/>
+              </a:spcBef>
+              <a:spcAft>
+                <a:spcPts val="0"/>
+              </a:spcAft>
+              <a:buClr>
+                <a:schemeClr val="dk2"/>
+              </a:buClr>
+              <a:buSzPts val="1600"/>
+              <a:buFont typeface="Lato"/>
+              <a:buChar char="■"/>
+              <a:defRPr sz="1600" b="0" i="0" u="none" strike="noStrike" cap="none">
+                <a:solidFill>
+                  <a:schemeClr val="dk2"/>
+                </a:solidFill>
+                <a:latin typeface="Lato"/>
+                <a:ea typeface="Lato"/>
+                <a:cs typeface="Lato"/>
+                <a:sym typeface="Lato"/>
+              </a:defRPr>
+            </a:lvl6pPr>
+            <a:lvl7pPr marL="3200400" marR="0" lvl="6" indent="-330200" algn="l" rtl="0">
+              <a:lnSpc>
+                <a:spcPct val="115000"/>
+              </a:lnSpc>
+              <a:spcBef>
+                <a:spcPts val="0"/>
+              </a:spcBef>
+              <a:spcAft>
+                <a:spcPts val="0"/>
+              </a:spcAft>
+              <a:buClr>
+                <a:schemeClr val="dk2"/>
+              </a:buClr>
+              <a:buSzPts val="1600"/>
+              <a:buFont typeface="Lato"/>
+              <a:buChar char="●"/>
+              <a:defRPr sz="1600" b="0" i="0" u="none" strike="noStrike" cap="none">
+                <a:solidFill>
+                  <a:schemeClr val="dk2"/>
+                </a:solidFill>
+                <a:latin typeface="Lato"/>
+                <a:ea typeface="Lato"/>
+                <a:cs typeface="Lato"/>
+                <a:sym typeface="Lato"/>
+              </a:defRPr>
+            </a:lvl7pPr>
+            <a:lvl8pPr marL="3657600" marR="0" lvl="7" indent="-330200" algn="l" rtl="0">
+              <a:lnSpc>
+                <a:spcPct val="115000"/>
+              </a:lnSpc>
+              <a:spcBef>
+                <a:spcPts val="0"/>
+              </a:spcBef>
+              <a:spcAft>
+                <a:spcPts val="0"/>
+              </a:spcAft>
+              <a:buClr>
+                <a:schemeClr val="dk2"/>
+              </a:buClr>
+              <a:buSzPts val="1600"/>
+              <a:buFont typeface="Lato"/>
+              <a:buChar char="○"/>
+              <a:defRPr sz="1600" b="0" i="0" u="none" strike="noStrike" cap="none">
+                <a:solidFill>
+                  <a:schemeClr val="dk2"/>
+                </a:solidFill>
+                <a:latin typeface="Lato"/>
+                <a:ea typeface="Lato"/>
+                <a:cs typeface="Lato"/>
+                <a:sym typeface="Lato"/>
+              </a:defRPr>
+            </a:lvl8pPr>
+            <a:lvl9pPr marL="4114800" marR="0" lvl="8" indent="-330200" algn="l" rtl="0">
+              <a:lnSpc>
+                <a:spcPct val="115000"/>
+              </a:lnSpc>
+              <a:spcBef>
+                <a:spcPts val="0"/>
+              </a:spcBef>
+              <a:spcAft>
+                <a:spcPts val="0"/>
+              </a:spcAft>
+              <a:buClr>
+                <a:schemeClr val="dk2"/>
+              </a:buClr>
+              <a:buSzPts val="1600"/>
+              <a:buFont typeface="Lato"/>
+              <a:buChar char="■"/>
+              <a:defRPr sz="1600" b="0" i="0" u="none" strike="noStrike" cap="none">
+                <a:solidFill>
+                  <a:schemeClr val="dk2"/>
+                </a:solidFill>
+                <a:latin typeface="Lato"/>
+                <a:ea typeface="Lato"/>
+                <a:cs typeface="Lato"/>
+                <a:sym typeface="Lato"/>
+              </a:defRPr>
+            </a:lvl9pPr>
+          </a:lstStyle>
+          <a:p>
+            <a:pPr marL="101600" indent="0">
+              <a:buFont typeface="Lato"/>
+              <a:buNone/>
+            </a:pPr>
+            <a:r>
+              <a:rPr lang="en-GB" sz="1500" b="1" dirty="0"/>
+              <a:t>Step 5:   </a:t>
+            </a:r>
+            <a:r>
+              <a:rPr lang="en-GB" sz="1500" dirty="0"/>
+              <a:t>Plot the phonon dispersion using the </a:t>
+            </a:r>
+            <a:r>
+              <a:rPr lang="en-GB" sz="1500" dirty="0" err="1"/>
+              <a:t>plotband.x</a:t>
+            </a:r>
+            <a:r>
+              <a:rPr lang="en-GB" sz="1500" dirty="0"/>
+              <a:t> program and </a:t>
+            </a:r>
+            <a:r>
+              <a:rPr lang="en-GB" sz="1500" dirty="0" err="1"/>
+              <a:t>gnuplot</a:t>
+            </a:r>
+            <a:r>
+              <a:rPr lang="en-GB" sz="1500" dirty="0"/>
+              <a:t>.</a:t>
+            </a:r>
+          </a:p>
+        </p:txBody>
+      </p:sp>
+      <p:sp>
+        <p:nvSpPr>
+          <p:cNvPr id="24" name="Rounded Rectangle 23">
+            <a:extLst>
+              <a:ext uri="{FF2B5EF4-FFF2-40B4-BE49-F238E27FC236}">
+                <a16:creationId xmlns:a16="http://schemas.microsoft.com/office/drawing/2014/main" id="{AE3CF8C1-C111-BC4C-BAF3-38D663C29CE8}"/>
+              </a:ext>
+            </a:extLst>
+          </p:cNvPr>
+          <p:cNvSpPr/>
+          <p:nvPr/>
+        </p:nvSpPr>
+        <p:spPr>
+          <a:xfrm>
+            <a:off x="3035467" y="5427788"/>
+            <a:ext cx="5121558" cy="409693"/>
+          </a:xfrm>
+          <a:prstGeom prst="roundRect">
+            <a:avLst/>
+          </a:prstGeom>
+          <a:solidFill>
+            <a:schemeClr val="bg1"/>
+          </a:solidFill>
+          <a:ln>
+            <a:noFill/>
+          </a:ln>
+          <a:effectLst>
+            <a:outerShdw blurRad="50800" dist="38100" dir="8100000" algn="tr" rotWithShape="0">
+              <a:prstClr val="black">
+                <a:alpha val="40000"/>
+              </a:prstClr>
+            </a:outerShdw>
+          </a:effectLst>
+        </p:spPr>
+        <p:style>
+          <a:lnRef idx="2">
+            <a:schemeClr val="accent1">
+              <a:shade val="15000"/>
+            </a:schemeClr>
+          </a:lnRef>
+          <a:fillRef idx="1">
+            <a:schemeClr val="accent1"/>
+          </a:fillRef>
+          <a:effectRef idx="0">
+            <a:schemeClr val="accent1"/>
+          </a:effectRef>
+          <a:fontRef idx="minor">
+            <a:schemeClr val="lt1"/>
+          </a:fontRef>
+        </p:style>
+        <p:txBody>
+          <a:bodyPr rtlCol="0" anchor="ctr"/>
+          <a:lstStyle/>
+          <a:p>
+            <a:pPr algn="ctr"/>
+            <a:endParaRPr lang="en-GB" sz="1500"/>
+          </a:p>
+        </p:txBody>
+      </p:sp>
+      <p:sp>
+        <p:nvSpPr>
+          <p:cNvPr id="25" name="TextBox 24">
+            <a:extLst>
+              <a:ext uri="{FF2B5EF4-FFF2-40B4-BE49-F238E27FC236}">
+                <a16:creationId xmlns:a16="http://schemas.microsoft.com/office/drawing/2014/main" id="{CB491893-3A26-9F83-73F8-E0B52F120AAC}"/>
+              </a:ext>
+            </a:extLst>
+          </p:cNvPr>
+          <p:cNvSpPr txBox="1"/>
+          <p:nvPr/>
+        </p:nvSpPr>
+        <p:spPr>
+          <a:xfrm>
+            <a:off x="3035468" y="5498927"/>
+            <a:ext cx="5121558" cy="338554"/>
+          </a:xfrm>
+          <a:prstGeom prst="rect">
+            <a:avLst/>
+          </a:prstGeom>
+          <a:noFill/>
+          <a:ln>
+            <a:noFill/>
+          </a:ln>
+        </p:spPr>
+        <p:txBody>
+          <a:bodyPr wrap="square" rtlCol="0">
+            <a:spAutoFit/>
+          </a:bodyPr>
+          <a:lstStyle/>
+          <a:p>
+            <a:r>
+              <a:rPr lang="en-GB" sz="1600" dirty="0" err="1">
+                <a:latin typeface="Grandview Display" panose="020B0502040204020203" pitchFamily="34" charset="0"/>
+              </a:rPr>
+              <a:t>plotband.x</a:t>
+            </a:r>
+            <a:r>
+              <a:rPr lang="en-GB" sz="1600" dirty="0">
+                <a:latin typeface="Grandview Display" panose="020B0502040204020203" pitchFamily="34" charset="0"/>
+              </a:rPr>
+              <a:t> &lt; </a:t>
+            </a:r>
+            <a:r>
+              <a:rPr lang="en-GB" sz="1600" dirty="0" err="1">
+                <a:latin typeface="Grandview Display" panose="020B0502040204020203" pitchFamily="34" charset="0"/>
+              </a:rPr>
+              <a:t>Si.plotband.in</a:t>
+            </a:r>
+            <a:r>
+              <a:rPr lang="en-GB" sz="1600" dirty="0">
+                <a:latin typeface="Grandview Display" panose="020B0502040204020203" pitchFamily="34" charset="0"/>
+              </a:rPr>
+              <a:t> &gt; </a:t>
+            </a:r>
+            <a:r>
+              <a:rPr lang="en-GB" sz="1600" dirty="0" err="1">
+                <a:latin typeface="Grandview Display" panose="020B0502040204020203" pitchFamily="34" charset="0"/>
+              </a:rPr>
+              <a:t>Si.plotband.out</a:t>
+            </a:r>
+            <a:endParaRPr lang="en-GB" sz="1600" dirty="0">
+              <a:latin typeface="Grandview Display" panose="020B0502040204020203" pitchFamily="34" charset="0"/>
+            </a:endParaRPr>
           </a:p>
         </p:txBody>
       </p:sp>
     </p:spTree>
+    <p:extLst>
+      <p:ext uri="{BB962C8B-B14F-4D97-AF65-F5344CB8AC3E}">
+        <p14:creationId xmlns:p14="http://schemas.microsoft.com/office/powerpoint/2010/main" val="3688613717"/>
+      </p:ext>
+    </p:extLst>
+  </p:cSld>
+  <p:clrMapOvr>
+    <a:masterClrMapping/>
+  </p:clrMapOvr>
+</p:sld>
+</file>
+
+<file path=ppt/slides/slide49.xml><?xml version="1.0" encoding="utf-8"?>
+<p:sld xmlns:a="http://schemas.openxmlformats.org/drawingml/2006/main" xmlns:r="http://schemas.openxmlformats.org/officeDocument/2006/relationships" xmlns:p="http://schemas.openxmlformats.org/presentationml/2006/main">
+  <p:cSld>
+    <p:spTree>
+      <p:nvGrpSpPr>
+        <p:cNvPr id="1" name=""/>
+        <p:cNvGrpSpPr/>
+        <p:nvPr/>
+      </p:nvGrpSpPr>
+      <p:grpSpPr>
+        <a:xfrm>
+          <a:off x="0" y="0"/>
+          <a:ext cx="0" cy="0"/>
+          <a:chOff x="0" y="0"/>
+          <a:chExt cx="0" cy="0"/>
+        </a:xfrm>
+      </p:grpSpPr>
+      <p:sp>
+        <p:nvSpPr>
+          <p:cNvPr id="2" name="Title 1">
+            <a:extLst>
+              <a:ext uri="{FF2B5EF4-FFF2-40B4-BE49-F238E27FC236}">
+                <a16:creationId xmlns:a16="http://schemas.microsoft.com/office/drawing/2014/main" id="{7C6DA0E7-492B-E17D-F08D-4C43EA1C8FC3}"/>
+              </a:ext>
+            </a:extLst>
+          </p:cNvPr>
+          <p:cNvSpPr>
+            <a:spLocks noGrp="1"/>
+          </p:cNvSpPr>
+          <p:nvPr>
+            <p:ph type="title"/>
+          </p:nvPr>
+        </p:nvSpPr>
+        <p:spPr/>
+        <p:txBody>
+          <a:bodyPr/>
+          <a:lstStyle/>
+          <a:p>
+            <a:r>
+              <a:rPr lang="en-US" sz="3600" dirty="0"/>
+              <a:t>Exercise 6: </a:t>
+            </a:r>
+            <a:r>
+              <a:rPr lang="en-GB" sz="3600" dirty="0"/>
+              <a:t>Negative phonons</a:t>
+            </a:r>
+            <a:endParaRPr lang="en-GB" dirty="0"/>
+          </a:p>
+        </p:txBody>
+      </p:sp>
+      <p:sp>
+        <p:nvSpPr>
+          <p:cNvPr id="3" name="Text Placeholder 2">
+            <a:extLst>
+              <a:ext uri="{FF2B5EF4-FFF2-40B4-BE49-F238E27FC236}">
+                <a16:creationId xmlns:a16="http://schemas.microsoft.com/office/drawing/2014/main" id="{291A721E-0756-FA72-1D48-30A4180141EC}"/>
+              </a:ext>
+            </a:extLst>
+          </p:cNvPr>
+          <p:cNvSpPr>
+            <a:spLocks noGrp="1"/>
+          </p:cNvSpPr>
+          <p:nvPr>
+            <p:ph type="body" idx="1"/>
+          </p:nvPr>
+        </p:nvSpPr>
+        <p:spPr/>
+        <p:txBody>
+          <a:bodyPr/>
+          <a:lstStyle/>
+          <a:p>
+            <a:r>
+              <a:rPr lang="en-GB" dirty="0"/>
+              <a:t>Look at the results of the phonon dispersion: can you explain what you see? What is the difference with the band </a:t>
+            </a:r>
+            <a:r>
+              <a:rPr lang="en-GB"/>
+              <a:t>dispersion in </a:t>
+            </a:r>
+            <a:r>
+              <a:rPr lang="en-GB" dirty="0"/>
+              <a:t>exercise3?</a:t>
+            </a:r>
+          </a:p>
+        </p:txBody>
+      </p:sp>
+    </p:spTree>
+    <p:extLst>
+      <p:ext uri="{BB962C8B-B14F-4D97-AF65-F5344CB8AC3E}">
+        <p14:creationId xmlns:p14="http://schemas.microsoft.com/office/powerpoint/2010/main" val="729261756"/>
+      </p:ext>
+    </p:extLst>
   </p:cSld>
   <p:clrMapOvr>
     <a:masterClrMapping/>
@@ -38688,6 +43112,153 @@
           </a:ln>
         </p:spPr>
       </p:pic>
+    </p:spTree>
+  </p:cSld>
+  <p:clrMapOvr>
+    <a:masterClrMapping/>
+  </p:clrMapOvr>
+</p:sld>
+</file>
+
+<file path=ppt/slides/slide50.xml><?xml version="1.0" encoding="utf-8"?>
+<p:sld xmlns:a="http://schemas.openxmlformats.org/drawingml/2006/main" xmlns:r="http://schemas.openxmlformats.org/officeDocument/2006/relationships" xmlns:p="http://schemas.openxmlformats.org/presentationml/2006/main">
+  <p:cSld>
+    <p:spTree>
+      <p:nvGrpSpPr>
+        <p:cNvPr id="1" name="Shape 117"/>
+        <p:cNvGrpSpPr/>
+        <p:nvPr/>
+      </p:nvGrpSpPr>
+      <p:grpSpPr>
+        <a:xfrm>
+          <a:off x="0" y="0"/>
+          <a:ext cx="0" cy="0"/>
+          <a:chOff x="0" y="0"/>
+          <a:chExt cx="0" cy="0"/>
+        </a:xfrm>
+      </p:grpSpPr>
+      <p:sp>
+        <p:nvSpPr>
+          <p:cNvPr id="118" name="Google Shape;118;p20"/>
+          <p:cNvSpPr txBox="1">
+            <a:spLocks noGrp="1"/>
+          </p:cNvSpPr>
+          <p:nvPr>
+            <p:ph type="title"/>
+          </p:nvPr>
+        </p:nvSpPr>
+        <p:spPr>
+          <a:xfrm>
+            <a:off x="282232" y="1760488"/>
+            <a:ext cx="4300200" cy="1660800"/>
+          </a:xfrm>
+          <a:prstGeom prst="rect">
+            <a:avLst/>
+          </a:prstGeom>
+        </p:spPr>
+        <p:txBody>
+          <a:bodyPr spcFirstLastPara="1" wrap="square" lIns="103175" tIns="103175" rIns="103175" bIns="103175" anchor="b" anchorCtr="0">
+            <a:normAutofit/>
+          </a:bodyPr>
+          <a:lstStyle/>
+          <a:p>
+            <a:pPr marL="0" lvl="0" indent="0" algn="ctr" rtl="0">
+              <a:spcBef>
+                <a:spcPts val="0"/>
+              </a:spcBef>
+              <a:spcAft>
+                <a:spcPts val="0"/>
+              </a:spcAft>
+              <a:buNone/>
+            </a:pPr>
+            <a:r>
+              <a:rPr lang="en-US" dirty="0"/>
+              <a:t>Thank you!</a:t>
+            </a:r>
+            <a:endParaRPr dirty="0"/>
+          </a:p>
+        </p:txBody>
+      </p:sp>
+      <p:sp>
+        <p:nvSpPr>
+          <p:cNvPr id="119" name="Google Shape;119;p20"/>
+          <p:cNvSpPr txBox="1">
+            <a:spLocks noGrp="1"/>
+          </p:cNvSpPr>
+          <p:nvPr>
+            <p:ph type="body" idx="2"/>
+          </p:nvPr>
+        </p:nvSpPr>
+        <p:spPr>
+          <a:xfrm>
+            <a:off x="5250785" y="683803"/>
+            <a:ext cx="4078800" cy="4655400"/>
+          </a:xfrm>
+          <a:prstGeom prst="rect">
+            <a:avLst/>
+          </a:prstGeom>
+        </p:spPr>
+        <p:txBody>
+          <a:bodyPr spcFirstLastPara="1" wrap="square" lIns="103175" tIns="103175" rIns="103175" bIns="103175" anchor="ctr" anchorCtr="0">
+            <a:normAutofit/>
+          </a:bodyPr>
+          <a:lstStyle/>
+          <a:p>
+            <a:pPr marL="0" lvl="0" indent="0" algn="l" rtl="0">
+              <a:spcBef>
+                <a:spcPts val="0"/>
+              </a:spcBef>
+              <a:spcAft>
+                <a:spcPts val="1400"/>
+              </a:spcAft>
+              <a:buNone/>
+            </a:pPr>
+            <a:r>
+              <a:rPr lang="en-US" sz="4800" b="1"/>
+              <a:t>Questions?</a:t>
+            </a:r>
+            <a:endParaRPr sz="4800" b="1"/>
+          </a:p>
+        </p:txBody>
+      </p:sp>
+      <p:sp>
+        <p:nvSpPr>
+          <p:cNvPr id="120" name="Google Shape;120;p20"/>
+          <p:cNvSpPr txBox="1">
+            <a:spLocks noGrp="1"/>
+          </p:cNvSpPr>
+          <p:nvPr>
+            <p:ph type="subTitle" idx="1"/>
+          </p:nvPr>
+        </p:nvSpPr>
+        <p:spPr>
+          <a:xfrm>
+            <a:off x="282232" y="3446229"/>
+            <a:ext cx="4300200" cy="1695300"/>
+          </a:xfrm>
+          <a:prstGeom prst="rect">
+            <a:avLst/>
+          </a:prstGeom>
+        </p:spPr>
+        <p:txBody>
+          <a:bodyPr spcFirstLastPara="1" wrap="square" lIns="103175" tIns="103175" rIns="103175" bIns="103175" anchor="t" anchorCtr="0">
+            <a:normAutofit/>
+          </a:bodyPr>
+          <a:lstStyle/>
+          <a:p>
+            <a:pPr marL="0" lvl="0" indent="0" algn="ctr" rtl="0">
+              <a:spcBef>
+                <a:spcPts val="0"/>
+              </a:spcBef>
+              <a:spcAft>
+                <a:spcPts val="0"/>
+              </a:spcAft>
+              <a:buNone/>
+            </a:pPr>
+            <a:endParaRPr/>
+          </a:p>
+        </p:txBody>
+      </p:sp>
     </p:spTree>
   </p:cSld>
   <p:clrMapOvr>

</xml_diff>